<commit_message>
dodana razrada evenata i korisnik
</commit_message>
<xml_diff>
--- a/Dokumentacija/Prezentacija/EventkoPreza.pptx
+++ b/Dokumentacija/Prezentacija/EventkoPreza.pptx
@@ -5,20 +5,22 @@
     <p:sldMasterId id="2147483687" r:id="rId1"/>
   </p:sldMasterIdLst>
   <p:notesMasterIdLst>
-    <p:notesMasterId r:id="rId13"/>
+    <p:notesMasterId r:id="rId15"/>
   </p:notesMasterIdLst>
   <p:sldIdLst>
     <p:sldId id="256" r:id="rId2"/>
     <p:sldId id="265" r:id="rId3"/>
     <p:sldId id="257" r:id="rId4"/>
-    <p:sldId id="266" r:id="rId5"/>
-    <p:sldId id="258" r:id="rId6"/>
-    <p:sldId id="259" r:id="rId7"/>
-    <p:sldId id="260" r:id="rId8"/>
-    <p:sldId id="261" r:id="rId9"/>
-    <p:sldId id="262" r:id="rId10"/>
-    <p:sldId id="263" r:id="rId11"/>
-    <p:sldId id="264" r:id="rId12"/>
+    <p:sldId id="258" r:id="rId5"/>
+    <p:sldId id="266" r:id="rId6"/>
+    <p:sldId id="268" r:id="rId7"/>
+    <p:sldId id="267" r:id="rId8"/>
+    <p:sldId id="259" r:id="rId9"/>
+    <p:sldId id="260" r:id="rId10"/>
+    <p:sldId id="261" r:id="rId11"/>
+    <p:sldId id="262" r:id="rId12"/>
+    <p:sldId id="263" r:id="rId13"/>
+    <p:sldId id="264" r:id="rId14"/>
   </p:sldIdLst>
   <p:sldSz cx="9144000" cy="6858000" type="screen4x3"/>
   <p:notesSz cx="6858000" cy="9144000"/>
@@ -207,7 +209,7 @@
           <a:p>
             <a:fld id="{A57596D4-CB16-4BAD-83F6-7E8077D61F81}" type="datetimeFigureOut">
               <a:rPr lang="hr-HR" smtClean="0"/>
-              <a:t>14.1.2023.</a:t>
+              <a:t>15.1.2023.</a:t>
             </a:fld>
             <a:endParaRPr lang="hr-HR"/>
           </a:p>
@@ -3904,7 +3906,7 @@
           <a:p>
             <a:fld id="{E46E8F5E-7C26-4DBA-9CDF-6E3092DFB447}" type="datetime1">
               <a:rPr lang="hr-HR" smtClean="0"/>
-              <a:t>14.1.2023.</a:t>
+              <a:t>15.1.2023.</a:t>
             </a:fld>
             <a:endParaRPr lang="hr-HR"/>
           </a:p>
@@ -4130,7 +4132,7 @@
           <a:p>
             <a:fld id="{E46E8F5E-7C26-4DBA-9CDF-6E3092DFB447}" type="datetime1">
               <a:rPr lang="hr-HR" smtClean="0"/>
-              <a:t>14.1.2023.</a:t>
+              <a:t>15.1.2023.</a:t>
             </a:fld>
             <a:endParaRPr lang="hr-HR"/>
           </a:p>
@@ -4792,7 +4794,7 @@
           <a:p>
             <a:r>
               <a:rPr lang="hr-HR" dirty="0"/>
-              <a:t>Naučene lekcije</a:t>
+              <a:t>Arhitektura sustava</a:t>
             </a:r>
           </a:p>
         </p:txBody>
@@ -4814,30 +4816,14 @@
           <a:p>
             <a:r>
               <a:rPr lang="hr-HR" dirty="0"/>
-              <a:t>Što je bilo dobro, a što je moglo bolje</a:t>
-            </a:r>
-          </a:p>
-          <a:p>
-            <a:pPr lvl="1"/>
+              <a:t>Na visokoj razini apstrakcije</a:t>
+            </a:r>
+          </a:p>
+          <a:p>
             <a:r>
               <a:rPr lang="hr-HR" dirty="0"/>
-              <a:t>A što se nikako ne bi smjelo ponoviti </a:t>
-            </a:r>
-            <a:r>
-              <a:rPr lang="hr-HR" dirty="0">
-                <a:sym typeface="Wingdings" panose="05000000000000000000" pitchFamily="2" charset="2"/>
-              </a:rPr>
-              <a:t></a:t>
-            </a:r>
-          </a:p>
-          <a:p>
-            <a:pPr lvl="1"/>
-            <a:endParaRPr lang="hr-HR" dirty="0">
-              <a:sym typeface="Wingdings" panose="05000000000000000000" pitchFamily="2" charset="2"/>
-            </a:endParaRPr>
-          </a:p>
-          <a:p>
-            <a:endParaRPr lang="hr-HR" dirty="0"/>
+              <a:t>Obavezno staviti dijagram </a:t>
+            </a:r>
           </a:p>
         </p:txBody>
       </p:sp>
@@ -4867,7 +4853,7 @@
     </p:spTree>
     <p:extLst>
       <p:ext uri="{BB962C8B-B14F-4D97-AF65-F5344CB8AC3E}">
-        <p14:creationId xmlns:p14="http://schemas.microsoft.com/office/powerpoint/2010/main" val="48259320"/>
+        <p14:creationId xmlns:p14="http://schemas.microsoft.com/office/powerpoint/2010/main" val="3657354464"/>
       </p:ext>
     </p:extLst>
   </p:cSld>
@@ -4910,6 +4896,249 @@
           <a:lstStyle/>
           <a:p>
             <a:r>
+              <a:rPr lang="hr-HR" dirty="0"/>
+              <a:t>Organizacija rada</a:t>
+            </a:r>
+          </a:p>
+        </p:txBody>
+      </p:sp>
+      <p:sp>
+        <p:nvSpPr>
+          <p:cNvPr id="3" name="Content Placeholder 2"/>
+          <p:cNvSpPr>
+            <a:spLocks noGrp="1"/>
+          </p:cNvSpPr>
+          <p:nvPr>
+            <p:ph idx="1"/>
+          </p:nvPr>
+        </p:nvSpPr>
+        <p:spPr/>
+        <p:txBody>
+          <a:bodyPr/>
+          <a:lstStyle/>
+          <a:p>
+            <a:r>
+              <a:rPr lang="hr-HR" dirty="0"/>
+              <a:t>Vremenska linija razvoja (specifikacija, implementacija, ispitivanje, dokumentiranje)</a:t>
+            </a:r>
+          </a:p>
+          <a:p>
+            <a:pPr lvl="1"/>
+            <a:r>
+              <a:rPr lang="hr-HR" dirty="0"/>
+              <a:t>Poželjan grafički prikaz</a:t>
+            </a:r>
+          </a:p>
+          <a:p>
+            <a:pPr marL="457200" lvl="1" indent="0">
+              <a:buNone/>
+            </a:pPr>
+            <a:endParaRPr lang="hr-HR" dirty="0"/>
+          </a:p>
+          <a:p>
+            <a:r>
+              <a:rPr lang="hr-HR" dirty="0"/>
+              <a:t>Raspodjela posla po članovima tima (koliko </a:t>
+            </a:r>
+            <a:r>
+              <a:rPr lang="hr-HR" dirty="0" err="1"/>
+              <a:t>developera</a:t>
+            </a:r>
+            <a:r>
+              <a:rPr lang="hr-HR" dirty="0"/>
+              <a:t>, koliko testera…)</a:t>
+            </a:r>
+          </a:p>
+        </p:txBody>
+      </p:sp>
+      <p:sp>
+        <p:nvSpPr>
+          <p:cNvPr id="4" name="Slide Number Placeholder 3"/>
+          <p:cNvSpPr>
+            <a:spLocks noGrp="1"/>
+          </p:cNvSpPr>
+          <p:nvPr>
+            <p:ph type="sldNum" sz="quarter" idx="12"/>
+          </p:nvPr>
+        </p:nvSpPr>
+        <p:spPr/>
+        <p:txBody>
+          <a:bodyPr/>
+          <a:lstStyle/>
+          <a:p>
+            <a:fld id="{FAA41844-C0CA-4144-9D6C-D993F0C0FAB4}" type="slidenum">
+              <a:rPr lang="hr-HR" smtClean="0"/>
+              <a:t>11</a:t>
+            </a:fld>
+            <a:endParaRPr lang="hr-HR"/>
+          </a:p>
+        </p:txBody>
+      </p:sp>
+    </p:spTree>
+    <p:extLst>
+      <p:ext uri="{BB962C8B-B14F-4D97-AF65-F5344CB8AC3E}">
+        <p14:creationId xmlns:p14="http://schemas.microsoft.com/office/powerpoint/2010/main" val="4285223946"/>
+      </p:ext>
+    </p:extLst>
+  </p:cSld>
+  <p:clrMapOvr>
+    <a:masterClrMapping/>
+  </p:clrMapOvr>
+</p:sld>
+</file>
+
+<file path=ppt/slides/slide12.xml><?xml version="1.0" encoding="utf-8"?>
+<p:sld xmlns:a="http://schemas.openxmlformats.org/drawingml/2006/main" xmlns:r="http://schemas.openxmlformats.org/officeDocument/2006/relationships" xmlns:p="http://schemas.openxmlformats.org/presentationml/2006/main">
+  <p:cSld>
+    <p:spTree>
+      <p:nvGrpSpPr>
+        <p:cNvPr id="1" name=""/>
+        <p:cNvGrpSpPr/>
+        <p:nvPr/>
+      </p:nvGrpSpPr>
+      <p:grpSpPr>
+        <a:xfrm>
+          <a:off x="0" y="0"/>
+          <a:ext cx="0" cy="0"/>
+          <a:chOff x="0" y="0"/>
+          <a:chExt cx="0" cy="0"/>
+        </a:xfrm>
+      </p:grpSpPr>
+      <p:sp>
+        <p:nvSpPr>
+          <p:cNvPr id="2" name="Title 1"/>
+          <p:cNvSpPr>
+            <a:spLocks noGrp="1"/>
+          </p:cNvSpPr>
+          <p:nvPr>
+            <p:ph type="title"/>
+          </p:nvPr>
+        </p:nvSpPr>
+        <p:spPr/>
+        <p:txBody>
+          <a:bodyPr/>
+          <a:lstStyle/>
+          <a:p>
+            <a:r>
+              <a:rPr lang="hr-HR" dirty="0"/>
+              <a:t>Naučene lekcije</a:t>
+            </a:r>
+          </a:p>
+        </p:txBody>
+      </p:sp>
+      <p:sp>
+        <p:nvSpPr>
+          <p:cNvPr id="3" name="Content Placeholder 2"/>
+          <p:cNvSpPr>
+            <a:spLocks noGrp="1"/>
+          </p:cNvSpPr>
+          <p:nvPr>
+            <p:ph idx="1"/>
+          </p:nvPr>
+        </p:nvSpPr>
+        <p:spPr/>
+        <p:txBody>
+          <a:bodyPr/>
+          <a:lstStyle/>
+          <a:p>
+            <a:r>
+              <a:rPr lang="hr-HR" dirty="0"/>
+              <a:t>Što je bilo dobro, a što je moglo bolje</a:t>
+            </a:r>
+          </a:p>
+          <a:p>
+            <a:pPr lvl="1"/>
+            <a:r>
+              <a:rPr lang="hr-HR" dirty="0"/>
+              <a:t>A što se nikako ne bi smjelo ponoviti </a:t>
+            </a:r>
+            <a:r>
+              <a:rPr lang="hr-HR" dirty="0">
+                <a:sym typeface="Wingdings" panose="05000000000000000000" pitchFamily="2" charset="2"/>
+              </a:rPr>
+              <a:t></a:t>
+            </a:r>
+          </a:p>
+          <a:p>
+            <a:pPr lvl="1"/>
+            <a:endParaRPr lang="hr-HR" dirty="0">
+              <a:sym typeface="Wingdings" panose="05000000000000000000" pitchFamily="2" charset="2"/>
+            </a:endParaRPr>
+          </a:p>
+          <a:p>
+            <a:endParaRPr lang="hr-HR" dirty="0"/>
+          </a:p>
+        </p:txBody>
+      </p:sp>
+      <p:sp>
+        <p:nvSpPr>
+          <p:cNvPr id="4" name="Slide Number Placeholder 3"/>
+          <p:cNvSpPr>
+            <a:spLocks noGrp="1"/>
+          </p:cNvSpPr>
+          <p:nvPr>
+            <p:ph type="sldNum" sz="quarter" idx="12"/>
+          </p:nvPr>
+        </p:nvSpPr>
+        <p:spPr/>
+        <p:txBody>
+          <a:bodyPr/>
+          <a:lstStyle/>
+          <a:p>
+            <a:fld id="{FAA41844-C0CA-4144-9D6C-D993F0C0FAB4}" type="slidenum">
+              <a:rPr lang="hr-HR" smtClean="0"/>
+              <a:t>12</a:t>
+            </a:fld>
+            <a:endParaRPr lang="hr-HR"/>
+          </a:p>
+        </p:txBody>
+      </p:sp>
+    </p:spTree>
+    <p:extLst>
+      <p:ext uri="{BB962C8B-B14F-4D97-AF65-F5344CB8AC3E}">
+        <p14:creationId xmlns:p14="http://schemas.microsoft.com/office/powerpoint/2010/main" val="48259320"/>
+      </p:ext>
+    </p:extLst>
+  </p:cSld>
+  <p:clrMapOvr>
+    <a:masterClrMapping/>
+  </p:clrMapOvr>
+</p:sld>
+</file>
+
+<file path=ppt/slides/slide13.xml><?xml version="1.0" encoding="utf-8"?>
+<p:sld xmlns:a="http://schemas.openxmlformats.org/drawingml/2006/main" xmlns:r="http://schemas.openxmlformats.org/officeDocument/2006/relationships" xmlns:p="http://schemas.openxmlformats.org/presentationml/2006/main">
+  <p:cSld>
+    <p:spTree>
+      <p:nvGrpSpPr>
+        <p:cNvPr id="1" name=""/>
+        <p:cNvGrpSpPr/>
+        <p:nvPr/>
+      </p:nvGrpSpPr>
+      <p:grpSpPr>
+        <a:xfrm>
+          <a:off x="0" y="0"/>
+          <a:ext cx="0" cy="0"/>
+          <a:chOff x="0" y="0"/>
+          <a:chExt cx="0" cy="0"/>
+        </a:xfrm>
+      </p:grpSpPr>
+      <p:sp>
+        <p:nvSpPr>
+          <p:cNvPr id="2" name="Title 1"/>
+          <p:cNvSpPr>
+            <a:spLocks noGrp="1"/>
+          </p:cNvSpPr>
+          <p:nvPr>
+            <p:ph type="title"/>
+          </p:nvPr>
+        </p:nvSpPr>
+        <p:spPr/>
+        <p:txBody>
+          <a:bodyPr/>
+          <a:lstStyle/>
+          <a:p>
+            <a:r>
               <a:rPr lang="hr-HR" i="1" dirty="0"/>
               <a:t>Nekoliko savjeta</a:t>
             </a:r>
@@ -5027,7 +5256,7 @@
           <a:p>
             <a:fld id="{FAA41844-C0CA-4144-9D6C-D993F0C0FAB4}" type="slidenum">
               <a:rPr lang="hr-HR" smtClean="0"/>
-              <a:t>11</a:t>
+              <a:t>13</a:t>
             </a:fld>
             <a:endParaRPr lang="hr-HR"/>
           </a:p>
@@ -5149,6 +5378,41 @@
           </a:prstGeom>
         </p:spPr>
       </p:pic>
+      <p:sp>
+        <p:nvSpPr>
+          <p:cNvPr id="4" name="TextBox 3">
+            <a:extLst>
+              <a:ext uri="{FF2B5EF4-FFF2-40B4-BE49-F238E27FC236}">
+                <a16:creationId xmlns:a16="http://schemas.microsoft.com/office/drawing/2014/main" id="{0D32B1C9-698F-DA5F-6FD4-70E54AA2F413}"/>
+              </a:ext>
+            </a:extLst>
+          </p:cNvPr>
+          <p:cNvSpPr txBox="1"/>
+          <p:nvPr/>
+        </p:nvSpPr>
+        <p:spPr>
+          <a:xfrm>
+            <a:off x="301841" y="6134470"/>
+            <a:ext cx="577049" cy="369332"/>
+          </a:xfrm>
+          <a:prstGeom prst="rect">
+            <a:avLst/>
+          </a:prstGeom>
+          <a:noFill/>
+        </p:spPr>
+        <p:txBody>
+          <a:bodyPr wrap="square" rtlCol="0">
+            <a:spAutoFit/>
+          </a:bodyPr>
+          <a:lstStyle/>
+          <a:p>
+            <a:r>
+              <a:rPr lang="en-US" b="1" dirty="0"/>
+              <a:t>😎</a:t>
+            </a:r>
+          </a:p>
+        </p:txBody>
+      </p:sp>
     </p:spTree>
     <p:extLst>
       <p:ext uri="{BB962C8B-B14F-4D97-AF65-F5344CB8AC3E}">
@@ -5273,29 +5537,6 @@
           </a:p>
         </p:txBody>
       </p:sp>
-      <p:sp>
-        <p:nvSpPr>
-          <p:cNvPr id="4" name="Slide Number Placeholder 3"/>
-          <p:cNvSpPr>
-            <a:spLocks noGrp="1"/>
-          </p:cNvSpPr>
-          <p:nvPr>
-            <p:ph type="sldNum" sz="quarter" idx="12"/>
-          </p:nvPr>
-        </p:nvSpPr>
-        <p:spPr/>
-        <p:txBody>
-          <a:bodyPr/>
-          <a:lstStyle/>
-          <a:p>
-            <a:fld id="{FAA41844-C0CA-4144-9D6C-D993F0C0FAB4}" type="slidenum">
-              <a:rPr lang="hr-HR" smtClean="0"/>
-              <a:t>3</a:t>
-            </a:fld>
-            <a:endParaRPr lang="hr-HR"/>
-          </a:p>
-        </p:txBody>
-      </p:sp>
     </p:spTree>
     <p:extLst>
       <p:ext uri="{BB962C8B-B14F-4D97-AF65-F5344CB8AC3E}">
@@ -5326,41 +5567,12 @@
           <a:chExt cx="0" cy="0"/>
         </a:xfrm>
       </p:grpSpPr>
-      <p:sp>
-        <p:nvSpPr>
-          <p:cNvPr id="4" name="Slide Number Placeholder 3">
+      <p:pic>
+        <p:nvPicPr>
+          <p:cNvPr id="10" name="Picture 9" descr="A picture containing shape&#10;&#10;Description automatically generated">
             <a:extLst>
               <a:ext uri="{FF2B5EF4-FFF2-40B4-BE49-F238E27FC236}">
-                <a16:creationId xmlns:a16="http://schemas.microsoft.com/office/drawing/2014/main" id="{3C577C94-D260-0448-6AC2-8E982F65C84E}"/>
-              </a:ext>
-            </a:extLst>
-          </p:cNvPr>
-          <p:cNvSpPr>
-            <a:spLocks noGrp="1"/>
-          </p:cNvSpPr>
-          <p:nvPr>
-            <p:ph type="sldNum" sz="quarter" idx="12"/>
-          </p:nvPr>
-        </p:nvSpPr>
-        <p:spPr/>
-        <p:txBody>
-          <a:bodyPr/>
-          <a:lstStyle/>
-          <a:p>
-            <a:fld id="{FAA41844-C0CA-4144-9D6C-D993F0C0FAB4}" type="slidenum">
-              <a:rPr lang="hr-HR" smtClean="0"/>
-              <a:t>4</a:t>
-            </a:fld>
-            <a:endParaRPr lang="hr-HR"/>
-          </a:p>
-        </p:txBody>
-      </p:sp>
-      <p:pic>
-        <p:nvPicPr>
-          <p:cNvPr id="6" name="Picture 5" descr="A picture containing application&#10;&#10;Description automatically generated">
-            <a:extLst>
-              <a:ext uri="{FF2B5EF4-FFF2-40B4-BE49-F238E27FC236}">
-                <a16:creationId xmlns:a16="http://schemas.microsoft.com/office/drawing/2014/main" id="{2A6622FA-36FF-ABFD-65B2-97076E4B5E06}"/>
+                <a16:creationId xmlns:a16="http://schemas.microsoft.com/office/drawing/2014/main" id="{837EEEFC-BFA1-BDDA-9AA8-FB552547934E}"/>
               </a:ext>
             </a:extLst>
           </p:cNvPr>
@@ -5383,8 +5595,8 @@
         </p:blipFill>
         <p:spPr>
           <a:xfrm>
-            <a:off x="0" y="4429"/>
-            <a:ext cx="9144000" cy="6849141"/>
+            <a:off x="0" y="0"/>
+            <a:ext cx="9144000" cy="6858000"/>
           </a:xfrm>
           <a:prstGeom prst="rect">
             <a:avLst/>
@@ -5393,10 +5605,10 @@
       </p:pic>
       <p:sp>
         <p:nvSpPr>
-          <p:cNvPr id="7" name="Title 1">
+          <p:cNvPr id="11" name="Title 1">
             <a:extLst>
               <a:ext uri="{FF2B5EF4-FFF2-40B4-BE49-F238E27FC236}">
-                <a16:creationId xmlns:a16="http://schemas.microsoft.com/office/drawing/2014/main" id="{63D89438-A3E6-D4A7-046D-A9990A979BA4}"/>
+                <a16:creationId xmlns:a16="http://schemas.microsoft.com/office/drawing/2014/main" id="{AA86832F-F2B3-C482-7320-2650822E5AAA}"/>
               </a:ext>
             </a:extLst>
           </p:cNvPr>
@@ -5444,21 +5656,15 @@
               </a:rPr>
               <a:t> ?</a:t>
             </a:r>
-            <a:endParaRPr lang="hr-HR" baseline="30000" dirty="0">
-              <a:solidFill>
-                <a:schemeClr val="bg1"/>
-              </a:solidFill>
-              <a:latin typeface="PrimaSans BT" panose="020B0803030604020204" pitchFamily="34" charset="0"/>
-            </a:endParaRPr>
           </a:p>
         </p:txBody>
       </p:sp>
       <p:sp>
         <p:nvSpPr>
-          <p:cNvPr id="2" name="TextBox 1">
+          <p:cNvPr id="12" name="TextBox 11">
             <a:extLst>
               <a:ext uri="{FF2B5EF4-FFF2-40B4-BE49-F238E27FC236}">
-                <a16:creationId xmlns:a16="http://schemas.microsoft.com/office/drawing/2014/main" id="{D391DBFA-5073-7E4E-C330-19FFAD49D381}"/>
+                <a16:creationId xmlns:a16="http://schemas.microsoft.com/office/drawing/2014/main" id="{2DBFFB04-01AA-0C77-E9BF-7680292A4C8F}"/>
               </a:ext>
             </a:extLst>
           </p:cNvPr>
@@ -5467,8 +5673,8 @@
         </p:nvSpPr>
         <p:spPr>
           <a:xfrm>
-            <a:off x="4767308" y="511136"/>
-            <a:ext cx="417251" cy="338554"/>
+            <a:off x="4722921" y="444547"/>
+            <a:ext cx="1660124" cy="338554"/>
           </a:xfrm>
           <a:prstGeom prst="rect">
             <a:avLst/>
@@ -5482,25 +5688,22 @@
           <a:lstStyle/>
           <a:p>
             <a:r>
-              <a:rPr lang="en-US" sz="1600" b="0" i="0" dirty="0">
+              <a:rPr lang="en-US" sz="1600" dirty="0">
                 <a:solidFill>
                   <a:schemeClr val="bg1"/>
                 </a:solidFill>
-                <a:effectLst/>
-                <a:latin typeface="arial" panose="020B0604020202020204" pitchFamily="34" charset="0"/>
               </a:rPr>
               <a:t>®</a:t>
             </a:r>
-            <a:endParaRPr lang="en-US" dirty="0"/>
           </a:p>
         </p:txBody>
       </p:sp>
       <p:sp>
         <p:nvSpPr>
-          <p:cNvPr id="3" name="Content Placeholder 2">
+          <p:cNvPr id="13" name="Content Placeholder 2">
             <a:extLst>
               <a:ext uri="{FF2B5EF4-FFF2-40B4-BE49-F238E27FC236}">
-                <a16:creationId xmlns:a16="http://schemas.microsoft.com/office/drawing/2014/main" id="{AB3C6466-63CF-8C7E-5B97-3C30598801D8}"/>
+                <a16:creationId xmlns:a16="http://schemas.microsoft.com/office/drawing/2014/main" id="{2B10E8CC-9103-CB2F-FAB7-5BC90D4F1E25}"/>
               </a:ext>
             </a:extLst>
           </p:cNvPr>
@@ -5526,8 +5729,7 @@
                 <a:solidFill>
                   <a:schemeClr val="bg1"/>
                 </a:solidFill>
-                <a:latin typeface="Segoe UI Semilight" panose="020B0402040204020203" pitchFamily="34" charset="0"/>
-                <a:cs typeface="Segoe UI Semilight" panose="020B0402040204020203" pitchFamily="34" charset="0"/>
+                <a:latin typeface="Bahnschrift SemiBold SemiConden" panose="020B0502040204020203" pitchFamily="34" charset="0"/>
               </a:rPr>
               <a:t>eventko</a:t>
             </a:r>
@@ -5536,43 +5738,262 @@
                 <a:solidFill>
                   <a:schemeClr val="bg1"/>
                 </a:solidFill>
-                <a:latin typeface="Segoe UI Semilight" panose="020B0402040204020203" pitchFamily="34" charset="0"/>
-                <a:cs typeface="Segoe UI Semilight" panose="020B0402040204020203" pitchFamily="34" charset="0"/>
+                <a:latin typeface="Bahnschrift SemiBold SemiConden" panose="020B0502040204020203" pitchFamily="34" charset="0"/>
               </a:rPr>
-              <a:t> je</a:t>
-            </a:r>
-            <a:r>
-              <a:rPr lang="hr-HR" b="1" dirty="0">
-                <a:solidFill>
-                  <a:schemeClr val="bg1"/>
-                </a:solidFill>
-                <a:latin typeface="Segoe UI Semilight" panose="020B0402040204020203" pitchFamily="34" charset="0"/>
-                <a:cs typeface="Segoe UI Semilight" panose="020B0402040204020203" pitchFamily="34" charset="0"/>
-              </a:rPr>
-              <a:t> interaktivni socijalni kalendar </a:t>
-            </a:r>
-          </a:p>
-          <a:p>
-            <a:endParaRPr lang="hr-HR" b="1" dirty="0">
-              <a:solidFill>
-                <a:schemeClr val="bg1"/>
-              </a:solidFill>
-              <a:latin typeface="Segoe UI Semilight" panose="020B0402040204020203" pitchFamily="34" charset="0"/>
-              <a:cs typeface="Segoe UI Semilight" panose="020B0402040204020203" pitchFamily="34" charset="0"/>
-            </a:endParaRPr>
+              <a:t> je interaktivni socijalni kalendar</a:t>
+            </a:r>
           </a:p>
         </p:txBody>
       </p:sp>
+      <p:pic>
+        <p:nvPicPr>
+          <p:cNvPr id="3" name="Picture 2">
+            <a:extLst>
+              <a:ext uri="{FF2B5EF4-FFF2-40B4-BE49-F238E27FC236}">
+                <a16:creationId xmlns:a16="http://schemas.microsoft.com/office/drawing/2014/main" id="{1E0589CE-E754-2A82-B20E-C7B9D5139C21}"/>
+              </a:ext>
+            </a:extLst>
+          </p:cNvPr>
+          <p:cNvPicPr>
+            <a:picLocks noChangeAspect="1"/>
+          </p:cNvPicPr>
+          <p:nvPr/>
+        </p:nvPicPr>
+        <p:blipFill>
+          <a:blip r:embed="rId3"/>
+          <a:stretch>
+            <a:fillRect/>
+          </a:stretch>
+        </p:blipFill>
+        <p:spPr>
+          <a:xfrm>
+            <a:off x="628650" y="2560743"/>
+            <a:ext cx="7634796" cy="3502706"/>
+          </a:xfrm>
+          <a:prstGeom prst="rect">
+            <a:avLst/>
+          </a:prstGeom>
+          <a:ln w="38100" cap="sq">
+            <a:solidFill>
+              <a:srgbClr val="FFFF00"/>
+            </a:solidFill>
+            <a:prstDash val="solid"/>
+            <a:miter lim="800000"/>
+          </a:ln>
+          <a:effectLst>
+            <a:glow rad="101600">
+              <a:schemeClr val="accent4">
+                <a:satMod val="175000"/>
+                <a:alpha val="40000"/>
+              </a:schemeClr>
+            </a:glow>
+            <a:outerShdw blurRad="50800" dist="38100" dir="2700000" algn="tl" rotWithShape="0">
+              <a:prstClr val="black">
+                <a:alpha val="40000"/>
+              </a:prstClr>
+            </a:outerShdw>
+          </a:effectLst>
+        </p:spPr>
+      </p:pic>
     </p:spTree>
     <p:extLst>
       <p:ext uri="{BB962C8B-B14F-4D97-AF65-F5344CB8AC3E}">
-        <p14:creationId xmlns:p14="http://schemas.microsoft.com/office/powerpoint/2010/main" val="3753394589"/>
+        <p14:creationId xmlns:p14="http://schemas.microsoft.com/office/powerpoint/2010/main" val="1428908178"/>
       </p:ext>
     </p:extLst>
   </p:cSld>
   <p:clrMapOvr>
     <a:masterClrMapping/>
   </p:clrMapOvr>
+  <p:timing>
+    <p:tnLst>
+      <p:par>
+        <p:cTn id="1" dur="indefinite" restart="never" nodeType="tmRoot">
+          <p:childTnLst>
+            <p:seq concurrent="1" nextAc="seek">
+              <p:cTn id="2" dur="indefinite" nodeType="mainSeq">
+                <p:childTnLst>
+                  <p:par>
+                    <p:cTn id="3" fill="hold">
+                      <p:stCondLst>
+                        <p:cond delay="indefinite"/>
+                      </p:stCondLst>
+                      <p:childTnLst>
+                        <p:par>
+                          <p:cTn id="4" fill="hold">
+                            <p:stCondLst>
+                              <p:cond delay="0"/>
+                            </p:stCondLst>
+                            <p:childTnLst>
+                              <p:par>
+                                <p:cTn id="5" presetID="2" presetClass="entr" presetSubtype="8" fill="hold" grpId="0" nodeType="clickEffect">
+                                  <p:stCondLst>
+                                    <p:cond delay="0"/>
+                                  </p:stCondLst>
+                                  <p:childTnLst>
+                                    <p:set>
+                                      <p:cBhvr>
+                                        <p:cTn id="6" dur="1" fill="hold">
+                                          <p:stCondLst>
+                                            <p:cond delay="0"/>
+                                          </p:stCondLst>
+                                        </p:cTn>
+                                        <p:tgtEl>
+                                          <p:spTgt spid="13">
+                                            <p:txEl>
+                                              <p:pRg st="0" end="0"/>
+                                            </p:txEl>
+                                          </p:spTgt>
+                                        </p:tgtEl>
+                                        <p:attrNameLst>
+                                          <p:attrName>style.visibility</p:attrName>
+                                        </p:attrNameLst>
+                                      </p:cBhvr>
+                                      <p:to>
+                                        <p:strVal val="visible"/>
+                                      </p:to>
+                                    </p:set>
+                                    <p:anim calcmode="lin" valueType="num">
+                                      <p:cBhvr additive="base">
+                                        <p:cTn id="7" dur="500" fill="hold"/>
+                                        <p:tgtEl>
+                                          <p:spTgt spid="13">
+                                            <p:txEl>
+                                              <p:pRg st="0" end="0"/>
+                                            </p:txEl>
+                                          </p:spTgt>
+                                        </p:tgtEl>
+                                        <p:attrNameLst>
+                                          <p:attrName>ppt_x</p:attrName>
+                                        </p:attrNameLst>
+                                      </p:cBhvr>
+                                      <p:tavLst>
+                                        <p:tav tm="0">
+                                          <p:val>
+                                            <p:strVal val="0-#ppt_w/2"/>
+                                          </p:val>
+                                        </p:tav>
+                                        <p:tav tm="100000">
+                                          <p:val>
+                                            <p:strVal val="#ppt_x"/>
+                                          </p:val>
+                                        </p:tav>
+                                      </p:tavLst>
+                                    </p:anim>
+                                    <p:anim calcmode="lin" valueType="num">
+                                      <p:cBhvr additive="base">
+                                        <p:cTn id="8" dur="500" fill="hold"/>
+                                        <p:tgtEl>
+                                          <p:spTgt spid="13">
+                                            <p:txEl>
+                                              <p:pRg st="0" end="0"/>
+                                            </p:txEl>
+                                          </p:spTgt>
+                                        </p:tgtEl>
+                                        <p:attrNameLst>
+                                          <p:attrName>ppt_y</p:attrName>
+                                        </p:attrNameLst>
+                                      </p:cBhvr>
+                                      <p:tavLst>
+                                        <p:tav tm="0">
+                                          <p:val>
+                                            <p:strVal val="#ppt_y"/>
+                                          </p:val>
+                                        </p:tav>
+                                        <p:tav tm="100000">
+                                          <p:val>
+                                            <p:strVal val="#ppt_y"/>
+                                          </p:val>
+                                        </p:tav>
+                                      </p:tavLst>
+                                    </p:anim>
+                                  </p:childTnLst>
+                                </p:cTn>
+                              </p:par>
+                            </p:childTnLst>
+                          </p:cTn>
+                        </p:par>
+                      </p:childTnLst>
+                    </p:cTn>
+                  </p:par>
+                  <p:par>
+                    <p:cTn id="9" fill="hold">
+                      <p:stCondLst>
+                        <p:cond delay="indefinite"/>
+                      </p:stCondLst>
+                      <p:childTnLst>
+                        <p:par>
+                          <p:cTn id="10" fill="hold">
+                            <p:stCondLst>
+                              <p:cond delay="0"/>
+                            </p:stCondLst>
+                            <p:childTnLst>
+                              <p:par>
+                                <p:cTn id="11" presetID="22" presetClass="entr" presetSubtype="4" fill="hold" nodeType="clickEffect">
+                                  <p:stCondLst>
+                                    <p:cond delay="0"/>
+                                  </p:stCondLst>
+                                  <p:childTnLst>
+                                    <p:set>
+                                      <p:cBhvr>
+                                        <p:cTn id="12" dur="1" fill="hold">
+                                          <p:stCondLst>
+                                            <p:cond delay="0"/>
+                                          </p:stCondLst>
+                                        </p:cTn>
+                                        <p:tgtEl>
+                                          <p:spTgt spid="3"/>
+                                        </p:tgtEl>
+                                        <p:attrNameLst>
+                                          <p:attrName>style.visibility</p:attrName>
+                                        </p:attrNameLst>
+                                      </p:cBhvr>
+                                      <p:to>
+                                        <p:strVal val="visible"/>
+                                      </p:to>
+                                    </p:set>
+                                    <p:animEffect transition="in" filter="wipe(down)">
+                                      <p:cBhvr>
+                                        <p:cTn id="13" dur="750"/>
+                                        <p:tgtEl>
+                                          <p:spTgt spid="3"/>
+                                        </p:tgtEl>
+                                      </p:cBhvr>
+                                    </p:animEffect>
+                                  </p:childTnLst>
+                                </p:cTn>
+                              </p:par>
+                            </p:childTnLst>
+                          </p:cTn>
+                        </p:par>
+                      </p:childTnLst>
+                    </p:cTn>
+                  </p:par>
+                </p:childTnLst>
+              </p:cTn>
+              <p:prevCondLst>
+                <p:cond evt="onPrev" delay="0">
+                  <p:tgtEl>
+                    <p:sldTgt/>
+                  </p:tgtEl>
+                </p:cond>
+              </p:prevCondLst>
+              <p:nextCondLst>
+                <p:cond evt="onNext" delay="0">
+                  <p:tgtEl>
+                    <p:sldTgt/>
+                  </p:tgtEl>
+                </p:cond>
+              </p:nextCondLst>
+            </p:seq>
+          </p:childTnLst>
+        </p:cTn>
+      </p:par>
+    </p:tnLst>
+    <p:bldLst>
+      <p:bldP spid="13" grpId="0" build="p"/>
+    </p:bldLst>
+  </p:timing>
 </p:sld>
 </file>
 
@@ -5593,9 +6014,51 @@
           <a:chExt cx="0" cy="0"/>
         </a:xfrm>
       </p:grpSpPr>
+      <p:pic>
+        <p:nvPicPr>
+          <p:cNvPr id="10" name="Picture 9" descr="A picture containing shape&#10;&#10;Description automatically generated">
+            <a:extLst>
+              <a:ext uri="{FF2B5EF4-FFF2-40B4-BE49-F238E27FC236}">
+                <a16:creationId xmlns:a16="http://schemas.microsoft.com/office/drawing/2014/main" id="{837EEEFC-BFA1-BDDA-9AA8-FB552547934E}"/>
+              </a:ext>
+            </a:extLst>
+          </p:cNvPr>
+          <p:cNvPicPr>
+            <a:picLocks noChangeAspect="1"/>
+          </p:cNvPicPr>
+          <p:nvPr/>
+        </p:nvPicPr>
+        <p:blipFill>
+          <a:blip r:embed="rId2">
+            <a:extLst>
+              <a:ext uri="{28A0092B-C50C-407E-A947-70E740481C1C}">
+                <a14:useLocalDpi xmlns:a14="http://schemas.microsoft.com/office/drawing/2010/main" val="0"/>
+              </a:ext>
+            </a:extLst>
+          </a:blip>
+          <a:stretch>
+            <a:fillRect/>
+          </a:stretch>
+        </p:blipFill>
+        <p:spPr>
+          <a:xfrm>
+            <a:off x="0" y="0"/>
+            <a:ext cx="9144000" cy="6858000"/>
+          </a:xfrm>
+          <a:prstGeom prst="rect">
+            <a:avLst/>
+          </a:prstGeom>
+        </p:spPr>
+      </p:pic>
       <p:sp>
         <p:nvSpPr>
-          <p:cNvPr id="2" name="Title 1"/>
+          <p:cNvPr id="11" name="Title 1">
+            <a:extLst>
+              <a:ext uri="{FF2B5EF4-FFF2-40B4-BE49-F238E27FC236}">
+                <a16:creationId xmlns:a16="http://schemas.microsoft.com/office/drawing/2014/main" id="{AA86832F-F2B3-C482-7320-2650822E5AAA}"/>
+              </a:ext>
+            </a:extLst>
+          </p:cNvPr>
           <p:cNvSpPr>
             <a:spLocks noGrp="1"/>
           </p:cNvSpPr>
@@ -5603,21 +6066,39 @@
             <p:ph type="title"/>
           </p:nvPr>
         </p:nvSpPr>
-        <p:spPr/>
+        <p:spPr>
+          <a:xfrm>
+            <a:off x="628650" y="365127"/>
+            <a:ext cx="7886700" cy="844838"/>
+          </a:xfrm>
+        </p:spPr>
         <p:txBody>
-          <a:bodyPr/>
+          <a:bodyPr>
+            <a:noAutofit/>
+          </a:bodyPr>
           <a:lstStyle/>
           <a:p>
             <a:r>
-              <a:rPr lang="hr-HR" dirty="0"/>
-              <a:t>Opis zadatka</a:t>
+              <a:rPr lang="hr-HR" sz="3200" dirty="0">
+                <a:solidFill>
+                  <a:schemeClr val="bg1"/>
+                </a:solidFill>
+                <a:latin typeface="PrimaSans BT" panose="020B0803030604020204" pitchFamily="34" charset="0"/>
+              </a:rPr>
+              <a:t>Interaktivni socijalni kalendar???</a:t>
             </a:r>
           </a:p>
         </p:txBody>
       </p:sp>
       <p:sp>
         <p:nvSpPr>
-          <p:cNvPr id="3" name="Content Placeholder 2"/>
+          <p:cNvPr id="13" name="Content Placeholder 2">
+            <a:extLst>
+              <a:ext uri="{FF2B5EF4-FFF2-40B4-BE49-F238E27FC236}">
+                <a16:creationId xmlns:a16="http://schemas.microsoft.com/office/drawing/2014/main" id="{2B10E8CC-9103-CB2F-FAB7-5BC90D4F1E25}"/>
+              </a:ext>
+            </a:extLst>
+          </p:cNvPr>
           <p:cNvSpPr>
             <a:spLocks noGrp="1"/>
           </p:cNvSpPr>
@@ -5625,64 +6106,402 @@
             <p:ph idx="1"/>
           </p:nvPr>
         </p:nvSpPr>
-        <p:spPr/>
+        <p:spPr>
+          <a:xfrm>
+            <a:off x="628650" y="1395554"/>
+            <a:ext cx="7886700" cy="4931327"/>
+          </a:xfrm>
+        </p:spPr>
         <p:txBody>
           <a:bodyPr/>
           <a:lstStyle/>
           <a:p>
             <a:r>
-              <a:rPr lang="hr-HR" dirty="0"/>
-              <a:t>Ukratko iznesite osnovnu ideju, cilj i svrhu razvoja vašeg projekta</a:t>
-            </a:r>
-          </a:p>
-          <a:p>
-            <a:r>
-              <a:rPr lang="hr-HR" dirty="0"/>
-              <a:t>Postoji li na tržištu sličan programski proizvod?</a:t>
-            </a:r>
-          </a:p>
-          <a:p>
-            <a:pPr lvl="1"/>
-            <a:r>
-              <a:rPr lang="hr-HR" dirty="0"/>
-              <a:t>Usporedite značajke</a:t>
-            </a:r>
-          </a:p>
-        </p:txBody>
-      </p:sp>
-      <p:sp>
-        <p:nvSpPr>
-          <p:cNvPr id="4" name="Slide Number Placeholder 3"/>
-          <p:cNvSpPr>
-            <a:spLocks noGrp="1"/>
-          </p:cNvSpPr>
-          <p:nvPr>
-            <p:ph type="sldNum" sz="quarter" idx="12"/>
-          </p:nvPr>
-        </p:nvSpPr>
-        <p:spPr/>
-        <p:txBody>
-          <a:bodyPr/>
-          <a:lstStyle/>
-          <a:p>
-            <a:fld id="{FAA41844-C0CA-4144-9D6C-D993F0C0FAB4}" type="slidenum">
-              <a:rPr lang="hr-HR" smtClean="0"/>
-              <a:t>5</a:t>
-            </a:fld>
-            <a:endParaRPr lang="hr-HR"/>
+              <a:rPr lang="hr-HR" dirty="0">
+                <a:solidFill>
+                  <a:schemeClr val="bg1"/>
+                </a:solidFill>
+                <a:latin typeface="Bahnschrift SemiBold SemiConden" panose="020B0502040204020203" pitchFamily="34" charset="0"/>
+              </a:rPr>
+              <a:t>Svaki korisnik ima priliku stvoriti vlastite evente u kalendaru i na određene načine stupiti u interakciju s tuđim javnim, odnosno privatnim eventima</a:t>
+            </a:r>
+          </a:p>
+          <a:p>
+            <a:r>
+              <a:rPr lang="hr-HR" dirty="0">
+                <a:solidFill>
+                  <a:schemeClr val="bg1"/>
+                </a:solidFill>
+                <a:latin typeface="Bahnschrift SemiBold SemiConden" panose="020B0502040204020203" pitchFamily="34" charset="0"/>
+              </a:rPr>
+              <a:t>Korisnici su dakle povezani, ali opet svatko ima izbor uređivati vlastiti kalendar po izboru</a:t>
+            </a:r>
+          </a:p>
+          <a:p>
+            <a:r>
+              <a:rPr lang="hr-HR" dirty="0">
+                <a:solidFill>
+                  <a:schemeClr val="bg1"/>
+                </a:solidFill>
+                <a:latin typeface="Bahnschrift SemiBold SemiConden" panose="020B0502040204020203" pitchFamily="34" charset="0"/>
+              </a:rPr>
+              <a:t>Zbog toga korisnik nije zatrpan sadržajem drugih korisnika, kao što je to na modernim socijalnim mrežama, ali opet ima uvid u ono što drugi organiziraju</a:t>
+            </a:r>
           </a:p>
         </p:txBody>
       </p:sp>
     </p:spTree>
     <p:extLst>
       <p:ext uri="{BB962C8B-B14F-4D97-AF65-F5344CB8AC3E}">
-        <p14:creationId xmlns:p14="http://schemas.microsoft.com/office/powerpoint/2010/main" val="1428908178"/>
+        <p14:creationId xmlns:p14="http://schemas.microsoft.com/office/powerpoint/2010/main" val="1001290699"/>
       </p:ext>
     </p:extLst>
   </p:cSld>
   <p:clrMapOvr>
     <a:masterClrMapping/>
   </p:clrMapOvr>
+  <p:timing>
+    <p:tnLst>
+      <p:par>
+        <p:cTn id="1" dur="indefinite" restart="never" nodeType="tmRoot">
+          <p:childTnLst>
+            <p:seq concurrent="1" nextAc="seek">
+              <p:cTn id="2" dur="indefinite" nodeType="mainSeq">
+                <p:childTnLst>
+                  <p:par>
+                    <p:cTn id="3" fill="hold">
+                      <p:stCondLst>
+                        <p:cond delay="indefinite"/>
+                      </p:stCondLst>
+                      <p:childTnLst>
+                        <p:par>
+                          <p:cTn id="4" fill="hold">
+                            <p:stCondLst>
+                              <p:cond delay="0"/>
+                            </p:stCondLst>
+                            <p:childTnLst>
+                              <p:par>
+                                <p:cTn id="5" presetID="2" presetClass="entr" presetSubtype="8" fill="hold" grpId="0" nodeType="clickEffect">
+                                  <p:stCondLst>
+                                    <p:cond delay="0"/>
+                                  </p:stCondLst>
+                                  <p:childTnLst>
+                                    <p:set>
+                                      <p:cBhvr>
+                                        <p:cTn id="6" dur="1" fill="hold">
+                                          <p:stCondLst>
+                                            <p:cond delay="0"/>
+                                          </p:stCondLst>
+                                        </p:cTn>
+                                        <p:tgtEl>
+                                          <p:spTgt spid="13">
+                                            <p:txEl>
+                                              <p:pRg st="0" end="0"/>
+                                            </p:txEl>
+                                          </p:spTgt>
+                                        </p:tgtEl>
+                                        <p:attrNameLst>
+                                          <p:attrName>style.visibility</p:attrName>
+                                        </p:attrNameLst>
+                                      </p:cBhvr>
+                                      <p:to>
+                                        <p:strVal val="visible"/>
+                                      </p:to>
+                                    </p:set>
+                                    <p:anim calcmode="lin" valueType="num">
+                                      <p:cBhvr additive="base">
+                                        <p:cTn id="7" dur="250" fill="hold"/>
+                                        <p:tgtEl>
+                                          <p:spTgt spid="13">
+                                            <p:txEl>
+                                              <p:pRg st="0" end="0"/>
+                                            </p:txEl>
+                                          </p:spTgt>
+                                        </p:tgtEl>
+                                        <p:attrNameLst>
+                                          <p:attrName>ppt_x</p:attrName>
+                                        </p:attrNameLst>
+                                      </p:cBhvr>
+                                      <p:tavLst>
+                                        <p:tav tm="0">
+                                          <p:val>
+                                            <p:strVal val="0-#ppt_w/2"/>
+                                          </p:val>
+                                        </p:tav>
+                                        <p:tav tm="100000">
+                                          <p:val>
+                                            <p:strVal val="#ppt_x"/>
+                                          </p:val>
+                                        </p:tav>
+                                      </p:tavLst>
+                                    </p:anim>
+                                    <p:anim calcmode="lin" valueType="num">
+                                      <p:cBhvr additive="base">
+                                        <p:cTn id="8" dur="250" fill="hold"/>
+                                        <p:tgtEl>
+                                          <p:spTgt spid="13">
+                                            <p:txEl>
+                                              <p:pRg st="0" end="0"/>
+                                            </p:txEl>
+                                          </p:spTgt>
+                                        </p:tgtEl>
+                                        <p:attrNameLst>
+                                          <p:attrName>ppt_y</p:attrName>
+                                        </p:attrNameLst>
+                                      </p:cBhvr>
+                                      <p:tavLst>
+                                        <p:tav tm="0">
+                                          <p:val>
+                                            <p:strVal val="#ppt_y"/>
+                                          </p:val>
+                                        </p:tav>
+                                        <p:tav tm="100000">
+                                          <p:val>
+                                            <p:strVal val="#ppt_y"/>
+                                          </p:val>
+                                        </p:tav>
+                                      </p:tavLst>
+                                    </p:anim>
+                                  </p:childTnLst>
+                                </p:cTn>
+                              </p:par>
+                            </p:childTnLst>
+                          </p:cTn>
+                        </p:par>
+                      </p:childTnLst>
+                    </p:cTn>
+                  </p:par>
+                  <p:par>
+                    <p:cTn id="9" fill="hold">
+                      <p:stCondLst>
+                        <p:cond delay="indefinite"/>
+                      </p:stCondLst>
+                      <p:childTnLst>
+                        <p:par>
+                          <p:cTn id="10" fill="hold">
+                            <p:stCondLst>
+                              <p:cond delay="0"/>
+                            </p:stCondLst>
+                            <p:childTnLst>
+                              <p:par>
+                                <p:cTn id="11" presetID="2" presetClass="entr" presetSubtype="8" fill="hold" grpId="0" nodeType="clickEffect">
+                                  <p:stCondLst>
+                                    <p:cond delay="0"/>
+                                  </p:stCondLst>
+                                  <p:childTnLst>
+                                    <p:set>
+                                      <p:cBhvr>
+                                        <p:cTn id="12" dur="1" fill="hold">
+                                          <p:stCondLst>
+                                            <p:cond delay="0"/>
+                                          </p:stCondLst>
+                                        </p:cTn>
+                                        <p:tgtEl>
+                                          <p:spTgt spid="13">
+                                            <p:txEl>
+                                              <p:pRg st="1" end="1"/>
+                                            </p:txEl>
+                                          </p:spTgt>
+                                        </p:tgtEl>
+                                        <p:attrNameLst>
+                                          <p:attrName>style.visibility</p:attrName>
+                                        </p:attrNameLst>
+                                      </p:cBhvr>
+                                      <p:to>
+                                        <p:strVal val="visible"/>
+                                      </p:to>
+                                    </p:set>
+                                    <p:anim calcmode="lin" valueType="num">
+                                      <p:cBhvr additive="base">
+                                        <p:cTn id="13" dur="250" fill="hold"/>
+                                        <p:tgtEl>
+                                          <p:spTgt spid="13">
+                                            <p:txEl>
+                                              <p:pRg st="1" end="1"/>
+                                            </p:txEl>
+                                          </p:spTgt>
+                                        </p:tgtEl>
+                                        <p:attrNameLst>
+                                          <p:attrName>ppt_x</p:attrName>
+                                        </p:attrNameLst>
+                                      </p:cBhvr>
+                                      <p:tavLst>
+                                        <p:tav tm="0">
+                                          <p:val>
+                                            <p:strVal val="0-#ppt_w/2"/>
+                                          </p:val>
+                                        </p:tav>
+                                        <p:tav tm="100000">
+                                          <p:val>
+                                            <p:strVal val="#ppt_x"/>
+                                          </p:val>
+                                        </p:tav>
+                                      </p:tavLst>
+                                    </p:anim>
+                                    <p:anim calcmode="lin" valueType="num">
+                                      <p:cBhvr additive="base">
+                                        <p:cTn id="14" dur="250" fill="hold"/>
+                                        <p:tgtEl>
+                                          <p:spTgt spid="13">
+                                            <p:txEl>
+                                              <p:pRg st="1" end="1"/>
+                                            </p:txEl>
+                                          </p:spTgt>
+                                        </p:tgtEl>
+                                        <p:attrNameLst>
+                                          <p:attrName>ppt_y</p:attrName>
+                                        </p:attrNameLst>
+                                      </p:cBhvr>
+                                      <p:tavLst>
+                                        <p:tav tm="0">
+                                          <p:val>
+                                            <p:strVal val="#ppt_y"/>
+                                          </p:val>
+                                        </p:tav>
+                                        <p:tav tm="100000">
+                                          <p:val>
+                                            <p:strVal val="#ppt_y"/>
+                                          </p:val>
+                                        </p:tav>
+                                      </p:tavLst>
+                                    </p:anim>
+                                  </p:childTnLst>
+                                </p:cTn>
+                              </p:par>
+                            </p:childTnLst>
+                          </p:cTn>
+                        </p:par>
+                      </p:childTnLst>
+                    </p:cTn>
+                  </p:par>
+                  <p:par>
+                    <p:cTn id="15" fill="hold">
+                      <p:stCondLst>
+                        <p:cond delay="indefinite"/>
+                      </p:stCondLst>
+                      <p:childTnLst>
+                        <p:par>
+                          <p:cTn id="16" fill="hold">
+                            <p:stCondLst>
+                              <p:cond delay="0"/>
+                            </p:stCondLst>
+                            <p:childTnLst>
+                              <p:par>
+                                <p:cTn id="17" presetID="2" presetClass="entr" presetSubtype="8" fill="hold" grpId="0" nodeType="clickEffect">
+                                  <p:stCondLst>
+                                    <p:cond delay="0"/>
+                                  </p:stCondLst>
+                                  <p:childTnLst>
+                                    <p:set>
+                                      <p:cBhvr>
+                                        <p:cTn id="18" dur="1" fill="hold">
+                                          <p:stCondLst>
+                                            <p:cond delay="0"/>
+                                          </p:stCondLst>
+                                        </p:cTn>
+                                        <p:tgtEl>
+                                          <p:spTgt spid="13">
+                                            <p:txEl>
+                                              <p:pRg st="2" end="2"/>
+                                            </p:txEl>
+                                          </p:spTgt>
+                                        </p:tgtEl>
+                                        <p:attrNameLst>
+                                          <p:attrName>style.visibility</p:attrName>
+                                        </p:attrNameLst>
+                                      </p:cBhvr>
+                                      <p:to>
+                                        <p:strVal val="visible"/>
+                                      </p:to>
+                                    </p:set>
+                                    <p:anim calcmode="lin" valueType="num">
+                                      <p:cBhvr additive="base">
+                                        <p:cTn id="19" dur="250" fill="hold"/>
+                                        <p:tgtEl>
+                                          <p:spTgt spid="13">
+                                            <p:txEl>
+                                              <p:pRg st="2" end="2"/>
+                                            </p:txEl>
+                                          </p:spTgt>
+                                        </p:tgtEl>
+                                        <p:attrNameLst>
+                                          <p:attrName>ppt_x</p:attrName>
+                                        </p:attrNameLst>
+                                      </p:cBhvr>
+                                      <p:tavLst>
+                                        <p:tav tm="0">
+                                          <p:val>
+                                            <p:strVal val="0-#ppt_w/2"/>
+                                          </p:val>
+                                        </p:tav>
+                                        <p:tav tm="100000">
+                                          <p:val>
+                                            <p:strVal val="#ppt_x"/>
+                                          </p:val>
+                                        </p:tav>
+                                      </p:tavLst>
+                                    </p:anim>
+                                    <p:anim calcmode="lin" valueType="num">
+                                      <p:cBhvr additive="base">
+                                        <p:cTn id="20" dur="250" fill="hold"/>
+                                        <p:tgtEl>
+                                          <p:spTgt spid="13">
+                                            <p:txEl>
+                                              <p:pRg st="2" end="2"/>
+                                            </p:txEl>
+                                          </p:spTgt>
+                                        </p:tgtEl>
+                                        <p:attrNameLst>
+                                          <p:attrName>ppt_y</p:attrName>
+                                        </p:attrNameLst>
+                                      </p:cBhvr>
+                                      <p:tavLst>
+                                        <p:tav tm="0">
+                                          <p:val>
+                                            <p:strVal val="#ppt_y"/>
+                                          </p:val>
+                                        </p:tav>
+                                        <p:tav tm="100000">
+                                          <p:val>
+                                            <p:strVal val="#ppt_y"/>
+                                          </p:val>
+                                        </p:tav>
+                                      </p:tavLst>
+                                    </p:anim>
+                                  </p:childTnLst>
+                                </p:cTn>
+                              </p:par>
+                            </p:childTnLst>
+                          </p:cTn>
+                        </p:par>
+                      </p:childTnLst>
+                    </p:cTn>
+                  </p:par>
+                </p:childTnLst>
+              </p:cTn>
+              <p:prevCondLst>
+                <p:cond evt="onPrev" delay="0">
+                  <p:tgtEl>
+                    <p:sldTgt/>
+                  </p:tgtEl>
+                </p:cond>
+              </p:prevCondLst>
+              <p:nextCondLst>
+                <p:cond evt="onNext" delay="0">
+                  <p:tgtEl>
+                    <p:sldTgt/>
+                  </p:tgtEl>
+                </p:cond>
+              </p:nextCondLst>
+            </p:seq>
+          </p:childTnLst>
+        </p:cTn>
+      </p:par>
+    </p:tnLst>
+    <p:bldLst>
+      <p:bldP spid="13" grpId="0" build="p"/>
+    </p:bldLst>
+  </p:timing>
 </p:sld>
 </file>
 
@@ -5703,9 +6522,51 @@
           <a:chExt cx="0" cy="0"/>
         </a:xfrm>
       </p:grpSpPr>
+      <p:pic>
+        <p:nvPicPr>
+          <p:cNvPr id="10" name="Picture 9" descr="A picture containing shape&#10;&#10;Description automatically generated">
+            <a:extLst>
+              <a:ext uri="{FF2B5EF4-FFF2-40B4-BE49-F238E27FC236}">
+                <a16:creationId xmlns:a16="http://schemas.microsoft.com/office/drawing/2014/main" id="{837EEEFC-BFA1-BDDA-9AA8-FB552547934E}"/>
+              </a:ext>
+            </a:extLst>
+          </p:cNvPr>
+          <p:cNvPicPr>
+            <a:picLocks noChangeAspect="1"/>
+          </p:cNvPicPr>
+          <p:nvPr/>
+        </p:nvPicPr>
+        <p:blipFill>
+          <a:blip r:embed="rId2">
+            <a:extLst>
+              <a:ext uri="{28A0092B-C50C-407E-A947-70E740481C1C}">
+                <a14:useLocalDpi xmlns:a14="http://schemas.microsoft.com/office/drawing/2010/main" val="0"/>
+              </a:ext>
+            </a:extLst>
+          </a:blip>
+          <a:stretch>
+            <a:fillRect/>
+          </a:stretch>
+        </p:blipFill>
+        <p:spPr>
+          <a:xfrm>
+            <a:off x="0" y="0"/>
+            <a:ext cx="9144000" cy="6858000"/>
+          </a:xfrm>
+          <a:prstGeom prst="rect">
+            <a:avLst/>
+          </a:prstGeom>
+        </p:spPr>
+      </p:pic>
       <p:sp>
         <p:nvSpPr>
-          <p:cNvPr id="2" name="Title 1"/>
+          <p:cNvPr id="11" name="Title 1">
+            <a:extLst>
+              <a:ext uri="{FF2B5EF4-FFF2-40B4-BE49-F238E27FC236}">
+                <a16:creationId xmlns:a16="http://schemas.microsoft.com/office/drawing/2014/main" id="{AA86832F-F2B3-C482-7320-2650822E5AAA}"/>
+              </a:ext>
+            </a:extLst>
+          </p:cNvPr>
           <p:cNvSpPr>
             <a:spLocks noGrp="1"/>
           </p:cNvSpPr>
@@ -5713,21 +6574,39 @@
             <p:ph type="title"/>
           </p:nvPr>
         </p:nvSpPr>
-        <p:spPr/>
+        <p:spPr>
+          <a:xfrm>
+            <a:off x="628650" y="365127"/>
+            <a:ext cx="7886700" cy="844838"/>
+          </a:xfrm>
+        </p:spPr>
         <p:txBody>
-          <a:bodyPr/>
+          <a:bodyPr>
+            <a:noAutofit/>
+          </a:bodyPr>
           <a:lstStyle/>
           <a:p>
             <a:r>
-              <a:rPr lang="hr-HR" dirty="0"/>
-              <a:t>Pregled zahtjeva</a:t>
+              <a:rPr lang="hr-HR" sz="3200" dirty="0">
+                <a:solidFill>
+                  <a:schemeClr val="bg1"/>
+                </a:solidFill>
+                <a:latin typeface="PrimaSans BT" panose="020B0803030604020204" pitchFamily="34" charset="0"/>
+              </a:rPr>
+              <a:t>Što je event?</a:t>
             </a:r>
           </a:p>
         </p:txBody>
       </p:sp>
       <p:sp>
         <p:nvSpPr>
-          <p:cNvPr id="3" name="Content Placeholder 2"/>
+          <p:cNvPr id="13" name="Content Placeholder 2">
+            <a:extLst>
+              <a:ext uri="{FF2B5EF4-FFF2-40B4-BE49-F238E27FC236}">
+                <a16:creationId xmlns:a16="http://schemas.microsoft.com/office/drawing/2014/main" id="{2B10E8CC-9103-CB2F-FAB7-5BC90D4F1E25}"/>
+              </a:ext>
+            </a:extLst>
+          </p:cNvPr>
           <p:cNvSpPr>
             <a:spLocks noGrp="1"/>
           </p:cNvSpPr>
@@ -5735,73 +6614,977 @@
             <p:ph idx="1"/>
           </p:nvPr>
         </p:nvSpPr>
-        <p:spPr/>
+        <p:spPr>
+          <a:xfrm>
+            <a:off x="628650" y="1395554"/>
+            <a:ext cx="7886700" cy="4931327"/>
+          </a:xfrm>
+        </p:spPr>
         <p:txBody>
           <a:bodyPr/>
           <a:lstStyle/>
           <a:p>
             <a:r>
-              <a:rPr lang="hr-HR" dirty="0"/>
-              <a:t>Lista glavnih funkcionalnih zahtjeva (</a:t>
-            </a:r>
-            <a:r>
-              <a:rPr lang="hr-HR" dirty="0" err="1"/>
-              <a:t>max</a:t>
-            </a:r>
-            <a:r>
-              <a:rPr lang="hr-HR" dirty="0"/>
-              <a:t> 1 slajd)</a:t>
-            </a:r>
-          </a:p>
-          <a:p>
-            <a:r>
-              <a:rPr lang="hr-HR" dirty="0"/>
-              <a:t>Nefunkcionalni i zahtjevi domene primjene (</a:t>
-            </a:r>
-            <a:r>
-              <a:rPr lang="hr-HR" dirty="0" err="1"/>
-              <a:t>max</a:t>
-            </a:r>
-            <a:r>
-              <a:rPr lang="hr-HR" dirty="0"/>
-              <a:t> 1 slajd)</a:t>
-            </a:r>
+              <a:rPr lang="hr-HR" dirty="0">
+                <a:solidFill>
+                  <a:schemeClr val="bg1"/>
+                </a:solidFill>
+                <a:latin typeface="Bahnschrift SemiBold SemiConden" panose="020B0502040204020203" pitchFamily="34" charset="0"/>
+              </a:rPr>
+              <a:t>Event može biti </a:t>
+            </a:r>
+          </a:p>
+          <a:p>
+            <a:pPr lvl="1"/>
+            <a:r>
+              <a:rPr lang="hr-HR" sz="2800" dirty="0">
+                <a:solidFill>
+                  <a:schemeClr val="accent5">
+                    <a:lumMod val="60000"/>
+                    <a:lumOff val="40000"/>
+                  </a:schemeClr>
+                </a:solidFill>
+                <a:effectLst>
+                  <a:outerShdw blurRad="38100" dist="38100" dir="2700000" algn="tl">
+                    <a:srgbClr val="000000">
+                      <a:alpha val="43137"/>
+                    </a:srgbClr>
+                  </a:outerShdw>
+                </a:effectLst>
+                <a:latin typeface="Bahnschrift SemiBold SemiConden" panose="020B0502040204020203" pitchFamily="34" charset="0"/>
+              </a:rPr>
+              <a:t>Obaveza</a:t>
+            </a:r>
+          </a:p>
+          <a:p>
+            <a:pPr lvl="2"/>
+            <a:r>
+              <a:rPr lang="hr-HR" sz="2000" dirty="0">
+                <a:solidFill>
+                  <a:schemeClr val="bg1"/>
+                </a:solidFill>
+                <a:latin typeface="Bahnschrift SemiBold SemiConden" panose="020B0502040204020203" pitchFamily="34" charset="0"/>
+              </a:rPr>
+              <a:t>Nešto što korisnik stavlja u kalendar isključivo za sebe</a:t>
+            </a:r>
+          </a:p>
+          <a:p>
+            <a:pPr lvl="1"/>
+            <a:r>
+              <a:rPr lang="hr-HR" sz="2800" dirty="0">
+                <a:solidFill>
+                  <a:srgbClr val="00FF99"/>
+                </a:solidFill>
+                <a:effectLst>
+                  <a:outerShdw blurRad="38100" dist="38100" dir="2700000" algn="tl">
+                    <a:srgbClr val="000000">
+                      <a:alpha val="43137"/>
+                    </a:srgbClr>
+                  </a:outerShdw>
+                </a:effectLst>
+                <a:latin typeface="Bahnschrift SemiBold SemiConden" panose="020B0502040204020203" pitchFamily="34" charset="0"/>
+              </a:rPr>
+              <a:t>Privatni</a:t>
+            </a:r>
+          </a:p>
+          <a:p>
+            <a:pPr lvl="2"/>
+            <a:r>
+              <a:rPr lang="hr-HR" sz="2000" dirty="0">
+                <a:solidFill>
+                  <a:schemeClr val="bg1"/>
+                </a:solidFill>
+                <a:latin typeface="Bahnschrift SemiBold SemiConden" panose="020B0502040204020203" pitchFamily="34" charset="0"/>
+              </a:rPr>
+              <a:t>Eventi namijenjeni za korisnika i njegove prijatelje</a:t>
+            </a:r>
+            <a:endParaRPr lang="hr-HR" sz="2400" dirty="0">
+              <a:solidFill>
+                <a:srgbClr val="00FF99"/>
+              </a:solidFill>
+              <a:effectLst>
+                <a:outerShdw blurRad="38100" dist="38100" dir="2700000" algn="tl">
+                  <a:srgbClr val="000000">
+                    <a:alpha val="43137"/>
+                  </a:srgbClr>
+                </a:outerShdw>
+              </a:effectLst>
+              <a:latin typeface="Bahnschrift SemiBold SemiConden" panose="020B0502040204020203" pitchFamily="34" charset="0"/>
+            </a:endParaRPr>
+          </a:p>
+          <a:p>
+            <a:pPr lvl="1"/>
+            <a:r>
+              <a:rPr lang="hr-HR" sz="2800" dirty="0">
+                <a:solidFill>
+                  <a:srgbClr val="001132"/>
+                </a:solidFill>
+                <a:effectLst>
+                  <a:outerShdw blurRad="38100" dist="38100" dir="2700000" algn="tl">
+                    <a:srgbClr val="000000">
+                      <a:alpha val="43137"/>
+                    </a:srgbClr>
+                  </a:outerShdw>
+                </a:effectLst>
+                <a:latin typeface="Bahnschrift SemiBold SemiConden" panose="020B0502040204020203" pitchFamily="34" charset="0"/>
+              </a:rPr>
+              <a:t>Javni</a:t>
+            </a:r>
+          </a:p>
+          <a:p>
+            <a:pPr lvl="2"/>
+            <a:r>
+              <a:rPr lang="hr-HR" sz="2000" dirty="0">
+                <a:solidFill>
+                  <a:schemeClr val="bg1"/>
+                </a:solidFill>
+                <a:latin typeface="Bahnschrift SemiBold SemiConden" panose="020B0502040204020203" pitchFamily="34" charset="0"/>
+              </a:rPr>
+              <a:t>Eventi namijenjeni za sve korisnike platforme</a:t>
+            </a:r>
+            <a:endParaRPr lang="hr-HR" sz="2400" dirty="0">
+              <a:solidFill>
+                <a:srgbClr val="00FF99"/>
+              </a:solidFill>
+              <a:effectLst>
+                <a:outerShdw blurRad="38100" dist="38100" dir="2700000" algn="tl">
+                  <a:srgbClr val="000000">
+                    <a:alpha val="43137"/>
+                  </a:srgbClr>
+                </a:outerShdw>
+              </a:effectLst>
+              <a:latin typeface="Bahnschrift SemiBold SemiConden" panose="020B0502040204020203" pitchFamily="34" charset="0"/>
+            </a:endParaRPr>
+          </a:p>
+          <a:p>
+            <a:pPr lvl="2"/>
+            <a:endParaRPr lang="hr-HR" sz="2400" dirty="0">
+              <a:solidFill>
+                <a:srgbClr val="001132"/>
+              </a:solidFill>
+              <a:effectLst>
+                <a:outerShdw blurRad="38100" dist="38100" dir="2700000" algn="tl">
+                  <a:srgbClr val="000000">
+                    <a:alpha val="43137"/>
+                  </a:srgbClr>
+                </a:outerShdw>
+              </a:effectLst>
+              <a:latin typeface="Bahnschrift SemiBold SemiConden" panose="020B0502040204020203" pitchFamily="34" charset="0"/>
+            </a:endParaRPr>
+          </a:p>
+          <a:p>
+            <a:pPr marL="3200400" lvl="7" indent="0">
+              <a:buNone/>
+            </a:pPr>
+            <a:endParaRPr lang="hr-HR" dirty="0">
+              <a:solidFill>
+                <a:schemeClr val="bg1"/>
+              </a:solidFill>
+              <a:latin typeface="Bahnschrift SemiBold SemiConden" panose="020B0502040204020203" pitchFamily="34" charset="0"/>
+            </a:endParaRPr>
           </a:p>
         </p:txBody>
       </p:sp>
-      <p:sp>
-        <p:nvSpPr>
-          <p:cNvPr id="4" name="Slide Number Placeholder 3"/>
-          <p:cNvSpPr>
-            <a:spLocks noGrp="1"/>
-          </p:cNvSpPr>
-          <p:nvPr>
-            <p:ph type="sldNum" sz="quarter" idx="12"/>
-          </p:nvPr>
-        </p:nvSpPr>
-        <p:spPr/>
-        <p:txBody>
-          <a:bodyPr/>
-          <a:lstStyle/>
-          <a:p>
-            <a:fld id="{FAA41844-C0CA-4144-9D6C-D993F0C0FAB4}" type="slidenum">
-              <a:rPr lang="hr-HR" smtClean="0"/>
-              <a:t>6</a:t>
-            </a:fld>
-            <a:endParaRPr lang="hr-HR"/>
-          </a:p>
-        </p:txBody>
-      </p:sp>
+      <p:pic>
+        <p:nvPicPr>
+          <p:cNvPr id="5" name="Picture 4">
+            <a:extLst>
+              <a:ext uri="{FF2B5EF4-FFF2-40B4-BE49-F238E27FC236}">
+                <a16:creationId xmlns:a16="http://schemas.microsoft.com/office/drawing/2014/main" id="{329A86A0-5A2D-24A7-F814-8F2423C5C127}"/>
+              </a:ext>
+            </a:extLst>
+          </p:cNvPr>
+          <p:cNvPicPr>
+            <a:picLocks noChangeAspect="1"/>
+          </p:cNvPicPr>
+          <p:nvPr/>
+        </p:nvPicPr>
+        <p:blipFill>
+          <a:blip r:embed="rId3"/>
+          <a:stretch>
+            <a:fillRect/>
+          </a:stretch>
+        </p:blipFill>
+        <p:spPr>
+          <a:xfrm>
+            <a:off x="2357249" y="4439645"/>
+            <a:ext cx="4429502" cy="2119892"/>
+          </a:xfrm>
+          <a:prstGeom prst="rect">
+            <a:avLst/>
+          </a:prstGeom>
+          <a:ln>
+            <a:noFill/>
+          </a:ln>
+          <a:effectLst>
+            <a:outerShdw blurRad="292100" dist="139700" dir="2700000" algn="tl" rotWithShape="0">
+              <a:srgbClr val="333333">
+                <a:alpha val="65000"/>
+              </a:srgbClr>
+            </a:outerShdw>
+          </a:effectLst>
+        </p:spPr>
+      </p:pic>
     </p:spTree>
     <p:extLst>
       <p:ext uri="{BB962C8B-B14F-4D97-AF65-F5344CB8AC3E}">
-        <p14:creationId xmlns:p14="http://schemas.microsoft.com/office/powerpoint/2010/main" val="3161375826"/>
+        <p14:creationId xmlns:p14="http://schemas.microsoft.com/office/powerpoint/2010/main" val="4153334807"/>
       </p:ext>
     </p:extLst>
   </p:cSld>
   <p:clrMapOvr>
     <a:masterClrMapping/>
   </p:clrMapOvr>
+  <p:timing>
+    <p:tnLst>
+      <p:par>
+        <p:cTn id="1" dur="indefinite" restart="never" nodeType="tmRoot">
+          <p:childTnLst>
+            <p:seq concurrent="1" nextAc="seek">
+              <p:cTn id="2" dur="indefinite" nodeType="mainSeq">
+                <p:childTnLst>
+                  <p:par>
+                    <p:cTn id="3" fill="hold">
+                      <p:stCondLst>
+                        <p:cond delay="indefinite"/>
+                      </p:stCondLst>
+                      <p:childTnLst>
+                        <p:par>
+                          <p:cTn id="4" fill="hold">
+                            <p:stCondLst>
+                              <p:cond delay="0"/>
+                            </p:stCondLst>
+                            <p:childTnLst>
+                              <p:par>
+                                <p:cTn id="5" presetID="2" presetClass="entr" presetSubtype="8" fill="hold" nodeType="clickEffect">
+                                  <p:stCondLst>
+                                    <p:cond delay="0"/>
+                                  </p:stCondLst>
+                                  <p:childTnLst>
+                                    <p:set>
+                                      <p:cBhvr>
+                                        <p:cTn id="6" dur="1" fill="hold">
+                                          <p:stCondLst>
+                                            <p:cond delay="0"/>
+                                          </p:stCondLst>
+                                        </p:cTn>
+                                        <p:tgtEl>
+                                          <p:spTgt spid="13">
+                                            <p:txEl>
+                                              <p:pRg st="0" end="0"/>
+                                            </p:txEl>
+                                          </p:spTgt>
+                                        </p:tgtEl>
+                                        <p:attrNameLst>
+                                          <p:attrName>style.visibility</p:attrName>
+                                        </p:attrNameLst>
+                                      </p:cBhvr>
+                                      <p:to>
+                                        <p:strVal val="visible"/>
+                                      </p:to>
+                                    </p:set>
+                                    <p:anim calcmode="lin" valueType="num">
+                                      <p:cBhvr additive="base">
+                                        <p:cTn id="7" dur="500" fill="hold"/>
+                                        <p:tgtEl>
+                                          <p:spTgt spid="13">
+                                            <p:txEl>
+                                              <p:pRg st="0" end="0"/>
+                                            </p:txEl>
+                                          </p:spTgt>
+                                        </p:tgtEl>
+                                        <p:attrNameLst>
+                                          <p:attrName>ppt_x</p:attrName>
+                                        </p:attrNameLst>
+                                      </p:cBhvr>
+                                      <p:tavLst>
+                                        <p:tav tm="0">
+                                          <p:val>
+                                            <p:strVal val="0-#ppt_w/2"/>
+                                          </p:val>
+                                        </p:tav>
+                                        <p:tav tm="100000">
+                                          <p:val>
+                                            <p:strVal val="#ppt_x"/>
+                                          </p:val>
+                                        </p:tav>
+                                      </p:tavLst>
+                                    </p:anim>
+                                    <p:anim calcmode="lin" valueType="num">
+                                      <p:cBhvr additive="base">
+                                        <p:cTn id="8" dur="500" fill="hold"/>
+                                        <p:tgtEl>
+                                          <p:spTgt spid="13">
+                                            <p:txEl>
+                                              <p:pRg st="0" end="0"/>
+                                            </p:txEl>
+                                          </p:spTgt>
+                                        </p:tgtEl>
+                                        <p:attrNameLst>
+                                          <p:attrName>ppt_y</p:attrName>
+                                        </p:attrNameLst>
+                                      </p:cBhvr>
+                                      <p:tavLst>
+                                        <p:tav tm="0">
+                                          <p:val>
+                                            <p:strVal val="#ppt_y"/>
+                                          </p:val>
+                                        </p:tav>
+                                        <p:tav tm="100000">
+                                          <p:val>
+                                            <p:strVal val="#ppt_y"/>
+                                          </p:val>
+                                        </p:tav>
+                                      </p:tavLst>
+                                    </p:anim>
+                                  </p:childTnLst>
+                                </p:cTn>
+                              </p:par>
+                            </p:childTnLst>
+                          </p:cTn>
+                        </p:par>
+                      </p:childTnLst>
+                    </p:cTn>
+                  </p:par>
+                  <p:par>
+                    <p:cTn id="9" fill="hold">
+                      <p:stCondLst>
+                        <p:cond delay="indefinite"/>
+                      </p:stCondLst>
+                      <p:childTnLst>
+                        <p:par>
+                          <p:cTn id="10" fill="hold">
+                            <p:stCondLst>
+                              <p:cond delay="0"/>
+                            </p:stCondLst>
+                            <p:childTnLst>
+                              <p:par>
+                                <p:cTn id="11" presetID="2" presetClass="entr" presetSubtype="12" fill="hold" nodeType="clickEffect">
+                                  <p:stCondLst>
+                                    <p:cond delay="0"/>
+                                  </p:stCondLst>
+                                  <p:childTnLst>
+                                    <p:set>
+                                      <p:cBhvr>
+                                        <p:cTn id="12" dur="1" fill="hold">
+                                          <p:stCondLst>
+                                            <p:cond delay="0"/>
+                                          </p:stCondLst>
+                                        </p:cTn>
+                                        <p:tgtEl>
+                                          <p:spTgt spid="13">
+                                            <p:txEl>
+                                              <p:pRg st="1" end="1"/>
+                                            </p:txEl>
+                                          </p:spTgt>
+                                        </p:tgtEl>
+                                        <p:attrNameLst>
+                                          <p:attrName>style.visibility</p:attrName>
+                                        </p:attrNameLst>
+                                      </p:cBhvr>
+                                      <p:to>
+                                        <p:strVal val="visible"/>
+                                      </p:to>
+                                    </p:set>
+                                    <p:anim calcmode="lin" valueType="num">
+                                      <p:cBhvr additive="base">
+                                        <p:cTn id="13" dur="500" fill="hold"/>
+                                        <p:tgtEl>
+                                          <p:spTgt spid="13">
+                                            <p:txEl>
+                                              <p:pRg st="1" end="1"/>
+                                            </p:txEl>
+                                          </p:spTgt>
+                                        </p:tgtEl>
+                                        <p:attrNameLst>
+                                          <p:attrName>ppt_x</p:attrName>
+                                        </p:attrNameLst>
+                                      </p:cBhvr>
+                                      <p:tavLst>
+                                        <p:tav tm="0">
+                                          <p:val>
+                                            <p:strVal val="0-#ppt_w/2"/>
+                                          </p:val>
+                                        </p:tav>
+                                        <p:tav tm="100000">
+                                          <p:val>
+                                            <p:strVal val="#ppt_x"/>
+                                          </p:val>
+                                        </p:tav>
+                                      </p:tavLst>
+                                    </p:anim>
+                                    <p:anim calcmode="lin" valueType="num">
+                                      <p:cBhvr additive="base">
+                                        <p:cTn id="14" dur="500" fill="hold"/>
+                                        <p:tgtEl>
+                                          <p:spTgt spid="13">
+                                            <p:txEl>
+                                              <p:pRg st="1" end="1"/>
+                                            </p:txEl>
+                                          </p:spTgt>
+                                        </p:tgtEl>
+                                        <p:attrNameLst>
+                                          <p:attrName>ppt_y</p:attrName>
+                                        </p:attrNameLst>
+                                      </p:cBhvr>
+                                      <p:tavLst>
+                                        <p:tav tm="0">
+                                          <p:val>
+                                            <p:strVal val="1+#ppt_h/2"/>
+                                          </p:val>
+                                        </p:tav>
+                                        <p:tav tm="100000">
+                                          <p:val>
+                                            <p:strVal val="#ppt_y"/>
+                                          </p:val>
+                                        </p:tav>
+                                      </p:tavLst>
+                                    </p:anim>
+                                  </p:childTnLst>
+                                </p:cTn>
+                              </p:par>
+                              <p:par>
+                                <p:cTn id="15" presetID="2" presetClass="entr" presetSubtype="12" fill="hold" nodeType="withEffect">
+                                  <p:stCondLst>
+                                    <p:cond delay="0"/>
+                                  </p:stCondLst>
+                                  <p:childTnLst>
+                                    <p:set>
+                                      <p:cBhvr>
+                                        <p:cTn id="16" dur="1" fill="hold">
+                                          <p:stCondLst>
+                                            <p:cond delay="0"/>
+                                          </p:stCondLst>
+                                        </p:cTn>
+                                        <p:tgtEl>
+                                          <p:spTgt spid="13">
+                                            <p:txEl>
+                                              <p:pRg st="2" end="2"/>
+                                            </p:txEl>
+                                          </p:spTgt>
+                                        </p:tgtEl>
+                                        <p:attrNameLst>
+                                          <p:attrName>style.visibility</p:attrName>
+                                        </p:attrNameLst>
+                                      </p:cBhvr>
+                                      <p:to>
+                                        <p:strVal val="visible"/>
+                                      </p:to>
+                                    </p:set>
+                                    <p:anim calcmode="lin" valueType="num">
+                                      <p:cBhvr additive="base">
+                                        <p:cTn id="17" dur="500" fill="hold"/>
+                                        <p:tgtEl>
+                                          <p:spTgt spid="13">
+                                            <p:txEl>
+                                              <p:pRg st="2" end="2"/>
+                                            </p:txEl>
+                                          </p:spTgt>
+                                        </p:tgtEl>
+                                        <p:attrNameLst>
+                                          <p:attrName>ppt_x</p:attrName>
+                                        </p:attrNameLst>
+                                      </p:cBhvr>
+                                      <p:tavLst>
+                                        <p:tav tm="0">
+                                          <p:val>
+                                            <p:strVal val="0-#ppt_w/2"/>
+                                          </p:val>
+                                        </p:tav>
+                                        <p:tav tm="100000">
+                                          <p:val>
+                                            <p:strVal val="#ppt_x"/>
+                                          </p:val>
+                                        </p:tav>
+                                      </p:tavLst>
+                                    </p:anim>
+                                    <p:anim calcmode="lin" valueType="num">
+                                      <p:cBhvr additive="base">
+                                        <p:cTn id="18" dur="500" fill="hold"/>
+                                        <p:tgtEl>
+                                          <p:spTgt spid="13">
+                                            <p:txEl>
+                                              <p:pRg st="2" end="2"/>
+                                            </p:txEl>
+                                          </p:spTgt>
+                                        </p:tgtEl>
+                                        <p:attrNameLst>
+                                          <p:attrName>ppt_y</p:attrName>
+                                        </p:attrNameLst>
+                                      </p:cBhvr>
+                                      <p:tavLst>
+                                        <p:tav tm="0">
+                                          <p:val>
+                                            <p:strVal val="1+#ppt_h/2"/>
+                                          </p:val>
+                                        </p:tav>
+                                        <p:tav tm="100000">
+                                          <p:val>
+                                            <p:strVal val="#ppt_y"/>
+                                          </p:val>
+                                        </p:tav>
+                                      </p:tavLst>
+                                    </p:anim>
+                                  </p:childTnLst>
+                                </p:cTn>
+                              </p:par>
+                            </p:childTnLst>
+                          </p:cTn>
+                        </p:par>
+                      </p:childTnLst>
+                    </p:cTn>
+                  </p:par>
+                  <p:par>
+                    <p:cTn id="19" fill="hold">
+                      <p:stCondLst>
+                        <p:cond delay="indefinite"/>
+                      </p:stCondLst>
+                      <p:childTnLst>
+                        <p:par>
+                          <p:cTn id="20" fill="hold">
+                            <p:stCondLst>
+                              <p:cond delay="0"/>
+                            </p:stCondLst>
+                            <p:childTnLst>
+                              <p:par>
+                                <p:cTn id="21" presetID="2" presetClass="entr" presetSubtype="6" fill="hold" nodeType="clickEffect">
+                                  <p:stCondLst>
+                                    <p:cond delay="0"/>
+                                  </p:stCondLst>
+                                  <p:childTnLst>
+                                    <p:set>
+                                      <p:cBhvr>
+                                        <p:cTn id="22" dur="1" fill="hold">
+                                          <p:stCondLst>
+                                            <p:cond delay="0"/>
+                                          </p:stCondLst>
+                                        </p:cTn>
+                                        <p:tgtEl>
+                                          <p:spTgt spid="13">
+                                            <p:txEl>
+                                              <p:pRg st="3" end="3"/>
+                                            </p:txEl>
+                                          </p:spTgt>
+                                        </p:tgtEl>
+                                        <p:attrNameLst>
+                                          <p:attrName>style.visibility</p:attrName>
+                                        </p:attrNameLst>
+                                      </p:cBhvr>
+                                      <p:to>
+                                        <p:strVal val="visible"/>
+                                      </p:to>
+                                    </p:set>
+                                    <p:anim calcmode="lin" valueType="num">
+                                      <p:cBhvr additive="base">
+                                        <p:cTn id="23" dur="500" fill="hold"/>
+                                        <p:tgtEl>
+                                          <p:spTgt spid="13">
+                                            <p:txEl>
+                                              <p:pRg st="3" end="3"/>
+                                            </p:txEl>
+                                          </p:spTgt>
+                                        </p:tgtEl>
+                                        <p:attrNameLst>
+                                          <p:attrName>ppt_x</p:attrName>
+                                        </p:attrNameLst>
+                                      </p:cBhvr>
+                                      <p:tavLst>
+                                        <p:tav tm="0">
+                                          <p:val>
+                                            <p:strVal val="1+#ppt_w/2"/>
+                                          </p:val>
+                                        </p:tav>
+                                        <p:tav tm="100000">
+                                          <p:val>
+                                            <p:strVal val="#ppt_x"/>
+                                          </p:val>
+                                        </p:tav>
+                                      </p:tavLst>
+                                    </p:anim>
+                                    <p:anim calcmode="lin" valueType="num">
+                                      <p:cBhvr additive="base">
+                                        <p:cTn id="24" dur="500" fill="hold"/>
+                                        <p:tgtEl>
+                                          <p:spTgt spid="13">
+                                            <p:txEl>
+                                              <p:pRg st="3" end="3"/>
+                                            </p:txEl>
+                                          </p:spTgt>
+                                        </p:tgtEl>
+                                        <p:attrNameLst>
+                                          <p:attrName>ppt_y</p:attrName>
+                                        </p:attrNameLst>
+                                      </p:cBhvr>
+                                      <p:tavLst>
+                                        <p:tav tm="0">
+                                          <p:val>
+                                            <p:strVal val="1+#ppt_h/2"/>
+                                          </p:val>
+                                        </p:tav>
+                                        <p:tav tm="100000">
+                                          <p:val>
+                                            <p:strVal val="#ppt_y"/>
+                                          </p:val>
+                                        </p:tav>
+                                      </p:tavLst>
+                                    </p:anim>
+                                  </p:childTnLst>
+                                </p:cTn>
+                              </p:par>
+                              <p:par>
+                                <p:cTn id="25" presetID="2" presetClass="entr" presetSubtype="6" fill="hold" nodeType="withEffect">
+                                  <p:stCondLst>
+                                    <p:cond delay="0"/>
+                                  </p:stCondLst>
+                                  <p:childTnLst>
+                                    <p:set>
+                                      <p:cBhvr>
+                                        <p:cTn id="26" dur="1" fill="hold">
+                                          <p:stCondLst>
+                                            <p:cond delay="0"/>
+                                          </p:stCondLst>
+                                        </p:cTn>
+                                        <p:tgtEl>
+                                          <p:spTgt spid="13">
+                                            <p:txEl>
+                                              <p:pRg st="4" end="4"/>
+                                            </p:txEl>
+                                          </p:spTgt>
+                                        </p:tgtEl>
+                                        <p:attrNameLst>
+                                          <p:attrName>style.visibility</p:attrName>
+                                        </p:attrNameLst>
+                                      </p:cBhvr>
+                                      <p:to>
+                                        <p:strVal val="visible"/>
+                                      </p:to>
+                                    </p:set>
+                                    <p:anim calcmode="lin" valueType="num">
+                                      <p:cBhvr additive="base">
+                                        <p:cTn id="27" dur="500" fill="hold"/>
+                                        <p:tgtEl>
+                                          <p:spTgt spid="13">
+                                            <p:txEl>
+                                              <p:pRg st="4" end="4"/>
+                                            </p:txEl>
+                                          </p:spTgt>
+                                        </p:tgtEl>
+                                        <p:attrNameLst>
+                                          <p:attrName>ppt_x</p:attrName>
+                                        </p:attrNameLst>
+                                      </p:cBhvr>
+                                      <p:tavLst>
+                                        <p:tav tm="0">
+                                          <p:val>
+                                            <p:strVal val="1+#ppt_w/2"/>
+                                          </p:val>
+                                        </p:tav>
+                                        <p:tav tm="100000">
+                                          <p:val>
+                                            <p:strVal val="#ppt_x"/>
+                                          </p:val>
+                                        </p:tav>
+                                      </p:tavLst>
+                                    </p:anim>
+                                    <p:anim calcmode="lin" valueType="num">
+                                      <p:cBhvr additive="base">
+                                        <p:cTn id="28" dur="500" fill="hold"/>
+                                        <p:tgtEl>
+                                          <p:spTgt spid="13">
+                                            <p:txEl>
+                                              <p:pRg st="4" end="4"/>
+                                            </p:txEl>
+                                          </p:spTgt>
+                                        </p:tgtEl>
+                                        <p:attrNameLst>
+                                          <p:attrName>ppt_y</p:attrName>
+                                        </p:attrNameLst>
+                                      </p:cBhvr>
+                                      <p:tavLst>
+                                        <p:tav tm="0">
+                                          <p:val>
+                                            <p:strVal val="1+#ppt_h/2"/>
+                                          </p:val>
+                                        </p:tav>
+                                        <p:tav tm="100000">
+                                          <p:val>
+                                            <p:strVal val="#ppt_y"/>
+                                          </p:val>
+                                        </p:tav>
+                                      </p:tavLst>
+                                    </p:anim>
+                                  </p:childTnLst>
+                                </p:cTn>
+                              </p:par>
+                            </p:childTnLst>
+                          </p:cTn>
+                        </p:par>
+                      </p:childTnLst>
+                    </p:cTn>
+                  </p:par>
+                  <p:par>
+                    <p:cTn id="29" fill="hold">
+                      <p:stCondLst>
+                        <p:cond delay="indefinite"/>
+                      </p:stCondLst>
+                      <p:childTnLst>
+                        <p:par>
+                          <p:cTn id="30" fill="hold">
+                            <p:stCondLst>
+                              <p:cond delay="0"/>
+                            </p:stCondLst>
+                            <p:childTnLst>
+                              <p:par>
+                                <p:cTn id="31" presetID="2" presetClass="entr" presetSubtype="12" fill="hold" nodeType="clickEffect">
+                                  <p:stCondLst>
+                                    <p:cond delay="0"/>
+                                  </p:stCondLst>
+                                  <p:childTnLst>
+                                    <p:set>
+                                      <p:cBhvr>
+                                        <p:cTn id="32" dur="1" fill="hold">
+                                          <p:stCondLst>
+                                            <p:cond delay="0"/>
+                                          </p:stCondLst>
+                                        </p:cTn>
+                                        <p:tgtEl>
+                                          <p:spTgt spid="13">
+                                            <p:txEl>
+                                              <p:pRg st="5" end="5"/>
+                                            </p:txEl>
+                                          </p:spTgt>
+                                        </p:tgtEl>
+                                        <p:attrNameLst>
+                                          <p:attrName>style.visibility</p:attrName>
+                                        </p:attrNameLst>
+                                      </p:cBhvr>
+                                      <p:to>
+                                        <p:strVal val="visible"/>
+                                      </p:to>
+                                    </p:set>
+                                    <p:anim calcmode="lin" valueType="num">
+                                      <p:cBhvr additive="base">
+                                        <p:cTn id="33" dur="500" fill="hold"/>
+                                        <p:tgtEl>
+                                          <p:spTgt spid="13">
+                                            <p:txEl>
+                                              <p:pRg st="5" end="5"/>
+                                            </p:txEl>
+                                          </p:spTgt>
+                                        </p:tgtEl>
+                                        <p:attrNameLst>
+                                          <p:attrName>ppt_x</p:attrName>
+                                        </p:attrNameLst>
+                                      </p:cBhvr>
+                                      <p:tavLst>
+                                        <p:tav tm="0">
+                                          <p:val>
+                                            <p:strVal val="0-#ppt_w/2"/>
+                                          </p:val>
+                                        </p:tav>
+                                        <p:tav tm="100000">
+                                          <p:val>
+                                            <p:strVal val="#ppt_x"/>
+                                          </p:val>
+                                        </p:tav>
+                                      </p:tavLst>
+                                    </p:anim>
+                                    <p:anim calcmode="lin" valueType="num">
+                                      <p:cBhvr additive="base">
+                                        <p:cTn id="34" dur="500" fill="hold"/>
+                                        <p:tgtEl>
+                                          <p:spTgt spid="13">
+                                            <p:txEl>
+                                              <p:pRg st="5" end="5"/>
+                                            </p:txEl>
+                                          </p:spTgt>
+                                        </p:tgtEl>
+                                        <p:attrNameLst>
+                                          <p:attrName>ppt_y</p:attrName>
+                                        </p:attrNameLst>
+                                      </p:cBhvr>
+                                      <p:tavLst>
+                                        <p:tav tm="0">
+                                          <p:val>
+                                            <p:strVal val="1+#ppt_h/2"/>
+                                          </p:val>
+                                        </p:tav>
+                                        <p:tav tm="100000">
+                                          <p:val>
+                                            <p:strVal val="#ppt_y"/>
+                                          </p:val>
+                                        </p:tav>
+                                      </p:tavLst>
+                                    </p:anim>
+                                  </p:childTnLst>
+                                </p:cTn>
+                              </p:par>
+                              <p:par>
+                                <p:cTn id="35" presetID="2" presetClass="entr" presetSubtype="12" fill="hold" nodeType="withEffect">
+                                  <p:stCondLst>
+                                    <p:cond delay="0"/>
+                                  </p:stCondLst>
+                                  <p:childTnLst>
+                                    <p:set>
+                                      <p:cBhvr>
+                                        <p:cTn id="36" dur="1" fill="hold">
+                                          <p:stCondLst>
+                                            <p:cond delay="0"/>
+                                          </p:stCondLst>
+                                        </p:cTn>
+                                        <p:tgtEl>
+                                          <p:spTgt spid="13">
+                                            <p:txEl>
+                                              <p:pRg st="6" end="6"/>
+                                            </p:txEl>
+                                          </p:spTgt>
+                                        </p:tgtEl>
+                                        <p:attrNameLst>
+                                          <p:attrName>style.visibility</p:attrName>
+                                        </p:attrNameLst>
+                                      </p:cBhvr>
+                                      <p:to>
+                                        <p:strVal val="visible"/>
+                                      </p:to>
+                                    </p:set>
+                                    <p:anim calcmode="lin" valueType="num">
+                                      <p:cBhvr additive="base">
+                                        <p:cTn id="37" dur="500" fill="hold"/>
+                                        <p:tgtEl>
+                                          <p:spTgt spid="13">
+                                            <p:txEl>
+                                              <p:pRg st="6" end="6"/>
+                                            </p:txEl>
+                                          </p:spTgt>
+                                        </p:tgtEl>
+                                        <p:attrNameLst>
+                                          <p:attrName>ppt_x</p:attrName>
+                                        </p:attrNameLst>
+                                      </p:cBhvr>
+                                      <p:tavLst>
+                                        <p:tav tm="0">
+                                          <p:val>
+                                            <p:strVal val="0-#ppt_w/2"/>
+                                          </p:val>
+                                        </p:tav>
+                                        <p:tav tm="100000">
+                                          <p:val>
+                                            <p:strVal val="#ppt_x"/>
+                                          </p:val>
+                                        </p:tav>
+                                      </p:tavLst>
+                                    </p:anim>
+                                    <p:anim calcmode="lin" valueType="num">
+                                      <p:cBhvr additive="base">
+                                        <p:cTn id="38" dur="500" fill="hold"/>
+                                        <p:tgtEl>
+                                          <p:spTgt spid="13">
+                                            <p:txEl>
+                                              <p:pRg st="6" end="6"/>
+                                            </p:txEl>
+                                          </p:spTgt>
+                                        </p:tgtEl>
+                                        <p:attrNameLst>
+                                          <p:attrName>ppt_y</p:attrName>
+                                        </p:attrNameLst>
+                                      </p:cBhvr>
+                                      <p:tavLst>
+                                        <p:tav tm="0">
+                                          <p:val>
+                                            <p:strVal val="1+#ppt_h/2"/>
+                                          </p:val>
+                                        </p:tav>
+                                        <p:tav tm="100000">
+                                          <p:val>
+                                            <p:strVal val="#ppt_y"/>
+                                          </p:val>
+                                        </p:tav>
+                                      </p:tavLst>
+                                    </p:anim>
+                                  </p:childTnLst>
+                                </p:cTn>
+                              </p:par>
+                            </p:childTnLst>
+                          </p:cTn>
+                        </p:par>
+                      </p:childTnLst>
+                    </p:cTn>
+                  </p:par>
+                  <p:par>
+                    <p:cTn id="39" fill="hold">
+                      <p:stCondLst>
+                        <p:cond delay="indefinite"/>
+                      </p:stCondLst>
+                      <p:childTnLst>
+                        <p:par>
+                          <p:cTn id="40" fill="hold">
+                            <p:stCondLst>
+                              <p:cond delay="0"/>
+                            </p:stCondLst>
+                            <p:childTnLst>
+                              <p:par>
+                                <p:cTn id="41" presetID="16" presetClass="entr" presetSubtype="21" fill="hold" nodeType="clickEffect">
+                                  <p:stCondLst>
+                                    <p:cond delay="0"/>
+                                  </p:stCondLst>
+                                  <p:childTnLst>
+                                    <p:set>
+                                      <p:cBhvr>
+                                        <p:cTn id="42" dur="1" fill="hold">
+                                          <p:stCondLst>
+                                            <p:cond delay="0"/>
+                                          </p:stCondLst>
+                                        </p:cTn>
+                                        <p:tgtEl>
+                                          <p:spTgt spid="5"/>
+                                        </p:tgtEl>
+                                        <p:attrNameLst>
+                                          <p:attrName>style.visibility</p:attrName>
+                                        </p:attrNameLst>
+                                      </p:cBhvr>
+                                      <p:to>
+                                        <p:strVal val="visible"/>
+                                      </p:to>
+                                    </p:set>
+                                    <p:animEffect transition="in" filter="barn(inVertical)">
+                                      <p:cBhvr>
+                                        <p:cTn id="43" dur="500"/>
+                                        <p:tgtEl>
+                                          <p:spTgt spid="5"/>
+                                        </p:tgtEl>
+                                      </p:cBhvr>
+                                    </p:animEffect>
+                                  </p:childTnLst>
+                                </p:cTn>
+                              </p:par>
+                            </p:childTnLst>
+                          </p:cTn>
+                        </p:par>
+                      </p:childTnLst>
+                    </p:cTn>
+                  </p:par>
+                </p:childTnLst>
+              </p:cTn>
+              <p:prevCondLst>
+                <p:cond evt="onPrev" delay="0">
+                  <p:tgtEl>
+                    <p:sldTgt/>
+                  </p:tgtEl>
+                </p:cond>
+              </p:prevCondLst>
+              <p:nextCondLst>
+                <p:cond evt="onNext" delay="0">
+                  <p:tgtEl>
+                    <p:sldTgt/>
+                  </p:tgtEl>
+                </p:cond>
+              </p:nextCondLst>
+            </p:seq>
+          </p:childTnLst>
+        </p:cTn>
+      </p:par>
+    </p:tnLst>
+  </p:timing>
 </p:sld>
 </file>
 
@@ -5822,9 +7605,51 @@
           <a:chExt cx="0" cy="0"/>
         </a:xfrm>
       </p:grpSpPr>
+      <p:pic>
+        <p:nvPicPr>
+          <p:cNvPr id="10" name="Picture 9" descr="A picture containing shape&#10;&#10;Description automatically generated">
+            <a:extLst>
+              <a:ext uri="{FF2B5EF4-FFF2-40B4-BE49-F238E27FC236}">
+                <a16:creationId xmlns:a16="http://schemas.microsoft.com/office/drawing/2014/main" id="{837EEEFC-BFA1-BDDA-9AA8-FB552547934E}"/>
+              </a:ext>
+            </a:extLst>
+          </p:cNvPr>
+          <p:cNvPicPr>
+            <a:picLocks noChangeAspect="1"/>
+          </p:cNvPicPr>
+          <p:nvPr/>
+        </p:nvPicPr>
+        <p:blipFill>
+          <a:blip r:embed="rId2">
+            <a:extLst>
+              <a:ext uri="{28A0092B-C50C-407E-A947-70E740481C1C}">
+                <a14:useLocalDpi xmlns:a14="http://schemas.microsoft.com/office/drawing/2010/main" val="0"/>
+              </a:ext>
+            </a:extLst>
+          </a:blip>
+          <a:stretch>
+            <a:fillRect/>
+          </a:stretch>
+        </p:blipFill>
+        <p:spPr>
+          <a:xfrm>
+            <a:off x="0" y="0"/>
+            <a:ext cx="9144000" cy="6858000"/>
+          </a:xfrm>
+          <a:prstGeom prst="rect">
+            <a:avLst/>
+          </a:prstGeom>
+        </p:spPr>
+      </p:pic>
       <p:sp>
         <p:nvSpPr>
-          <p:cNvPr id="2" name="Title 1"/>
+          <p:cNvPr id="11" name="Title 1">
+            <a:extLst>
+              <a:ext uri="{FF2B5EF4-FFF2-40B4-BE49-F238E27FC236}">
+                <a16:creationId xmlns:a16="http://schemas.microsoft.com/office/drawing/2014/main" id="{AA86832F-F2B3-C482-7320-2650822E5AAA}"/>
+              </a:ext>
+            </a:extLst>
+          </p:cNvPr>
           <p:cNvSpPr>
             <a:spLocks noGrp="1"/>
           </p:cNvSpPr>
@@ -5832,21 +7657,39 @@
             <p:ph type="title"/>
           </p:nvPr>
         </p:nvSpPr>
-        <p:spPr/>
+        <p:spPr>
+          <a:xfrm>
+            <a:off x="628650" y="365127"/>
+            <a:ext cx="7886700" cy="844838"/>
+          </a:xfrm>
+        </p:spPr>
         <p:txBody>
-          <a:bodyPr/>
+          <a:bodyPr>
+            <a:noAutofit/>
+          </a:bodyPr>
           <a:lstStyle/>
           <a:p>
             <a:r>
-              <a:rPr lang="hr-HR" dirty="0"/>
-              <a:t>Korišteni alati i tehnologije</a:t>
+              <a:rPr lang="hr-HR" sz="3200" dirty="0">
+                <a:solidFill>
+                  <a:schemeClr val="bg1"/>
+                </a:solidFill>
+                <a:latin typeface="PrimaSans BT" panose="020B0803030604020204" pitchFamily="34" charset="0"/>
+              </a:rPr>
+              <a:t>Vrste korisnika</a:t>
             </a:r>
           </a:p>
         </p:txBody>
       </p:sp>
       <p:sp>
         <p:nvSpPr>
-          <p:cNvPr id="3" name="Content Placeholder 2"/>
+          <p:cNvPr id="13" name="Content Placeholder 2">
+            <a:extLst>
+              <a:ext uri="{FF2B5EF4-FFF2-40B4-BE49-F238E27FC236}">
+                <a16:creationId xmlns:a16="http://schemas.microsoft.com/office/drawing/2014/main" id="{2B10E8CC-9103-CB2F-FAB7-5BC90D4F1E25}"/>
+              </a:ext>
+            </a:extLst>
+          </p:cNvPr>
           <p:cNvSpPr>
             <a:spLocks noGrp="1"/>
           </p:cNvSpPr>
@@ -5854,98 +7697,1071 @@
             <p:ph idx="1"/>
           </p:nvPr>
         </p:nvSpPr>
-        <p:spPr/>
+        <p:spPr>
+          <a:xfrm>
+            <a:off x="628650" y="1395554"/>
+            <a:ext cx="4724585" cy="4931327"/>
+          </a:xfrm>
+        </p:spPr>
         <p:txBody>
           <a:bodyPr/>
           <a:lstStyle/>
           <a:p>
-            <a:r>
-              <a:rPr lang="hr-HR" dirty="0"/>
-              <a:t>Popis svih korištenih alata (za izradu programske podrške, dokumentacije, komunikaciju i upravljanje)</a:t>
-            </a:r>
-          </a:p>
-          <a:p>
-            <a:pPr lvl="1"/>
-            <a:r>
-              <a:rPr lang="hr-HR" dirty="0"/>
-              <a:t>Poželjno staviti linkove za web stranice pojedinih</a:t>
-            </a:r>
-          </a:p>
-          <a:p>
-            <a:pPr marL="457200" lvl="1" indent="0">
+            <a:pPr marL="0" indent="0">
               <a:buNone/>
             </a:pPr>
-            <a:endParaRPr lang="hr-HR" dirty="0"/>
-          </a:p>
-          <a:p>
-            <a:r>
-              <a:rPr lang="hr-HR" dirty="0"/>
-              <a:t>Korišteni programski jezici i tehnologije</a:t>
-            </a:r>
-          </a:p>
-          <a:p>
-            <a:pPr lvl="1"/>
-            <a:r>
-              <a:rPr lang="hr-HR" dirty="0"/>
-              <a:t>Naznačiti što je korišteno za front </a:t>
-            </a:r>
-            <a:r>
-              <a:rPr lang="hr-HR" dirty="0" err="1"/>
-              <a:t>end</a:t>
-            </a:r>
-            <a:r>
-              <a:rPr lang="hr-HR" dirty="0"/>
-              <a:t> a što za </a:t>
-            </a:r>
-            <a:r>
-              <a:rPr lang="hr-HR" dirty="0" err="1"/>
-              <a:t>back</a:t>
-            </a:r>
-            <a:r>
-              <a:rPr lang="hr-HR" dirty="0"/>
-              <a:t> </a:t>
-            </a:r>
-            <a:r>
-              <a:rPr lang="hr-HR" dirty="0" err="1"/>
-              <a:t>end</a:t>
-            </a:r>
-            <a:endParaRPr lang="hr-HR" dirty="0"/>
+            <a:r>
+              <a:rPr lang="hr-HR" sz="3200" dirty="0">
+                <a:solidFill>
+                  <a:schemeClr val="bg1"/>
+                </a:solidFill>
+                <a:latin typeface="Bahnschrift SemiBold SemiConden" panose="020B0502040204020203" pitchFamily="34" charset="0"/>
+              </a:rPr>
+              <a:t>Obični korisnik</a:t>
+            </a:r>
+          </a:p>
+          <a:p>
+            <a:r>
+              <a:rPr lang="hr-HR" sz="2400" dirty="0">
+                <a:solidFill>
+                  <a:schemeClr val="bg1"/>
+                </a:solidFill>
+                <a:latin typeface="Bahnschrift SemiBold SemiConden" panose="020B0502040204020203" pitchFamily="34" charset="0"/>
+              </a:rPr>
+              <a:t>Može stvoriti sve vrste eventa</a:t>
+            </a:r>
+          </a:p>
+          <a:p>
+            <a:r>
+              <a:rPr lang="hr-HR" sz="2400" dirty="0">
+                <a:solidFill>
+                  <a:schemeClr val="bg1"/>
+                </a:solidFill>
+                <a:latin typeface="Bahnschrift SemiBold SemiConden" panose="020B0502040204020203" pitchFamily="34" charset="0"/>
+              </a:rPr>
+              <a:t>Ocjenjivati posjećene događaje</a:t>
+            </a:r>
+          </a:p>
+          <a:p>
+            <a:r>
+              <a:rPr lang="hr-HR" sz="2400" dirty="0">
+                <a:solidFill>
+                  <a:schemeClr val="bg1"/>
+                </a:solidFill>
+                <a:latin typeface="Bahnschrift SemiBold SemiConden" panose="020B0502040204020203" pitchFamily="34" charset="0"/>
+              </a:rPr>
+              <a:t>Prijavljivati se na događaje</a:t>
+            </a:r>
+          </a:p>
+          <a:p>
+            <a:r>
+              <a:rPr lang="hr-HR" sz="2400" dirty="0">
+                <a:solidFill>
+                  <a:schemeClr val="bg1"/>
+                </a:solidFill>
+                <a:latin typeface="Bahnschrift SemiBold SemiConden" panose="020B0502040204020203" pitchFamily="34" charset="0"/>
+              </a:rPr>
+              <a:t>Preko nadimka dodati prijatelje</a:t>
+            </a:r>
+          </a:p>
+          <a:p>
+            <a:r>
+              <a:rPr lang="hr-HR" sz="2400" dirty="0">
+                <a:solidFill>
+                  <a:schemeClr val="bg1"/>
+                </a:solidFill>
+                <a:latin typeface="Bahnschrift SemiBold SemiConden" panose="020B0502040204020203" pitchFamily="34" charset="0"/>
+              </a:rPr>
+              <a:t>Ukloniti prijatelje</a:t>
+            </a:r>
+          </a:p>
+          <a:p>
+            <a:r>
+              <a:rPr lang="hr-HR" sz="2400" dirty="0">
+                <a:solidFill>
+                  <a:schemeClr val="bg1"/>
+                </a:solidFill>
+                <a:latin typeface="Bahnschrift SemiBold SemiConden" panose="020B0502040204020203" pitchFamily="34" charset="0"/>
+              </a:rPr>
+              <a:t>Blokirati korisnike</a:t>
+            </a:r>
+          </a:p>
+          <a:p>
+            <a:r>
+              <a:rPr lang="hr-HR" sz="2400" dirty="0">
+                <a:solidFill>
+                  <a:schemeClr val="bg1"/>
+                </a:solidFill>
+                <a:latin typeface="Bahnschrift SemiBold SemiConden" panose="020B0502040204020203" pitchFamily="34" charset="0"/>
+              </a:rPr>
+              <a:t>Promijeniti nadimak profila</a:t>
+            </a:r>
+          </a:p>
+          <a:p>
+            <a:r>
+              <a:rPr lang="hr-HR" sz="2400" dirty="0">
+                <a:solidFill>
+                  <a:schemeClr val="bg1"/>
+                </a:solidFill>
+                <a:latin typeface="Bahnschrift SemiBold SemiConden" panose="020B0502040204020203" pitchFamily="34" charset="0"/>
+              </a:rPr>
+              <a:t>Pretplatiti se na </a:t>
+            </a:r>
+            <a:r>
+              <a:rPr lang="hr-HR" sz="2400" dirty="0" err="1">
+                <a:solidFill>
+                  <a:schemeClr val="bg1"/>
+                </a:solidFill>
+                <a:latin typeface="Bahnschrift SemiBold SemiConden" panose="020B0502040204020203" pitchFamily="34" charset="0"/>
+              </a:rPr>
+              <a:t>premium</a:t>
+            </a:r>
+            <a:r>
+              <a:rPr lang="hr-HR" sz="2400" dirty="0">
+                <a:solidFill>
+                  <a:schemeClr val="bg1"/>
+                </a:solidFill>
+                <a:latin typeface="Bahnschrift SemiBold SemiConden" panose="020B0502040204020203" pitchFamily="34" charset="0"/>
+              </a:rPr>
+              <a:t> račun</a:t>
+            </a:r>
+          </a:p>
+          <a:p>
+            <a:endParaRPr lang="hr-HR" dirty="0">
+              <a:solidFill>
+                <a:schemeClr val="bg1"/>
+              </a:solidFill>
+              <a:latin typeface="Bahnschrift SemiBold SemiConden" panose="020B0502040204020203" pitchFamily="34" charset="0"/>
+            </a:endParaRPr>
+          </a:p>
+          <a:p>
+            <a:endParaRPr lang="hr-HR" dirty="0">
+              <a:solidFill>
+                <a:schemeClr val="bg1"/>
+              </a:solidFill>
+              <a:latin typeface="Bahnschrift SemiBold SemiConden" panose="020B0502040204020203" pitchFamily="34" charset="0"/>
+            </a:endParaRPr>
+          </a:p>
+          <a:p>
+            <a:endParaRPr lang="hr-HR" dirty="0">
+              <a:solidFill>
+                <a:schemeClr val="bg1"/>
+              </a:solidFill>
+              <a:latin typeface="Bahnschrift SemiBold SemiConden" panose="020B0502040204020203" pitchFamily="34" charset="0"/>
+            </a:endParaRPr>
           </a:p>
         </p:txBody>
       </p:sp>
-      <p:sp>
-        <p:nvSpPr>
-          <p:cNvPr id="4" name="Slide Number Placeholder 3"/>
-          <p:cNvSpPr>
-            <a:spLocks noGrp="1"/>
-          </p:cNvSpPr>
-          <p:nvPr>
-            <p:ph type="sldNum" sz="quarter" idx="12"/>
-          </p:nvPr>
-        </p:nvSpPr>
-        <p:spPr/>
-        <p:txBody>
-          <a:bodyPr/>
-          <a:lstStyle/>
-          <a:p>
-            <a:fld id="{FAA41844-C0CA-4144-9D6C-D993F0C0FAB4}" type="slidenum">
-              <a:rPr lang="hr-HR" smtClean="0"/>
-              <a:t>7</a:t>
-            </a:fld>
-            <a:endParaRPr lang="hr-HR"/>
-          </a:p>
-        </p:txBody>
-      </p:sp>
+      <p:pic>
+        <p:nvPicPr>
+          <p:cNvPr id="7" name="Picture 6">
+            <a:extLst>
+              <a:ext uri="{FF2B5EF4-FFF2-40B4-BE49-F238E27FC236}">
+                <a16:creationId xmlns:a16="http://schemas.microsoft.com/office/drawing/2014/main" id="{C777AA20-CE23-B45A-7FC8-3A8C0EE9542E}"/>
+              </a:ext>
+            </a:extLst>
+          </p:cNvPr>
+          <p:cNvPicPr>
+            <a:picLocks noChangeAspect="1"/>
+          </p:cNvPicPr>
+          <p:nvPr/>
+        </p:nvPicPr>
+        <p:blipFill>
+          <a:blip r:embed="rId3"/>
+          <a:stretch>
+            <a:fillRect/>
+          </a:stretch>
+        </p:blipFill>
+        <p:spPr>
+          <a:xfrm flipH="1">
+            <a:off x="6229350" y="2251492"/>
+            <a:ext cx="2286000" cy="3219450"/>
+          </a:xfrm>
+          <a:prstGeom prst="roundRect">
+            <a:avLst>
+              <a:gd name="adj" fmla="val 4233"/>
+            </a:avLst>
+          </a:prstGeom>
+          <a:solidFill>
+            <a:srgbClr val="FFFFFF">
+              <a:shade val="85000"/>
+            </a:srgbClr>
+          </a:solidFill>
+          <a:ln>
+            <a:noFill/>
+          </a:ln>
+          <a:effectLst>
+            <a:reflection blurRad="12700" stA="38000" endPos="28000" dist="5000" dir="5400000" sy="-100000" algn="bl" rotWithShape="0"/>
+          </a:effectLst>
+        </p:spPr>
+      </p:pic>
     </p:spTree>
     <p:extLst>
       <p:ext uri="{BB962C8B-B14F-4D97-AF65-F5344CB8AC3E}">
-        <p14:creationId xmlns:p14="http://schemas.microsoft.com/office/powerpoint/2010/main" val="3389772446"/>
+        <p14:creationId xmlns:p14="http://schemas.microsoft.com/office/powerpoint/2010/main" val="510845985"/>
       </p:ext>
     </p:extLst>
   </p:cSld>
   <p:clrMapOvr>
     <a:masterClrMapping/>
   </p:clrMapOvr>
+  <p:timing>
+    <p:tnLst>
+      <p:par>
+        <p:cTn id="1" dur="indefinite" restart="never" nodeType="tmRoot">
+          <p:childTnLst>
+            <p:seq concurrent="1" nextAc="seek">
+              <p:cTn id="2" dur="indefinite" nodeType="mainSeq">
+                <p:childTnLst>
+                  <p:par>
+                    <p:cTn id="3" fill="hold">
+                      <p:stCondLst>
+                        <p:cond delay="indefinite"/>
+                      </p:stCondLst>
+                      <p:childTnLst>
+                        <p:par>
+                          <p:cTn id="4" fill="hold">
+                            <p:stCondLst>
+                              <p:cond delay="0"/>
+                            </p:stCondLst>
+                            <p:childTnLst>
+                              <p:par>
+                                <p:cTn id="5" presetID="2" presetClass="entr" presetSubtype="8" fill="hold" grpId="0" nodeType="clickEffect">
+                                  <p:stCondLst>
+                                    <p:cond delay="0"/>
+                                  </p:stCondLst>
+                                  <p:childTnLst>
+                                    <p:set>
+                                      <p:cBhvr>
+                                        <p:cTn id="6" dur="1" fill="hold">
+                                          <p:stCondLst>
+                                            <p:cond delay="0"/>
+                                          </p:stCondLst>
+                                        </p:cTn>
+                                        <p:tgtEl>
+                                          <p:spTgt spid="13">
+                                            <p:txEl>
+                                              <p:pRg st="1" end="1"/>
+                                            </p:txEl>
+                                          </p:spTgt>
+                                        </p:tgtEl>
+                                        <p:attrNameLst>
+                                          <p:attrName>style.visibility</p:attrName>
+                                        </p:attrNameLst>
+                                      </p:cBhvr>
+                                      <p:to>
+                                        <p:strVal val="visible"/>
+                                      </p:to>
+                                    </p:set>
+                                    <p:anim calcmode="lin" valueType="num">
+                                      <p:cBhvr additive="base">
+                                        <p:cTn id="7" dur="250" fill="hold"/>
+                                        <p:tgtEl>
+                                          <p:spTgt spid="13">
+                                            <p:txEl>
+                                              <p:pRg st="1" end="1"/>
+                                            </p:txEl>
+                                          </p:spTgt>
+                                        </p:tgtEl>
+                                        <p:attrNameLst>
+                                          <p:attrName>ppt_x</p:attrName>
+                                        </p:attrNameLst>
+                                      </p:cBhvr>
+                                      <p:tavLst>
+                                        <p:tav tm="0">
+                                          <p:val>
+                                            <p:strVal val="0-#ppt_w/2"/>
+                                          </p:val>
+                                        </p:tav>
+                                        <p:tav tm="100000">
+                                          <p:val>
+                                            <p:strVal val="#ppt_x"/>
+                                          </p:val>
+                                        </p:tav>
+                                      </p:tavLst>
+                                    </p:anim>
+                                    <p:anim calcmode="lin" valueType="num">
+                                      <p:cBhvr additive="base">
+                                        <p:cTn id="8" dur="250" fill="hold"/>
+                                        <p:tgtEl>
+                                          <p:spTgt spid="13">
+                                            <p:txEl>
+                                              <p:pRg st="1" end="1"/>
+                                            </p:txEl>
+                                          </p:spTgt>
+                                        </p:tgtEl>
+                                        <p:attrNameLst>
+                                          <p:attrName>ppt_y</p:attrName>
+                                        </p:attrNameLst>
+                                      </p:cBhvr>
+                                      <p:tavLst>
+                                        <p:tav tm="0">
+                                          <p:val>
+                                            <p:strVal val="#ppt_y"/>
+                                          </p:val>
+                                        </p:tav>
+                                        <p:tav tm="100000">
+                                          <p:val>
+                                            <p:strVal val="#ppt_y"/>
+                                          </p:val>
+                                        </p:tav>
+                                      </p:tavLst>
+                                    </p:anim>
+                                  </p:childTnLst>
+                                </p:cTn>
+                              </p:par>
+                            </p:childTnLst>
+                          </p:cTn>
+                        </p:par>
+                      </p:childTnLst>
+                    </p:cTn>
+                  </p:par>
+                  <p:par>
+                    <p:cTn id="9" fill="hold">
+                      <p:stCondLst>
+                        <p:cond delay="indefinite"/>
+                      </p:stCondLst>
+                      <p:childTnLst>
+                        <p:par>
+                          <p:cTn id="10" fill="hold">
+                            <p:stCondLst>
+                              <p:cond delay="0"/>
+                            </p:stCondLst>
+                            <p:childTnLst>
+                              <p:par>
+                                <p:cTn id="11" presetID="2" presetClass="entr" presetSubtype="8" fill="hold" grpId="0" nodeType="clickEffect">
+                                  <p:stCondLst>
+                                    <p:cond delay="0"/>
+                                  </p:stCondLst>
+                                  <p:childTnLst>
+                                    <p:set>
+                                      <p:cBhvr>
+                                        <p:cTn id="12" dur="1" fill="hold">
+                                          <p:stCondLst>
+                                            <p:cond delay="0"/>
+                                          </p:stCondLst>
+                                        </p:cTn>
+                                        <p:tgtEl>
+                                          <p:spTgt spid="13">
+                                            <p:txEl>
+                                              <p:pRg st="2" end="2"/>
+                                            </p:txEl>
+                                          </p:spTgt>
+                                        </p:tgtEl>
+                                        <p:attrNameLst>
+                                          <p:attrName>style.visibility</p:attrName>
+                                        </p:attrNameLst>
+                                      </p:cBhvr>
+                                      <p:to>
+                                        <p:strVal val="visible"/>
+                                      </p:to>
+                                    </p:set>
+                                    <p:anim calcmode="lin" valueType="num">
+                                      <p:cBhvr additive="base">
+                                        <p:cTn id="13" dur="250" fill="hold"/>
+                                        <p:tgtEl>
+                                          <p:spTgt spid="13">
+                                            <p:txEl>
+                                              <p:pRg st="2" end="2"/>
+                                            </p:txEl>
+                                          </p:spTgt>
+                                        </p:tgtEl>
+                                        <p:attrNameLst>
+                                          <p:attrName>ppt_x</p:attrName>
+                                        </p:attrNameLst>
+                                      </p:cBhvr>
+                                      <p:tavLst>
+                                        <p:tav tm="0">
+                                          <p:val>
+                                            <p:strVal val="0-#ppt_w/2"/>
+                                          </p:val>
+                                        </p:tav>
+                                        <p:tav tm="100000">
+                                          <p:val>
+                                            <p:strVal val="#ppt_x"/>
+                                          </p:val>
+                                        </p:tav>
+                                      </p:tavLst>
+                                    </p:anim>
+                                    <p:anim calcmode="lin" valueType="num">
+                                      <p:cBhvr additive="base">
+                                        <p:cTn id="14" dur="250" fill="hold"/>
+                                        <p:tgtEl>
+                                          <p:spTgt spid="13">
+                                            <p:txEl>
+                                              <p:pRg st="2" end="2"/>
+                                            </p:txEl>
+                                          </p:spTgt>
+                                        </p:tgtEl>
+                                        <p:attrNameLst>
+                                          <p:attrName>ppt_y</p:attrName>
+                                        </p:attrNameLst>
+                                      </p:cBhvr>
+                                      <p:tavLst>
+                                        <p:tav tm="0">
+                                          <p:val>
+                                            <p:strVal val="#ppt_y"/>
+                                          </p:val>
+                                        </p:tav>
+                                        <p:tav tm="100000">
+                                          <p:val>
+                                            <p:strVal val="#ppt_y"/>
+                                          </p:val>
+                                        </p:tav>
+                                      </p:tavLst>
+                                    </p:anim>
+                                  </p:childTnLst>
+                                </p:cTn>
+                              </p:par>
+                            </p:childTnLst>
+                          </p:cTn>
+                        </p:par>
+                      </p:childTnLst>
+                    </p:cTn>
+                  </p:par>
+                  <p:par>
+                    <p:cTn id="15" fill="hold">
+                      <p:stCondLst>
+                        <p:cond delay="indefinite"/>
+                      </p:stCondLst>
+                      <p:childTnLst>
+                        <p:par>
+                          <p:cTn id="16" fill="hold">
+                            <p:stCondLst>
+                              <p:cond delay="0"/>
+                            </p:stCondLst>
+                            <p:childTnLst>
+                              <p:par>
+                                <p:cTn id="17" presetID="2" presetClass="entr" presetSubtype="8" fill="hold" grpId="0" nodeType="clickEffect">
+                                  <p:stCondLst>
+                                    <p:cond delay="0"/>
+                                  </p:stCondLst>
+                                  <p:childTnLst>
+                                    <p:set>
+                                      <p:cBhvr>
+                                        <p:cTn id="18" dur="1" fill="hold">
+                                          <p:stCondLst>
+                                            <p:cond delay="0"/>
+                                          </p:stCondLst>
+                                        </p:cTn>
+                                        <p:tgtEl>
+                                          <p:spTgt spid="13">
+                                            <p:txEl>
+                                              <p:pRg st="3" end="3"/>
+                                            </p:txEl>
+                                          </p:spTgt>
+                                        </p:tgtEl>
+                                        <p:attrNameLst>
+                                          <p:attrName>style.visibility</p:attrName>
+                                        </p:attrNameLst>
+                                      </p:cBhvr>
+                                      <p:to>
+                                        <p:strVal val="visible"/>
+                                      </p:to>
+                                    </p:set>
+                                    <p:anim calcmode="lin" valueType="num">
+                                      <p:cBhvr additive="base">
+                                        <p:cTn id="19" dur="250" fill="hold"/>
+                                        <p:tgtEl>
+                                          <p:spTgt spid="13">
+                                            <p:txEl>
+                                              <p:pRg st="3" end="3"/>
+                                            </p:txEl>
+                                          </p:spTgt>
+                                        </p:tgtEl>
+                                        <p:attrNameLst>
+                                          <p:attrName>ppt_x</p:attrName>
+                                        </p:attrNameLst>
+                                      </p:cBhvr>
+                                      <p:tavLst>
+                                        <p:tav tm="0">
+                                          <p:val>
+                                            <p:strVal val="0-#ppt_w/2"/>
+                                          </p:val>
+                                        </p:tav>
+                                        <p:tav tm="100000">
+                                          <p:val>
+                                            <p:strVal val="#ppt_x"/>
+                                          </p:val>
+                                        </p:tav>
+                                      </p:tavLst>
+                                    </p:anim>
+                                    <p:anim calcmode="lin" valueType="num">
+                                      <p:cBhvr additive="base">
+                                        <p:cTn id="20" dur="250" fill="hold"/>
+                                        <p:tgtEl>
+                                          <p:spTgt spid="13">
+                                            <p:txEl>
+                                              <p:pRg st="3" end="3"/>
+                                            </p:txEl>
+                                          </p:spTgt>
+                                        </p:tgtEl>
+                                        <p:attrNameLst>
+                                          <p:attrName>ppt_y</p:attrName>
+                                        </p:attrNameLst>
+                                      </p:cBhvr>
+                                      <p:tavLst>
+                                        <p:tav tm="0">
+                                          <p:val>
+                                            <p:strVal val="#ppt_y"/>
+                                          </p:val>
+                                        </p:tav>
+                                        <p:tav tm="100000">
+                                          <p:val>
+                                            <p:strVal val="#ppt_y"/>
+                                          </p:val>
+                                        </p:tav>
+                                      </p:tavLst>
+                                    </p:anim>
+                                  </p:childTnLst>
+                                </p:cTn>
+                              </p:par>
+                            </p:childTnLst>
+                          </p:cTn>
+                        </p:par>
+                      </p:childTnLst>
+                    </p:cTn>
+                  </p:par>
+                  <p:par>
+                    <p:cTn id="21" fill="hold">
+                      <p:stCondLst>
+                        <p:cond delay="indefinite"/>
+                      </p:stCondLst>
+                      <p:childTnLst>
+                        <p:par>
+                          <p:cTn id="22" fill="hold">
+                            <p:stCondLst>
+                              <p:cond delay="0"/>
+                            </p:stCondLst>
+                            <p:childTnLst>
+                              <p:par>
+                                <p:cTn id="23" presetID="2" presetClass="entr" presetSubtype="8" fill="hold" grpId="0" nodeType="clickEffect">
+                                  <p:stCondLst>
+                                    <p:cond delay="0"/>
+                                  </p:stCondLst>
+                                  <p:childTnLst>
+                                    <p:set>
+                                      <p:cBhvr>
+                                        <p:cTn id="24" dur="1" fill="hold">
+                                          <p:stCondLst>
+                                            <p:cond delay="0"/>
+                                          </p:stCondLst>
+                                        </p:cTn>
+                                        <p:tgtEl>
+                                          <p:spTgt spid="13">
+                                            <p:txEl>
+                                              <p:pRg st="4" end="4"/>
+                                            </p:txEl>
+                                          </p:spTgt>
+                                        </p:tgtEl>
+                                        <p:attrNameLst>
+                                          <p:attrName>style.visibility</p:attrName>
+                                        </p:attrNameLst>
+                                      </p:cBhvr>
+                                      <p:to>
+                                        <p:strVal val="visible"/>
+                                      </p:to>
+                                    </p:set>
+                                    <p:anim calcmode="lin" valueType="num">
+                                      <p:cBhvr additive="base">
+                                        <p:cTn id="25" dur="250" fill="hold"/>
+                                        <p:tgtEl>
+                                          <p:spTgt spid="13">
+                                            <p:txEl>
+                                              <p:pRg st="4" end="4"/>
+                                            </p:txEl>
+                                          </p:spTgt>
+                                        </p:tgtEl>
+                                        <p:attrNameLst>
+                                          <p:attrName>ppt_x</p:attrName>
+                                        </p:attrNameLst>
+                                      </p:cBhvr>
+                                      <p:tavLst>
+                                        <p:tav tm="0">
+                                          <p:val>
+                                            <p:strVal val="0-#ppt_w/2"/>
+                                          </p:val>
+                                        </p:tav>
+                                        <p:tav tm="100000">
+                                          <p:val>
+                                            <p:strVal val="#ppt_x"/>
+                                          </p:val>
+                                        </p:tav>
+                                      </p:tavLst>
+                                    </p:anim>
+                                    <p:anim calcmode="lin" valueType="num">
+                                      <p:cBhvr additive="base">
+                                        <p:cTn id="26" dur="250" fill="hold"/>
+                                        <p:tgtEl>
+                                          <p:spTgt spid="13">
+                                            <p:txEl>
+                                              <p:pRg st="4" end="4"/>
+                                            </p:txEl>
+                                          </p:spTgt>
+                                        </p:tgtEl>
+                                        <p:attrNameLst>
+                                          <p:attrName>ppt_y</p:attrName>
+                                        </p:attrNameLst>
+                                      </p:cBhvr>
+                                      <p:tavLst>
+                                        <p:tav tm="0">
+                                          <p:val>
+                                            <p:strVal val="#ppt_y"/>
+                                          </p:val>
+                                        </p:tav>
+                                        <p:tav tm="100000">
+                                          <p:val>
+                                            <p:strVal val="#ppt_y"/>
+                                          </p:val>
+                                        </p:tav>
+                                      </p:tavLst>
+                                    </p:anim>
+                                  </p:childTnLst>
+                                </p:cTn>
+                              </p:par>
+                            </p:childTnLst>
+                          </p:cTn>
+                        </p:par>
+                      </p:childTnLst>
+                    </p:cTn>
+                  </p:par>
+                  <p:par>
+                    <p:cTn id="27" fill="hold">
+                      <p:stCondLst>
+                        <p:cond delay="indefinite"/>
+                      </p:stCondLst>
+                      <p:childTnLst>
+                        <p:par>
+                          <p:cTn id="28" fill="hold">
+                            <p:stCondLst>
+                              <p:cond delay="0"/>
+                            </p:stCondLst>
+                            <p:childTnLst>
+                              <p:par>
+                                <p:cTn id="29" presetID="2" presetClass="entr" presetSubtype="8" fill="hold" grpId="0" nodeType="clickEffect">
+                                  <p:stCondLst>
+                                    <p:cond delay="0"/>
+                                  </p:stCondLst>
+                                  <p:childTnLst>
+                                    <p:set>
+                                      <p:cBhvr>
+                                        <p:cTn id="30" dur="1" fill="hold">
+                                          <p:stCondLst>
+                                            <p:cond delay="0"/>
+                                          </p:stCondLst>
+                                        </p:cTn>
+                                        <p:tgtEl>
+                                          <p:spTgt spid="13">
+                                            <p:txEl>
+                                              <p:pRg st="5" end="5"/>
+                                            </p:txEl>
+                                          </p:spTgt>
+                                        </p:tgtEl>
+                                        <p:attrNameLst>
+                                          <p:attrName>style.visibility</p:attrName>
+                                        </p:attrNameLst>
+                                      </p:cBhvr>
+                                      <p:to>
+                                        <p:strVal val="visible"/>
+                                      </p:to>
+                                    </p:set>
+                                    <p:anim calcmode="lin" valueType="num">
+                                      <p:cBhvr additive="base">
+                                        <p:cTn id="31" dur="250" fill="hold"/>
+                                        <p:tgtEl>
+                                          <p:spTgt spid="13">
+                                            <p:txEl>
+                                              <p:pRg st="5" end="5"/>
+                                            </p:txEl>
+                                          </p:spTgt>
+                                        </p:tgtEl>
+                                        <p:attrNameLst>
+                                          <p:attrName>ppt_x</p:attrName>
+                                        </p:attrNameLst>
+                                      </p:cBhvr>
+                                      <p:tavLst>
+                                        <p:tav tm="0">
+                                          <p:val>
+                                            <p:strVal val="0-#ppt_w/2"/>
+                                          </p:val>
+                                        </p:tav>
+                                        <p:tav tm="100000">
+                                          <p:val>
+                                            <p:strVal val="#ppt_x"/>
+                                          </p:val>
+                                        </p:tav>
+                                      </p:tavLst>
+                                    </p:anim>
+                                    <p:anim calcmode="lin" valueType="num">
+                                      <p:cBhvr additive="base">
+                                        <p:cTn id="32" dur="250" fill="hold"/>
+                                        <p:tgtEl>
+                                          <p:spTgt spid="13">
+                                            <p:txEl>
+                                              <p:pRg st="5" end="5"/>
+                                            </p:txEl>
+                                          </p:spTgt>
+                                        </p:tgtEl>
+                                        <p:attrNameLst>
+                                          <p:attrName>ppt_y</p:attrName>
+                                        </p:attrNameLst>
+                                      </p:cBhvr>
+                                      <p:tavLst>
+                                        <p:tav tm="0">
+                                          <p:val>
+                                            <p:strVal val="#ppt_y"/>
+                                          </p:val>
+                                        </p:tav>
+                                        <p:tav tm="100000">
+                                          <p:val>
+                                            <p:strVal val="#ppt_y"/>
+                                          </p:val>
+                                        </p:tav>
+                                      </p:tavLst>
+                                    </p:anim>
+                                  </p:childTnLst>
+                                </p:cTn>
+                              </p:par>
+                            </p:childTnLst>
+                          </p:cTn>
+                        </p:par>
+                      </p:childTnLst>
+                    </p:cTn>
+                  </p:par>
+                  <p:par>
+                    <p:cTn id="33" fill="hold">
+                      <p:stCondLst>
+                        <p:cond delay="indefinite"/>
+                      </p:stCondLst>
+                      <p:childTnLst>
+                        <p:par>
+                          <p:cTn id="34" fill="hold">
+                            <p:stCondLst>
+                              <p:cond delay="0"/>
+                            </p:stCondLst>
+                            <p:childTnLst>
+                              <p:par>
+                                <p:cTn id="35" presetID="2" presetClass="entr" presetSubtype="8" fill="hold" grpId="0" nodeType="clickEffect">
+                                  <p:stCondLst>
+                                    <p:cond delay="0"/>
+                                  </p:stCondLst>
+                                  <p:childTnLst>
+                                    <p:set>
+                                      <p:cBhvr>
+                                        <p:cTn id="36" dur="1" fill="hold">
+                                          <p:stCondLst>
+                                            <p:cond delay="0"/>
+                                          </p:stCondLst>
+                                        </p:cTn>
+                                        <p:tgtEl>
+                                          <p:spTgt spid="13">
+                                            <p:txEl>
+                                              <p:pRg st="6" end="6"/>
+                                            </p:txEl>
+                                          </p:spTgt>
+                                        </p:tgtEl>
+                                        <p:attrNameLst>
+                                          <p:attrName>style.visibility</p:attrName>
+                                        </p:attrNameLst>
+                                      </p:cBhvr>
+                                      <p:to>
+                                        <p:strVal val="visible"/>
+                                      </p:to>
+                                    </p:set>
+                                    <p:anim calcmode="lin" valueType="num">
+                                      <p:cBhvr additive="base">
+                                        <p:cTn id="37" dur="250" fill="hold"/>
+                                        <p:tgtEl>
+                                          <p:spTgt spid="13">
+                                            <p:txEl>
+                                              <p:pRg st="6" end="6"/>
+                                            </p:txEl>
+                                          </p:spTgt>
+                                        </p:tgtEl>
+                                        <p:attrNameLst>
+                                          <p:attrName>ppt_x</p:attrName>
+                                        </p:attrNameLst>
+                                      </p:cBhvr>
+                                      <p:tavLst>
+                                        <p:tav tm="0">
+                                          <p:val>
+                                            <p:strVal val="0-#ppt_w/2"/>
+                                          </p:val>
+                                        </p:tav>
+                                        <p:tav tm="100000">
+                                          <p:val>
+                                            <p:strVal val="#ppt_x"/>
+                                          </p:val>
+                                        </p:tav>
+                                      </p:tavLst>
+                                    </p:anim>
+                                    <p:anim calcmode="lin" valueType="num">
+                                      <p:cBhvr additive="base">
+                                        <p:cTn id="38" dur="250" fill="hold"/>
+                                        <p:tgtEl>
+                                          <p:spTgt spid="13">
+                                            <p:txEl>
+                                              <p:pRg st="6" end="6"/>
+                                            </p:txEl>
+                                          </p:spTgt>
+                                        </p:tgtEl>
+                                        <p:attrNameLst>
+                                          <p:attrName>ppt_y</p:attrName>
+                                        </p:attrNameLst>
+                                      </p:cBhvr>
+                                      <p:tavLst>
+                                        <p:tav tm="0">
+                                          <p:val>
+                                            <p:strVal val="#ppt_y"/>
+                                          </p:val>
+                                        </p:tav>
+                                        <p:tav tm="100000">
+                                          <p:val>
+                                            <p:strVal val="#ppt_y"/>
+                                          </p:val>
+                                        </p:tav>
+                                      </p:tavLst>
+                                    </p:anim>
+                                  </p:childTnLst>
+                                </p:cTn>
+                              </p:par>
+                            </p:childTnLst>
+                          </p:cTn>
+                        </p:par>
+                      </p:childTnLst>
+                    </p:cTn>
+                  </p:par>
+                  <p:par>
+                    <p:cTn id="39" fill="hold">
+                      <p:stCondLst>
+                        <p:cond delay="indefinite"/>
+                      </p:stCondLst>
+                      <p:childTnLst>
+                        <p:par>
+                          <p:cTn id="40" fill="hold">
+                            <p:stCondLst>
+                              <p:cond delay="0"/>
+                            </p:stCondLst>
+                            <p:childTnLst>
+                              <p:par>
+                                <p:cTn id="41" presetID="2" presetClass="entr" presetSubtype="8" fill="hold" grpId="0" nodeType="clickEffect">
+                                  <p:stCondLst>
+                                    <p:cond delay="0"/>
+                                  </p:stCondLst>
+                                  <p:childTnLst>
+                                    <p:set>
+                                      <p:cBhvr>
+                                        <p:cTn id="42" dur="1" fill="hold">
+                                          <p:stCondLst>
+                                            <p:cond delay="0"/>
+                                          </p:stCondLst>
+                                        </p:cTn>
+                                        <p:tgtEl>
+                                          <p:spTgt spid="13">
+                                            <p:txEl>
+                                              <p:pRg st="7" end="7"/>
+                                            </p:txEl>
+                                          </p:spTgt>
+                                        </p:tgtEl>
+                                        <p:attrNameLst>
+                                          <p:attrName>style.visibility</p:attrName>
+                                        </p:attrNameLst>
+                                      </p:cBhvr>
+                                      <p:to>
+                                        <p:strVal val="visible"/>
+                                      </p:to>
+                                    </p:set>
+                                    <p:anim calcmode="lin" valueType="num">
+                                      <p:cBhvr additive="base">
+                                        <p:cTn id="43" dur="250" fill="hold"/>
+                                        <p:tgtEl>
+                                          <p:spTgt spid="13">
+                                            <p:txEl>
+                                              <p:pRg st="7" end="7"/>
+                                            </p:txEl>
+                                          </p:spTgt>
+                                        </p:tgtEl>
+                                        <p:attrNameLst>
+                                          <p:attrName>ppt_x</p:attrName>
+                                        </p:attrNameLst>
+                                      </p:cBhvr>
+                                      <p:tavLst>
+                                        <p:tav tm="0">
+                                          <p:val>
+                                            <p:strVal val="0-#ppt_w/2"/>
+                                          </p:val>
+                                        </p:tav>
+                                        <p:tav tm="100000">
+                                          <p:val>
+                                            <p:strVal val="#ppt_x"/>
+                                          </p:val>
+                                        </p:tav>
+                                      </p:tavLst>
+                                    </p:anim>
+                                    <p:anim calcmode="lin" valueType="num">
+                                      <p:cBhvr additive="base">
+                                        <p:cTn id="44" dur="250" fill="hold"/>
+                                        <p:tgtEl>
+                                          <p:spTgt spid="13">
+                                            <p:txEl>
+                                              <p:pRg st="7" end="7"/>
+                                            </p:txEl>
+                                          </p:spTgt>
+                                        </p:tgtEl>
+                                        <p:attrNameLst>
+                                          <p:attrName>ppt_y</p:attrName>
+                                        </p:attrNameLst>
+                                      </p:cBhvr>
+                                      <p:tavLst>
+                                        <p:tav tm="0">
+                                          <p:val>
+                                            <p:strVal val="#ppt_y"/>
+                                          </p:val>
+                                        </p:tav>
+                                        <p:tav tm="100000">
+                                          <p:val>
+                                            <p:strVal val="#ppt_y"/>
+                                          </p:val>
+                                        </p:tav>
+                                      </p:tavLst>
+                                    </p:anim>
+                                  </p:childTnLst>
+                                </p:cTn>
+                              </p:par>
+                            </p:childTnLst>
+                          </p:cTn>
+                        </p:par>
+                      </p:childTnLst>
+                    </p:cTn>
+                  </p:par>
+                  <p:par>
+                    <p:cTn id="45" fill="hold">
+                      <p:stCondLst>
+                        <p:cond delay="indefinite"/>
+                      </p:stCondLst>
+                      <p:childTnLst>
+                        <p:par>
+                          <p:cTn id="46" fill="hold">
+                            <p:stCondLst>
+                              <p:cond delay="0"/>
+                            </p:stCondLst>
+                            <p:childTnLst>
+                              <p:par>
+                                <p:cTn id="47" presetID="2" presetClass="entr" presetSubtype="8" fill="hold" grpId="0" nodeType="clickEffect">
+                                  <p:stCondLst>
+                                    <p:cond delay="0"/>
+                                  </p:stCondLst>
+                                  <p:childTnLst>
+                                    <p:set>
+                                      <p:cBhvr>
+                                        <p:cTn id="48" dur="1" fill="hold">
+                                          <p:stCondLst>
+                                            <p:cond delay="0"/>
+                                          </p:stCondLst>
+                                        </p:cTn>
+                                        <p:tgtEl>
+                                          <p:spTgt spid="13">
+                                            <p:txEl>
+                                              <p:pRg st="8" end="8"/>
+                                            </p:txEl>
+                                          </p:spTgt>
+                                        </p:tgtEl>
+                                        <p:attrNameLst>
+                                          <p:attrName>style.visibility</p:attrName>
+                                        </p:attrNameLst>
+                                      </p:cBhvr>
+                                      <p:to>
+                                        <p:strVal val="visible"/>
+                                      </p:to>
+                                    </p:set>
+                                    <p:anim calcmode="lin" valueType="num">
+                                      <p:cBhvr additive="base">
+                                        <p:cTn id="49" dur="250" fill="hold"/>
+                                        <p:tgtEl>
+                                          <p:spTgt spid="13">
+                                            <p:txEl>
+                                              <p:pRg st="8" end="8"/>
+                                            </p:txEl>
+                                          </p:spTgt>
+                                        </p:tgtEl>
+                                        <p:attrNameLst>
+                                          <p:attrName>ppt_x</p:attrName>
+                                        </p:attrNameLst>
+                                      </p:cBhvr>
+                                      <p:tavLst>
+                                        <p:tav tm="0">
+                                          <p:val>
+                                            <p:strVal val="0-#ppt_w/2"/>
+                                          </p:val>
+                                        </p:tav>
+                                        <p:tav tm="100000">
+                                          <p:val>
+                                            <p:strVal val="#ppt_x"/>
+                                          </p:val>
+                                        </p:tav>
+                                      </p:tavLst>
+                                    </p:anim>
+                                    <p:anim calcmode="lin" valueType="num">
+                                      <p:cBhvr additive="base">
+                                        <p:cTn id="50" dur="250" fill="hold"/>
+                                        <p:tgtEl>
+                                          <p:spTgt spid="13">
+                                            <p:txEl>
+                                              <p:pRg st="8" end="8"/>
+                                            </p:txEl>
+                                          </p:spTgt>
+                                        </p:tgtEl>
+                                        <p:attrNameLst>
+                                          <p:attrName>ppt_y</p:attrName>
+                                        </p:attrNameLst>
+                                      </p:cBhvr>
+                                      <p:tavLst>
+                                        <p:tav tm="0">
+                                          <p:val>
+                                            <p:strVal val="#ppt_y"/>
+                                          </p:val>
+                                        </p:tav>
+                                        <p:tav tm="100000">
+                                          <p:val>
+                                            <p:strVal val="#ppt_y"/>
+                                          </p:val>
+                                        </p:tav>
+                                      </p:tavLst>
+                                    </p:anim>
+                                  </p:childTnLst>
+                                </p:cTn>
+                              </p:par>
+                            </p:childTnLst>
+                          </p:cTn>
+                        </p:par>
+                      </p:childTnLst>
+                    </p:cTn>
+                  </p:par>
+                </p:childTnLst>
+              </p:cTn>
+              <p:prevCondLst>
+                <p:cond evt="onPrev" delay="0">
+                  <p:tgtEl>
+                    <p:sldTgt/>
+                  </p:tgtEl>
+                </p:cond>
+              </p:prevCondLst>
+              <p:nextCondLst>
+                <p:cond evt="onNext" delay="0">
+                  <p:tgtEl>
+                    <p:sldTgt/>
+                  </p:tgtEl>
+                </p:cond>
+              </p:nextCondLst>
+            </p:seq>
+          </p:childTnLst>
+        </p:cTn>
+      </p:par>
+    </p:tnLst>
+    <p:bldLst>
+      <p:bldP spid="13" grpId="0" uiExpand="1" build="p"/>
+    </p:bldLst>
+  </p:timing>
 </p:sld>
 </file>
 
@@ -5983,7 +8799,7 @@
           <a:p>
             <a:r>
               <a:rPr lang="hr-HR" dirty="0"/>
-              <a:t>Arhitektura sustava</a:t>
+              <a:t>Pregled zahtjeva</a:t>
             </a:r>
           </a:p>
         </p:txBody>
@@ -6005,13 +8821,29 @@
           <a:p>
             <a:r>
               <a:rPr lang="hr-HR" dirty="0"/>
-              <a:t>Na visokoj razini apstrakcije</a:t>
-            </a:r>
-          </a:p>
-          <a:p>
+              <a:t>Lista glavnih funkcionalnih zahtjeva (</a:t>
+            </a:r>
+            <a:r>
+              <a:rPr lang="hr-HR" dirty="0" err="1"/>
+              <a:t>max</a:t>
+            </a:r>
             <a:r>
               <a:rPr lang="hr-HR" dirty="0"/>
-              <a:t>Obavezno staviti dijagram </a:t>
+              <a:t> 1 slajd)</a:t>
+            </a:r>
+          </a:p>
+          <a:p>
+            <a:r>
+              <a:rPr lang="hr-HR" dirty="0"/>
+              <a:t>Nefunkcionalni i zahtjevi domene primjene (</a:t>
+            </a:r>
+            <a:r>
+              <a:rPr lang="hr-HR" dirty="0" err="1"/>
+              <a:t>max</a:t>
+            </a:r>
+            <a:r>
+              <a:rPr lang="hr-HR" dirty="0"/>
+              <a:t> 1 slajd)</a:t>
             </a:r>
           </a:p>
         </p:txBody>
@@ -6042,7 +8874,7 @@
     </p:spTree>
     <p:extLst>
       <p:ext uri="{BB962C8B-B14F-4D97-AF65-F5344CB8AC3E}">
-        <p14:creationId xmlns:p14="http://schemas.microsoft.com/office/powerpoint/2010/main" val="3657354464"/>
+        <p14:creationId xmlns:p14="http://schemas.microsoft.com/office/powerpoint/2010/main" val="3161375826"/>
       </p:ext>
     </p:extLst>
   </p:cSld>
@@ -6086,7 +8918,7 @@
           <a:p>
             <a:r>
               <a:rPr lang="hr-HR" dirty="0"/>
-              <a:t>Organizacija rada</a:t>
+              <a:t>Korišteni alati i tehnologije</a:t>
             </a:r>
           </a:p>
         </p:txBody>
@@ -6108,14 +8940,14 @@
           <a:p>
             <a:r>
               <a:rPr lang="hr-HR" dirty="0"/>
-              <a:t>Vremenska linija razvoja (specifikacija, implementacija, ispitivanje, dokumentiranje)</a:t>
+              <a:t>Popis svih korištenih alata (za izradu programske podrške, dokumentacije, komunikaciju i upravljanje)</a:t>
             </a:r>
           </a:p>
           <a:p>
             <a:pPr lvl="1"/>
             <a:r>
               <a:rPr lang="hr-HR" dirty="0"/>
-              <a:t>Poželjan grafički prikaz</a:t>
+              <a:t>Poželjno staviti linkove za web stranice pojedinih</a:t>
             </a:r>
           </a:p>
           <a:p>
@@ -6127,16 +8959,36 @@
           <a:p>
             <a:r>
               <a:rPr lang="hr-HR" dirty="0"/>
-              <a:t>Raspodjela posla po članovima tima (koliko </a:t>
+              <a:t>Korišteni programski jezici i tehnologije</a:t>
+            </a:r>
+          </a:p>
+          <a:p>
+            <a:pPr lvl="1"/>
+            <a:r>
+              <a:rPr lang="hr-HR" dirty="0"/>
+              <a:t>Naznačiti što je korišteno za front </a:t>
             </a:r>
             <a:r>
               <a:rPr lang="hr-HR" dirty="0" err="1"/>
-              <a:t>developera</a:t>
+              <a:t>end</a:t>
             </a:r>
             <a:r>
               <a:rPr lang="hr-HR" dirty="0"/>
-              <a:t>, koliko testera…)</a:t>
-            </a:r>
+              <a:t> a što za </a:t>
+            </a:r>
+            <a:r>
+              <a:rPr lang="hr-HR" dirty="0" err="1"/>
+              <a:t>back</a:t>
+            </a:r>
+            <a:r>
+              <a:rPr lang="hr-HR" dirty="0"/>
+              <a:t> </a:t>
+            </a:r>
+            <a:r>
+              <a:rPr lang="hr-HR" dirty="0" err="1"/>
+              <a:t>end</a:t>
+            </a:r>
+            <a:endParaRPr lang="hr-HR" dirty="0"/>
           </a:p>
         </p:txBody>
       </p:sp>
@@ -6166,7 +9018,7 @@
     </p:spTree>
     <p:extLst>
       <p:ext uri="{BB962C8B-B14F-4D97-AF65-F5344CB8AC3E}">
-        <p14:creationId xmlns:p14="http://schemas.microsoft.com/office/powerpoint/2010/main" val="4285223946"/>
+        <p14:creationId xmlns:p14="http://schemas.microsoft.com/office/powerpoint/2010/main" val="3389772446"/>
       </p:ext>
     </p:extLst>
   </p:cSld>

</xml_diff>

<commit_message>
dodane sve vrste korisnika
</commit_message>
<xml_diff>
--- a/Dokumentacija/Prezentacija/EventkoPreza.pptx
+++ b/Dokumentacija/Prezentacija/EventkoPreza.pptx
@@ -5,7 +5,7 @@
     <p:sldMasterId id="2147483687" r:id="rId1"/>
   </p:sldMasterIdLst>
   <p:notesMasterIdLst>
-    <p:notesMasterId r:id="rId15"/>
+    <p:notesMasterId r:id="rId19"/>
   </p:notesMasterIdLst>
   <p:sldIdLst>
     <p:sldId id="256" r:id="rId2"/>
@@ -15,12 +15,16 @@
     <p:sldId id="266" r:id="rId6"/>
     <p:sldId id="268" r:id="rId7"/>
     <p:sldId id="267" r:id="rId8"/>
-    <p:sldId id="259" r:id="rId9"/>
-    <p:sldId id="260" r:id="rId10"/>
-    <p:sldId id="261" r:id="rId11"/>
-    <p:sldId id="262" r:id="rId12"/>
-    <p:sldId id="263" r:id="rId13"/>
-    <p:sldId id="264" r:id="rId14"/>
+    <p:sldId id="270" r:id="rId9"/>
+    <p:sldId id="269" r:id="rId10"/>
+    <p:sldId id="271" r:id="rId11"/>
+    <p:sldId id="272" r:id="rId12"/>
+    <p:sldId id="259" r:id="rId13"/>
+    <p:sldId id="260" r:id="rId14"/>
+    <p:sldId id="261" r:id="rId15"/>
+    <p:sldId id="262" r:id="rId16"/>
+    <p:sldId id="263" r:id="rId17"/>
+    <p:sldId id="264" r:id="rId18"/>
   </p:sldIdLst>
   <p:sldSz cx="9144000" cy="6858000" type="screen4x3"/>
   <p:notesSz cx="6858000" cy="9144000"/>
@@ -209,7 +213,7 @@
           <a:p>
             <a:fld id="{A57596D4-CB16-4BAD-83F6-7E8077D61F81}" type="datetimeFigureOut">
               <a:rPr lang="hr-HR" smtClean="0"/>
-              <a:t>15.1.2023.</a:t>
+              <a:t>16.1.2023.</a:t>
             </a:fld>
             <a:endParaRPr lang="hr-HR"/>
           </a:p>
@@ -3906,7 +3910,7 @@
           <a:p>
             <a:fld id="{E46E8F5E-7C26-4DBA-9CDF-6E3092DFB447}" type="datetime1">
               <a:rPr lang="hr-HR" smtClean="0"/>
-              <a:t>15.1.2023.</a:t>
+              <a:t>16.1.2023.</a:t>
             </a:fld>
             <a:endParaRPr lang="hr-HR"/>
           </a:p>
@@ -4132,7 +4136,7 @@
           <a:p>
             <a:fld id="{E46E8F5E-7C26-4DBA-9CDF-6E3092DFB447}" type="datetime1">
               <a:rPr lang="hr-HR" smtClean="0"/>
-              <a:t>15.1.2023.</a:t>
+              <a:t>16.1.2023.</a:t>
             </a:fld>
             <a:endParaRPr lang="hr-HR"/>
           </a:p>
@@ -4777,9 +4781,51 @@
           <a:chExt cx="0" cy="0"/>
         </a:xfrm>
       </p:grpSpPr>
+      <p:pic>
+        <p:nvPicPr>
+          <p:cNvPr id="10" name="Picture 9" descr="A picture containing shape&#10;&#10;Description automatically generated">
+            <a:extLst>
+              <a:ext uri="{FF2B5EF4-FFF2-40B4-BE49-F238E27FC236}">
+                <a16:creationId xmlns:a16="http://schemas.microsoft.com/office/drawing/2014/main" id="{837EEEFC-BFA1-BDDA-9AA8-FB552547934E}"/>
+              </a:ext>
+            </a:extLst>
+          </p:cNvPr>
+          <p:cNvPicPr>
+            <a:picLocks noChangeAspect="1"/>
+          </p:cNvPicPr>
+          <p:nvPr/>
+        </p:nvPicPr>
+        <p:blipFill>
+          <a:blip r:embed="rId2">
+            <a:extLst>
+              <a:ext uri="{28A0092B-C50C-407E-A947-70E740481C1C}">
+                <a14:useLocalDpi xmlns:a14="http://schemas.microsoft.com/office/drawing/2010/main" val="0"/>
+              </a:ext>
+            </a:extLst>
+          </a:blip>
+          <a:stretch>
+            <a:fillRect/>
+          </a:stretch>
+        </p:blipFill>
+        <p:spPr>
+          <a:xfrm>
+            <a:off x="0" y="0"/>
+            <a:ext cx="9144000" cy="6858000"/>
+          </a:xfrm>
+          <a:prstGeom prst="rect">
+            <a:avLst/>
+          </a:prstGeom>
+        </p:spPr>
+      </p:pic>
       <p:sp>
         <p:nvSpPr>
-          <p:cNvPr id="2" name="Title 1"/>
+          <p:cNvPr id="11" name="Title 1">
+            <a:extLst>
+              <a:ext uri="{FF2B5EF4-FFF2-40B4-BE49-F238E27FC236}">
+                <a16:creationId xmlns:a16="http://schemas.microsoft.com/office/drawing/2014/main" id="{AA86832F-F2B3-C482-7320-2650822E5AAA}"/>
+              </a:ext>
+            </a:extLst>
+          </p:cNvPr>
           <p:cNvSpPr>
             <a:spLocks noGrp="1"/>
           </p:cNvSpPr>
@@ -4787,21 +4833,39 @@
             <p:ph type="title"/>
           </p:nvPr>
         </p:nvSpPr>
-        <p:spPr/>
+        <p:spPr>
+          <a:xfrm>
+            <a:off x="628650" y="365127"/>
+            <a:ext cx="7886700" cy="844838"/>
+          </a:xfrm>
+        </p:spPr>
         <p:txBody>
-          <a:bodyPr/>
+          <a:bodyPr>
+            <a:noAutofit/>
+          </a:bodyPr>
           <a:lstStyle/>
           <a:p>
             <a:r>
-              <a:rPr lang="hr-HR" dirty="0"/>
-              <a:t>Arhitektura sustava</a:t>
+              <a:rPr lang="hr-HR" sz="3200" dirty="0">
+                <a:solidFill>
+                  <a:schemeClr val="bg1"/>
+                </a:solidFill>
+                <a:latin typeface="PrimaSans BT" panose="020B0803030604020204" pitchFamily="34" charset="0"/>
+              </a:rPr>
+              <a:t>Vrste korisnika</a:t>
             </a:r>
           </a:p>
         </p:txBody>
       </p:sp>
       <p:sp>
         <p:nvSpPr>
-          <p:cNvPr id="3" name="Content Placeholder 2"/>
+          <p:cNvPr id="13" name="Content Placeholder 2">
+            <a:extLst>
+              <a:ext uri="{FF2B5EF4-FFF2-40B4-BE49-F238E27FC236}">
+                <a16:creationId xmlns:a16="http://schemas.microsoft.com/office/drawing/2014/main" id="{2B10E8CC-9103-CB2F-FAB7-5BC90D4F1E25}"/>
+              </a:ext>
+            </a:extLst>
+          </p:cNvPr>
           <p:cNvSpPr>
             <a:spLocks noGrp="1"/>
           </p:cNvSpPr>
@@ -4809,57 +4873,480 @@
             <p:ph idx="1"/>
           </p:nvPr>
         </p:nvSpPr>
-        <p:spPr/>
+        <p:spPr>
+          <a:xfrm>
+            <a:off x="628652" y="1395554"/>
+            <a:ext cx="3281666" cy="4931327"/>
+          </a:xfrm>
+        </p:spPr>
         <p:txBody>
           <a:bodyPr/>
           <a:lstStyle/>
           <a:p>
-            <a:r>
-              <a:rPr lang="hr-HR" dirty="0"/>
-              <a:t>Na visokoj razini apstrakcije</a:t>
-            </a:r>
-          </a:p>
-          <a:p>
-            <a:r>
-              <a:rPr lang="hr-HR" dirty="0"/>
-              <a:t>Obavezno staviti dijagram </a:t>
-            </a:r>
+            <a:pPr marL="0" indent="0">
+              <a:buNone/>
+            </a:pPr>
+            <a:r>
+              <a:rPr lang="hr-HR" sz="3200" dirty="0" err="1">
+                <a:solidFill>
+                  <a:schemeClr val="bg1"/>
+                </a:solidFill>
+                <a:latin typeface="Bahnschrift SemiBold SemiConden" panose="020B0502040204020203" pitchFamily="34" charset="0"/>
+              </a:rPr>
+              <a:t>Admin</a:t>
+            </a:r>
+            <a:endParaRPr lang="hr-HR" sz="3200" dirty="0">
+              <a:solidFill>
+                <a:schemeClr val="bg1"/>
+              </a:solidFill>
+              <a:latin typeface="Bahnschrift SemiBold SemiConden" panose="020B0502040204020203" pitchFamily="34" charset="0"/>
+            </a:endParaRPr>
+          </a:p>
+          <a:p>
+            <a:r>
+              <a:rPr lang="hr-HR" sz="2400" dirty="0">
+                <a:solidFill>
+                  <a:schemeClr val="bg1"/>
+                </a:solidFill>
+                <a:latin typeface="Bahnschrift SemiBold SemiConden" panose="020B0502040204020203" pitchFamily="34" charset="0"/>
+              </a:rPr>
+              <a:t>Može sve što i moderator, a uz to:</a:t>
+            </a:r>
+          </a:p>
+          <a:p>
+            <a:pPr lvl="1"/>
+            <a:r>
+              <a:rPr lang="hr-HR" sz="2400" dirty="0">
+                <a:solidFill>
+                  <a:schemeClr val="bg1"/>
+                </a:solidFill>
+                <a:latin typeface="Bahnschrift SemiBold SemiConden" panose="020B0502040204020203" pitchFamily="34" charset="0"/>
+              </a:rPr>
+              <a:t>Promovirati korisnika u moderatora</a:t>
+            </a:r>
+          </a:p>
+          <a:p>
+            <a:pPr lvl="1"/>
+            <a:r>
+              <a:rPr lang="hr-HR" sz="2400" dirty="0">
+                <a:solidFill>
+                  <a:schemeClr val="bg1"/>
+                </a:solidFill>
+                <a:latin typeface="Bahnschrift SemiBold SemiConden" panose="020B0502040204020203" pitchFamily="34" charset="0"/>
+              </a:rPr>
+              <a:t>Brisati korisničke račune</a:t>
+            </a:r>
+            <a:endParaRPr lang="hr-HR" dirty="0">
+              <a:solidFill>
+                <a:schemeClr val="bg1"/>
+              </a:solidFill>
+              <a:latin typeface="Bahnschrift SemiBold SemiConden" panose="020B0502040204020203" pitchFamily="34" charset="0"/>
+            </a:endParaRPr>
+          </a:p>
+          <a:p>
+            <a:endParaRPr lang="hr-HR" dirty="0">
+              <a:solidFill>
+                <a:schemeClr val="bg1"/>
+              </a:solidFill>
+              <a:latin typeface="Bahnschrift SemiBold SemiConden" panose="020B0502040204020203" pitchFamily="34" charset="0"/>
+            </a:endParaRPr>
           </a:p>
         </p:txBody>
       </p:sp>
-      <p:sp>
-        <p:nvSpPr>
-          <p:cNvPr id="4" name="Slide Number Placeholder 3"/>
-          <p:cNvSpPr>
-            <a:spLocks noGrp="1"/>
-          </p:cNvSpPr>
-          <p:nvPr>
-            <p:ph type="sldNum" sz="quarter" idx="12"/>
-          </p:nvPr>
-        </p:nvSpPr>
-        <p:spPr/>
-        <p:txBody>
-          <a:bodyPr/>
-          <a:lstStyle/>
-          <a:p>
-            <a:fld id="{FAA41844-C0CA-4144-9D6C-D993F0C0FAB4}" type="slidenum">
-              <a:rPr lang="hr-HR" smtClean="0"/>
-              <a:t>10</a:t>
-            </a:fld>
-            <a:endParaRPr lang="hr-HR"/>
-          </a:p>
-        </p:txBody>
-      </p:sp>
+      <p:pic>
+        <p:nvPicPr>
+          <p:cNvPr id="3" name="Picture 2">
+            <a:extLst>
+              <a:ext uri="{FF2B5EF4-FFF2-40B4-BE49-F238E27FC236}">
+                <a16:creationId xmlns:a16="http://schemas.microsoft.com/office/drawing/2014/main" id="{DDD2EBB3-EE33-A219-AE80-10F939439817}"/>
+              </a:ext>
+            </a:extLst>
+          </p:cNvPr>
+          <p:cNvPicPr>
+            <a:picLocks noChangeAspect="1"/>
+          </p:cNvPicPr>
+          <p:nvPr/>
+        </p:nvPicPr>
+        <p:blipFill>
+          <a:blip r:embed="rId3">
+            <a:extLst>
+              <a:ext uri="{28A0092B-C50C-407E-A947-70E740481C1C}">
+                <a14:useLocalDpi xmlns:a14="http://schemas.microsoft.com/office/drawing/2010/main" val="0"/>
+              </a:ext>
+            </a:extLst>
+          </a:blip>
+          <a:stretch>
+            <a:fillRect/>
+          </a:stretch>
+        </p:blipFill>
+        <p:spPr>
+          <a:xfrm>
+            <a:off x="4112285" y="1635142"/>
+            <a:ext cx="4829747" cy="4452150"/>
+          </a:xfrm>
+          <a:prstGeom prst="rect">
+            <a:avLst/>
+          </a:prstGeom>
+          <a:ln>
+            <a:noFill/>
+          </a:ln>
+          <a:effectLst>
+            <a:softEdge rad="112500"/>
+          </a:effectLst>
+        </p:spPr>
+      </p:pic>
     </p:spTree>
     <p:extLst>
       <p:ext uri="{BB962C8B-B14F-4D97-AF65-F5344CB8AC3E}">
-        <p14:creationId xmlns:p14="http://schemas.microsoft.com/office/powerpoint/2010/main" val="3657354464"/>
+        <p14:creationId xmlns:p14="http://schemas.microsoft.com/office/powerpoint/2010/main" val="3800548732"/>
       </p:ext>
     </p:extLst>
   </p:cSld>
   <p:clrMapOvr>
     <a:masterClrMapping/>
   </p:clrMapOvr>
+  <p:timing>
+    <p:tnLst>
+      <p:par>
+        <p:cTn id="1" dur="indefinite" restart="never" nodeType="tmRoot">
+          <p:childTnLst>
+            <p:seq concurrent="1" nextAc="seek">
+              <p:cTn id="2" dur="indefinite" nodeType="mainSeq">
+                <p:childTnLst>
+                  <p:par>
+                    <p:cTn id="3" fill="hold">
+                      <p:stCondLst>
+                        <p:cond delay="indefinite"/>
+                      </p:stCondLst>
+                      <p:childTnLst>
+                        <p:par>
+                          <p:cTn id="4" fill="hold">
+                            <p:stCondLst>
+                              <p:cond delay="0"/>
+                            </p:stCondLst>
+                            <p:childTnLst>
+                              <p:par>
+                                <p:cTn id="5" presetID="2" presetClass="entr" presetSubtype="8" fill="hold" grpId="0" nodeType="clickEffect">
+                                  <p:stCondLst>
+                                    <p:cond delay="0"/>
+                                  </p:stCondLst>
+                                  <p:childTnLst>
+                                    <p:set>
+                                      <p:cBhvr>
+                                        <p:cTn id="6" dur="1" fill="hold">
+                                          <p:stCondLst>
+                                            <p:cond delay="0"/>
+                                          </p:stCondLst>
+                                        </p:cTn>
+                                        <p:tgtEl>
+                                          <p:spTgt spid="13">
+                                            <p:txEl>
+                                              <p:pRg st="1" end="1"/>
+                                            </p:txEl>
+                                          </p:spTgt>
+                                        </p:tgtEl>
+                                        <p:attrNameLst>
+                                          <p:attrName>style.visibility</p:attrName>
+                                        </p:attrNameLst>
+                                      </p:cBhvr>
+                                      <p:to>
+                                        <p:strVal val="visible"/>
+                                      </p:to>
+                                    </p:set>
+                                    <p:anim calcmode="lin" valueType="num">
+                                      <p:cBhvr additive="base">
+                                        <p:cTn id="7" dur="500" fill="hold"/>
+                                        <p:tgtEl>
+                                          <p:spTgt spid="13">
+                                            <p:txEl>
+                                              <p:pRg st="1" end="1"/>
+                                            </p:txEl>
+                                          </p:spTgt>
+                                        </p:tgtEl>
+                                        <p:attrNameLst>
+                                          <p:attrName>ppt_x</p:attrName>
+                                        </p:attrNameLst>
+                                      </p:cBhvr>
+                                      <p:tavLst>
+                                        <p:tav tm="0">
+                                          <p:val>
+                                            <p:strVal val="0-#ppt_w/2"/>
+                                          </p:val>
+                                        </p:tav>
+                                        <p:tav tm="100000">
+                                          <p:val>
+                                            <p:strVal val="#ppt_x"/>
+                                          </p:val>
+                                        </p:tav>
+                                      </p:tavLst>
+                                    </p:anim>
+                                    <p:anim calcmode="lin" valueType="num">
+                                      <p:cBhvr additive="base">
+                                        <p:cTn id="8" dur="500" fill="hold"/>
+                                        <p:tgtEl>
+                                          <p:spTgt spid="13">
+                                            <p:txEl>
+                                              <p:pRg st="1" end="1"/>
+                                            </p:txEl>
+                                          </p:spTgt>
+                                        </p:tgtEl>
+                                        <p:attrNameLst>
+                                          <p:attrName>ppt_y</p:attrName>
+                                        </p:attrNameLst>
+                                      </p:cBhvr>
+                                      <p:tavLst>
+                                        <p:tav tm="0">
+                                          <p:val>
+                                            <p:strVal val="#ppt_y"/>
+                                          </p:val>
+                                        </p:tav>
+                                        <p:tav tm="100000">
+                                          <p:val>
+                                            <p:strVal val="#ppt_y"/>
+                                          </p:val>
+                                        </p:tav>
+                                      </p:tavLst>
+                                    </p:anim>
+                                  </p:childTnLst>
+                                </p:cTn>
+                              </p:par>
+                            </p:childTnLst>
+                          </p:cTn>
+                        </p:par>
+                      </p:childTnLst>
+                    </p:cTn>
+                  </p:par>
+                  <p:par>
+                    <p:cTn id="9" fill="hold">
+                      <p:stCondLst>
+                        <p:cond delay="indefinite"/>
+                      </p:stCondLst>
+                      <p:childTnLst>
+                        <p:par>
+                          <p:cTn id="10" fill="hold">
+                            <p:stCondLst>
+                              <p:cond delay="0"/>
+                            </p:stCondLst>
+                            <p:childTnLst>
+                              <p:par>
+                                <p:cTn id="11" presetID="2" presetClass="entr" presetSubtype="8" fill="hold" nodeType="clickEffect">
+                                  <p:stCondLst>
+                                    <p:cond delay="0"/>
+                                  </p:stCondLst>
+                                  <p:childTnLst>
+                                    <p:set>
+                                      <p:cBhvr>
+                                        <p:cTn id="12" dur="1" fill="hold">
+                                          <p:stCondLst>
+                                            <p:cond delay="0"/>
+                                          </p:stCondLst>
+                                        </p:cTn>
+                                        <p:tgtEl>
+                                          <p:spTgt spid="13">
+                                            <p:txEl>
+                                              <p:pRg st="2" end="2"/>
+                                            </p:txEl>
+                                          </p:spTgt>
+                                        </p:tgtEl>
+                                        <p:attrNameLst>
+                                          <p:attrName>style.visibility</p:attrName>
+                                        </p:attrNameLst>
+                                      </p:cBhvr>
+                                      <p:to>
+                                        <p:strVal val="visible"/>
+                                      </p:to>
+                                    </p:set>
+                                    <p:anim calcmode="lin" valueType="num">
+                                      <p:cBhvr additive="base">
+                                        <p:cTn id="13" dur="500" fill="hold"/>
+                                        <p:tgtEl>
+                                          <p:spTgt spid="13">
+                                            <p:txEl>
+                                              <p:pRg st="2" end="2"/>
+                                            </p:txEl>
+                                          </p:spTgt>
+                                        </p:tgtEl>
+                                        <p:attrNameLst>
+                                          <p:attrName>ppt_x</p:attrName>
+                                        </p:attrNameLst>
+                                      </p:cBhvr>
+                                      <p:tavLst>
+                                        <p:tav tm="0">
+                                          <p:val>
+                                            <p:strVal val="0-#ppt_w/2"/>
+                                          </p:val>
+                                        </p:tav>
+                                        <p:tav tm="100000">
+                                          <p:val>
+                                            <p:strVal val="#ppt_x"/>
+                                          </p:val>
+                                        </p:tav>
+                                      </p:tavLst>
+                                    </p:anim>
+                                    <p:anim calcmode="lin" valueType="num">
+                                      <p:cBhvr additive="base">
+                                        <p:cTn id="14" dur="500" fill="hold"/>
+                                        <p:tgtEl>
+                                          <p:spTgt spid="13">
+                                            <p:txEl>
+                                              <p:pRg st="2" end="2"/>
+                                            </p:txEl>
+                                          </p:spTgt>
+                                        </p:tgtEl>
+                                        <p:attrNameLst>
+                                          <p:attrName>ppt_y</p:attrName>
+                                        </p:attrNameLst>
+                                      </p:cBhvr>
+                                      <p:tavLst>
+                                        <p:tav tm="0">
+                                          <p:val>
+                                            <p:strVal val="#ppt_y"/>
+                                          </p:val>
+                                        </p:tav>
+                                        <p:tav tm="100000">
+                                          <p:val>
+                                            <p:strVal val="#ppt_y"/>
+                                          </p:val>
+                                        </p:tav>
+                                      </p:tavLst>
+                                    </p:anim>
+                                  </p:childTnLst>
+                                </p:cTn>
+                              </p:par>
+                            </p:childTnLst>
+                          </p:cTn>
+                        </p:par>
+                      </p:childTnLst>
+                    </p:cTn>
+                  </p:par>
+                  <p:par>
+                    <p:cTn id="15" fill="hold">
+                      <p:stCondLst>
+                        <p:cond delay="indefinite"/>
+                      </p:stCondLst>
+                      <p:childTnLst>
+                        <p:par>
+                          <p:cTn id="16" fill="hold">
+                            <p:stCondLst>
+                              <p:cond delay="0"/>
+                            </p:stCondLst>
+                            <p:childTnLst>
+                              <p:par>
+                                <p:cTn id="17" presetID="2" presetClass="entr" presetSubtype="8" fill="hold" nodeType="clickEffect">
+                                  <p:stCondLst>
+                                    <p:cond delay="0"/>
+                                  </p:stCondLst>
+                                  <p:childTnLst>
+                                    <p:set>
+                                      <p:cBhvr>
+                                        <p:cTn id="18" dur="1" fill="hold">
+                                          <p:stCondLst>
+                                            <p:cond delay="0"/>
+                                          </p:stCondLst>
+                                        </p:cTn>
+                                        <p:tgtEl>
+                                          <p:spTgt spid="13">
+                                            <p:txEl>
+                                              <p:pRg st="3" end="3"/>
+                                            </p:txEl>
+                                          </p:spTgt>
+                                        </p:tgtEl>
+                                        <p:attrNameLst>
+                                          <p:attrName>style.visibility</p:attrName>
+                                        </p:attrNameLst>
+                                      </p:cBhvr>
+                                      <p:to>
+                                        <p:strVal val="visible"/>
+                                      </p:to>
+                                    </p:set>
+                                    <p:anim calcmode="lin" valueType="num">
+                                      <p:cBhvr additive="base">
+                                        <p:cTn id="19" dur="500" fill="hold"/>
+                                        <p:tgtEl>
+                                          <p:spTgt spid="13">
+                                            <p:txEl>
+                                              <p:pRg st="3" end="3"/>
+                                            </p:txEl>
+                                          </p:spTgt>
+                                        </p:tgtEl>
+                                        <p:attrNameLst>
+                                          <p:attrName>ppt_x</p:attrName>
+                                        </p:attrNameLst>
+                                      </p:cBhvr>
+                                      <p:tavLst>
+                                        <p:tav tm="0">
+                                          <p:val>
+                                            <p:strVal val="0-#ppt_w/2"/>
+                                          </p:val>
+                                        </p:tav>
+                                        <p:tav tm="100000">
+                                          <p:val>
+                                            <p:strVal val="#ppt_x"/>
+                                          </p:val>
+                                        </p:tav>
+                                      </p:tavLst>
+                                    </p:anim>
+                                    <p:anim calcmode="lin" valueType="num">
+                                      <p:cBhvr additive="base">
+                                        <p:cTn id="20" dur="500" fill="hold"/>
+                                        <p:tgtEl>
+                                          <p:spTgt spid="13">
+                                            <p:txEl>
+                                              <p:pRg st="3" end="3"/>
+                                            </p:txEl>
+                                          </p:spTgt>
+                                        </p:tgtEl>
+                                        <p:attrNameLst>
+                                          <p:attrName>ppt_y</p:attrName>
+                                        </p:attrNameLst>
+                                      </p:cBhvr>
+                                      <p:tavLst>
+                                        <p:tav tm="0">
+                                          <p:val>
+                                            <p:strVal val="#ppt_y"/>
+                                          </p:val>
+                                        </p:tav>
+                                        <p:tav tm="100000">
+                                          <p:val>
+                                            <p:strVal val="#ppt_y"/>
+                                          </p:val>
+                                        </p:tav>
+                                      </p:tavLst>
+                                    </p:anim>
+                                  </p:childTnLst>
+                                </p:cTn>
+                              </p:par>
+                            </p:childTnLst>
+                          </p:cTn>
+                        </p:par>
+                      </p:childTnLst>
+                    </p:cTn>
+                  </p:par>
+                </p:childTnLst>
+              </p:cTn>
+              <p:prevCondLst>
+                <p:cond evt="onPrev" delay="0">
+                  <p:tgtEl>
+                    <p:sldTgt/>
+                  </p:tgtEl>
+                </p:cond>
+              </p:prevCondLst>
+              <p:nextCondLst>
+                <p:cond evt="onNext" delay="0">
+                  <p:tgtEl>
+                    <p:sldTgt/>
+                  </p:tgtEl>
+                </p:cond>
+              </p:nextCondLst>
+            </p:seq>
+          </p:childTnLst>
+        </p:cTn>
+      </p:par>
+    </p:tnLst>
+    <p:bldLst>
+      <p:bldP spid="13" grpId="0" build="p"/>
+    </p:bldLst>
+  </p:timing>
 </p:sld>
 </file>
 
@@ -4880,9 +5367,51 @@
           <a:chExt cx="0" cy="0"/>
         </a:xfrm>
       </p:grpSpPr>
+      <p:pic>
+        <p:nvPicPr>
+          <p:cNvPr id="10" name="Picture 9" descr="A picture containing shape&#10;&#10;Description automatically generated">
+            <a:extLst>
+              <a:ext uri="{FF2B5EF4-FFF2-40B4-BE49-F238E27FC236}">
+                <a16:creationId xmlns:a16="http://schemas.microsoft.com/office/drawing/2014/main" id="{837EEEFC-BFA1-BDDA-9AA8-FB552547934E}"/>
+              </a:ext>
+            </a:extLst>
+          </p:cNvPr>
+          <p:cNvPicPr>
+            <a:picLocks noChangeAspect="1"/>
+          </p:cNvPicPr>
+          <p:nvPr/>
+        </p:nvPicPr>
+        <p:blipFill>
+          <a:blip r:embed="rId2">
+            <a:extLst>
+              <a:ext uri="{28A0092B-C50C-407E-A947-70E740481C1C}">
+                <a14:useLocalDpi xmlns:a14="http://schemas.microsoft.com/office/drawing/2010/main" val="0"/>
+              </a:ext>
+            </a:extLst>
+          </a:blip>
+          <a:stretch>
+            <a:fillRect/>
+          </a:stretch>
+        </p:blipFill>
+        <p:spPr>
+          <a:xfrm>
+            <a:off x="0" y="0"/>
+            <a:ext cx="9144000" cy="6858000"/>
+          </a:xfrm>
+          <a:prstGeom prst="rect">
+            <a:avLst/>
+          </a:prstGeom>
+        </p:spPr>
+      </p:pic>
       <p:sp>
         <p:nvSpPr>
-          <p:cNvPr id="2" name="Title 1"/>
+          <p:cNvPr id="11" name="Title 1">
+            <a:extLst>
+              <a:ext uri="{FF2B5EF4-FFF2-40B4-BE49-F238E27FC236}">
+                <a16:creationId xmlns:a16="http://schemas.microsoft.com/office/drawing/2014/main" id="{AA86832F-F2B3-C482-7320-2650822E5AAA}"/>
+              </a:ext>
+            </a:extLst>
+          </p:cNvPr>
           <p:cNvSpPr>
             <a:spLocks noGrp="1"/>
           </p:cNvSpPr>
@@ -4890,21 +5419,39 @@
             <p:ph type="title"/>
           </p:nvPr>
         </p:nvSpPr>
-        <p:spPr/>
+        <p:spPr>
+          <a:xfrm>
+            <a:off x="628650" y="365127"/>
+            <a:ext cx="7886700" cy="844838"/>
+          </a:xfrm>
+        </p:spPr>
         <p:txBody>
-          <a:bodyPr/>
+          <a:bodyPr>
+            <a:noAutofit/>
+          </a:bodyPr>
           <a:lstStyle/>
           <a:p>
             <a:r>
-              <a:rPr lang="hr-HR" dirty="0"/>
-              <a:t>Organizacija rada</a:t>
+              <a:rPr lang="hr-HR" sz="3200" dirty="0">
+                <a:solidFill>
+                  <a:schemeClr val="bg1"/>
+                </a:solidFill>
+                <a:latin typeface="PrimaSans BT" panose="020B0803030604020204" pitchFamily="34" charset="0"/>
+              </a:rPr>
+              <a:t>Isticanje korisnika</a:t>
             </a:r>
           </a:p>
         </p:txBody>
       </p:sp>
       <p:sp>
         <p:nvSpPr>
-          <p:cNvPr id="3" name="Content Placeholder 2"/>
+          <p:cNvPr id="13" name="Content Placeholder 2">
+            <a:extLst>
+              <a:ext uri="{FF2B5EF4-FFF2-40B4-BE49-F238E27FC236}">
+                <a16:creationId xmlns:a16="http://schemas.microsoft.com/office/drawing/2014/main" id="{2B10E8CC-9103-CB2F-FAB7-5BC90D4F1E25}"/>
+              </a:ext>
+            </a:extLst>
+          </p:cNvPr>
           <p:cNvSpPr>
             <a:spLocks noGrp="1"/>
           </p:cNvSpPr>
@@ -4912,78 +5459,558 @@
             <p:ph idx="1"/>
           </p:nvPr>
         </p:nvSpPr>
-        <p:spPr/>
+        <p:spPr>
+          <a:xfrm>
+            <a:off x="628650" y="1395554"/>
+            <a:ext cx="7886700" cy="4931327"/>
+          </a:xfrm>
+        </p:spPr>
         <p:txBody>
           <a:bodyPr/>
           <a:lstStyle/>
           <a:p>
             <a:r>
-              <a:rPr lang="hr-HR" dirty="0"/>
-              <a:t>Vremenska linija razvoja (specifikacija, implementacija, ispitivanje, dokumentiranje)</a:t>
-            </a:r>
-          </a:p>
-          <a:p>
-            <a:pPr lvl="1"/>
-            <a:r>
-              <a:rPr lang="hr-HR" dirty="0"/>
-              <a:t>Poželjan grafički prikaz</a:t>
-            </a:r>
-          </a:p>
-          <a:p>
-            <a:pPr marL="457200" lvl="1" indent="0">
-              <a:buNone/>
-            </a:pPr>
-            <a:endParaRPr lang="hr-HR" dirty="0"/>
-          </a:p>
-          <a:p>
-            <a:r>
-              <a:rPr lang="hr-HR" dirty="0"/>
-              <a:t>Raspodjela posla po članovima tima (koliko </a:t>
-            </a:r>
-            <a:r>
-              <a:rPr lang="hr-HR" dirty="0" err="1"/>
-              <a:t>developera</a:t>
-            </a:r>
-            <a:r>
-              <a:rPr lang="hr-HR" dirty="0"/>
-              <a:t>, koliko testera…)</a:t>
-            </a:r>
+              <a:rPr lang="hr-HR" dirty="0">
+                <a:solidFill>
+                  <a:schemeClr val="bg1"/>
+                </a:solidFill>
+                <a:latin typeface="Bahnschrift SemiBold SemiConden" panose="020B0502040204020203" pitchFamily="34" charset="0"/>
+              </a:rPr>
+              <a:t>Svaki korisnik može označiti za evente na kojima je bio jesu li mu se sviđali ili ne</a:t>
+            </a:r>
+          </a:p>
+          <a:p>
+            <a:r>
+              <a:rPr lang="hr-HR" dirty="0">
+                <a:solidFill>
+                  <a:schemeClr val="bg1"/>
+                </a:solidFill>
+                <a:latin typeface="Bahnschrift SemiBold SemiConden" panose="020B0502040204020203" pitchFamily="34" charset="0"/>
+              </a:rPr>
+              <a:t>Broj lajkova koje određeni korisnik primi je javno vidljiv</a:t>
+            </a:r>
+          </a:p>
+          <a:p>
+            <a:r>
+              <a:rPr lang="hr-HR" dirty="0">
+                <a:solidFill>
+                  <a:schemeClr val="bg1"/>
+                </a:solidFill>
+                <a:latin typeface="Bahnschrift SemiBold SemiConden" panose="020B0502040204020203" pitchFamily="34" charset="0"/>
+              </a:rPr>
+              <a:t>Najaktivniji korisnici su istaknuti na Home </a:t>
+            </a:r>
+            <a:r>
+              <a:rPr lang="hr-HR" dirty="0" err="1">
+                <a:solidFill>
+                  <a:schemeClr val="bg1"/>
+                </a:solidFill>
+                <a:latin typeface="Bahnschrift SemiBold SemiConden" panose="020B0502040204020203" pitchFamily="34" charset="0"/>
+              </a:rPr>
+              <a:t>pageu</a:t>
+            </a:r>
+            <a:endParaRPr lang="hr-HR" dirty="0">
+              <a:solidFill>
+                <a:schemeClr val="bg1"/>
+              </a:solidFill>
+              <a:latin typeface="Bahnschrift SemiBold SemiConden" panose="020B0502040204020203" pitchFamily="34" charset="0"/>
+            </a:endParaRPr>
           </a:p>
         </p:txBody>
       </p:sp>
-      <p:sp>
-        <p:nvSpPr>
-          <p:cNvPr id="4" name="Slide Number Placeholder 3"/>
-          <p:cNvSpPr>
-            <a:spLocks noGrp="1"/>
-          </p:cNvSpPr>
-          <p:nvPr>
-            <p:ph type="sldNum" sz="quarter" idx="12"/>
-          </p:nvPr>
-        </p:nvSpPr>
-        <p:spPr/>
-        <p:txBody>
-          <a:bodyPr/>
-          <a:lstStyle/>
-          <a:p>
-            <a:fld id="{FAA41844-C0CA-4144-9D6C-D993F0C0FAB4}" type="slidenum">
-              <a:rPr lang="hr-HR" smtClean="0"/>
-              <a:t>11</a:t>
-            </a:fld>
-            <a:endParaRPr lang="hr-HR"/>
-          </a:p>
-        </p:txBody>
-      </p:sp>
+      <p:pic>
+        <p:nvPicPr>
+          <p:cNvPr id="3" name="Picture 2">
+            <a:extLst>
+              <a:ext uri="{FF2B5EF4-FFF2-40B4-BE49-F238E27FC236}">
+                <a16:creationId xmlns:a16="http://schemas.microsoft.com/office/drawing/2014/main" id="{9D12D845-BE2D-C768-256C-48600EE51A13}"/>
+              </a:ext>
+            </a:extLst>
+          </p:cNvPr>
+          <p:cNvPicPr>
+            <a:picLocks noChangeAspect="1"/>
+          </p:cNvPicPr>
+          <p:nvPr/>
+        </p:nvPicPr>
+        <p:blipFill>
+          <a:blip r:embed="rId3"/>
+          <a:stretch>
+            <a:fillRect/>
+          </a:stretch>
+        </p:blipFill>
+        <p:spPr>
+          <a:xfrm>
+            <a:off x="3266893" y="4728885"/>
+            <a:ext cx="2610214" cy="1324160"/>
+          </a:xfrm>
+          <a:prstGeom prst="rect">
+            <a:avLst/>
+          </a:prstGeom>
+          <a:ln w="38100" cap="sq">
+            <a:solidFill>
+              <a:srgbClr val="FFFF00"/>
+            </a:solidFill>
+            <a:prstDash val="solid"/>
+            <a:miter lim="800000"/>
+          </a:ln>
+          <a:effectLst>
+            <a:glow rad="101600">
+              <a:schemeClr val="accent4">
+                <a:satMod val="175000"/>
+                <a:alpha val="40000"/>
+              </a:schemeClr>
+            </a:glow>
+            <a:outerShdw blurRad="50800" dist="38100" dir="2700000" algn="tl" rotWithShape="0">
+              <a:prstClr val="black">
+                <a:alpha val="40000"/>
+              </a:prstClr>
+            </a:outerShdw>
+          </a:effectLst>
+        </p:spPr>
+      </p:pic>
     </p:spTree>
     <p:extLst>
       <p:ext uri="{BB962C8B-B14F-4D97-AF65-F5344CB8AC3E}">
-        <p14:creationId xmlns:p14="http://schemas.microsoft.com/office/powerpoint/2010/main" val="4285223946"/>
+        <p14:creationId xmlns:p14="http://schemas.microsoft.com/office/powerpoint/2010/main" val="2517850578"/>
       </p:ext>
     </p:extLst>
   </p:cSld>
   <p:clrMapOvr>
     <a:masterClrMapping/>
   </p:clrMapOvr>
+  <p:timing>
+    <p:tnLst>
+      <p:par>
+        <p:cTn id="1" dur="indefinite" restart="never" nodeType="tmRoot">
+          <p:childTnLst>
+            <p:seq concurrent="1" nextAc="seek">
+              <p:cTn id="2" dur="indefinite" nodeType="mainSeq">
+                <p:childTnLst>
+                  <p:par>
+                    <p:cTn id="3" fill="hold">
+                      <p:stCondLst>
+                        <p:cond delay="indefinite"/>
+                      </p:stCondLst>
+                      <p:childTnLst>
+                        <p:par>
+                          <p:cTn id="4" fill="hold">
+                            <p:stCondLst>
+                              <p:cond delay="0"/>
+                            </p:stCondLst>
+                            <p:childTnLst>
+                              <p:par>
+                                <p:cTn id="5" presetID="2" presetClass="entr" presetSubtype="8" fill="hold" grpId="0" nodeType="clickEffect">
+                                  <p:stCondLst>
+                                    <p:cond delay="0"/>
+                                  </p:stCondLst>
+                                  <p:childTnLst>
+                                    <p:set>
+                                      <p:cBhvr>
+                                        <p:cTn id="6" dur="1" fill="hold">
+                                          <p:stCondLst>
+                                            <p:cond delay="0"/>
+                                          </p:stCondLst>
+                                        </p:cTn>
+                                        <p:tgtEl>
+                                          <p:spTgt spid="13">
+                                            <p:txEl>
+                                              <p:pRg st="0" end="0"/>
+                                            </p:txEl>
+                                          </p:spTgt>
+                                        </p:tgtEl>
+                                        <p:attrNameLst>
+                                          <p:attrName>style.visibility</p:attrName>
+                                        </p:attrNameLst>
+                                      </p:cBhvr>
+                                      <p:to>
+                                        <p:strVal val="visible"/>
+                                      </p:to>
+                                    </p:set>
+                                    <p:anim calcmode="lin" valueType="num">
+                                      <p:cBhvr additive="base">
+                                        <p:cTn id="7" dur="250" fill="hold"/>
+                                        <p:tgtEl>
+                                          <p:spTgt spid="13">
+                                            <p:txEl>
+                                              <p:pRg st="0" end="0"/>
+                                            </p:txEl>
+                                          </p:spTgt>
+                                        </p:tgtEl>
+                                        <p:attrNameLst>
+                                          <p:attrName>ppt_x</p:attrName>
+                                        </p:attrNameLst>
+                                      </p:cBhvr>
+                                      <p:tavLst>
+                                        <p:tav tm="0">
+                                          <p:val>
+                                            <p:strVal val="0-#ppt_w/2"/>
+                                          </p:val>
+                                        </p:tav>
+                                        <p:tav tm="100000">
+                                          <p:val>
+                                            <p:strVal val="#ppt_x"/>
+                                          </p:val>
+                                        </p:tav>
+                                      </p:tavLst>
+                                    </p:anim>
+                                    <p:anim calcmode="lin" valueType="num">
+                                      <p:cBhvr additive="base">
+                                        <p:cTn id="8" dur="250" fill="hold"/>
+                                        <p:tgtEl>
+                                          <p:spTgt spid="13">
+                                            <p:txEl>
+                                              <p:pRg st="0" end="0"/>
+                                            </p:txEl>
+                                          </p:spTgt>
+                                        </p:tgtEl>
+                                        <p:attrNameLst>
+                                          <p:attrName>ppt_y</p:attrName>
+                                        </p:attrNameLst>
+                                      </p:cBhvr>
+                                      <p:tavLst>
+                                        <p:tav tm="0">
+                                          <p:val>
+                                            <p:strVal val="#ppt_y"/>
+                                          </p:val>
+                                        </p:tav>
+                                        <p:tav tm="100000">
+                                          <p:val>
+                                            <p:strVal val="#ppt_y"/>
+                                          </p:val>
+                                        </p:tav>
+                                      </p:tavLst>
+                                    </p:anim>
+                                  </p:childTnLst>
+                                </p:cTn>
+                              </p:par>
+                            </p:childTnLst>
+                          </p:cTn>
+                        </p:par>
+                      </p:childTnLst>
+                    </p:cTn>
+                  </p:par>
+                  <p:par>
+                    <p:cTn id="9" fill="hold">
+                      <p:stCondLst>
+                        <p:cond delay="indefinite"/>
+                      </p:stCondLst>
+                      <p:childTnLst>
+                        <p:par>
+                          <p:cTn id="10" fill="hold">
+                            <p:stCondLst>
+                              <p:cond delay="0"/>
+                            </p:stCondLst>
+                            <p:childTnLst>
+                              <p:par>
+                                <p:cTn id="11" presetID="2" presetClass="entr" presetSubtype="8" fill="hold" grpId="0" nodeType="clickEffect">
+                                  <p:stCondLst>
+                                    <p:cond delay="0"/>
+                                  </p:stCondLst>
+                                  <p:childTnLst>
+                                    <p:set>
+                                      <p:cBhvr>
+                                        <p:cTn id="12" dur="1" fill="hold">
+                                          <p:stCondLst>
+                                            <p:cond delay="0"/>
+                                          </p:stCondLst>
+                                        </p:cTn>
+                                        <p:tgtEl>
+                                          <p:spTgt spid="13">
+                                            <p:txEl>
+                                              <p:pRg st="1" end="1"/>
+                                            </p:txEl>
+                                          </p:spTgt>
+                                        </p:tgtEl>
+                                        <p:attrNameLst>
+                                          <p:attrName>style.visibility</p:attrName>
+                                        </p:attrNameLst>
+                                      </p:cBhvr>
+                                      <p:to>
+                                        <p:strVal val="visible"/>
+                                      </p:to>
+                                    </p:set>
+                                    <p:anim calcmode="lin" valueType="num">
+                                      <p:cBhvr additive="base">
+                                        <p:cTn id="13" dur="250" fill="hold"/>
+                                        <p:tgtEl>
+                                          <p:spTgt spid="13">
+                                            <p:txEl>
+                                              <p:pRg st="1" end="1"/>
+                                            </p:txEl>
+                                          </p:spTgt>
+                                        </p:tgtEl>
+                                        <p:attrNameLst>
+                                          <p:attrName>ppt_x</p:attrName>
+                                        </p:attrNameLst>
+                                      </p:cBhvr>
+                                      <p:tavLst>
+                                        <p:tav tm="0">
+                                          <p:val>
+                                            <p:strVal val="0-#ppt_w/2"/>
+                                          </p:val>
+                                        </p:tav>
+                                        <p:tav tm="100000">
+                                          <p:val>
+                                            <p:strVal val="#ppt_x"/>
+                                          </p:val>
+                                        </p:tav>
+                                      </p:tavLst>
+                                    </p:anim>
+                                    <p:anim calcmode="lin" valueType="num">
+                                      <p:cBhvr additive="base">
+                                        <p:cTn id="14" dur="250" fill="hold"/>
+                                        <p:tgtEl>
+                                          <p:spTgt spid="13">
+                                            <p:txEl>
+                                              <p:pRg st="1" end="1"/>
+                                            </p:txEl>
+                                          </p:spTgt>
+                                        </p:tgtEl>
+                                        <p:attrNameLst>
+                                          <p:attrName>ppt_y</p:attrName>
+                                        </p:attrNameLst>
+                                      </p:cBhvr>
+                                      <p:tavLst>
+                                        <p:tav tm="0">
+                                          <p:val>
+                                            <p:strVal val="#ppt_y"/>
+                                          </p:val>
+                                        </p:tav>
+                                        <p:tav tm="100000">
+                                          <p:val>
+                                            <p:strVal val="#ppt_y"/>
+                                          </p:val>
+                                        </p:tav>
+                                      </p:tavLst>
+                                    </p:anim>
+                                  </p:childTnLst>
+                                </p:cTn>
+                              </p:par>
+                            </p:childTnLst>
+                          </p:cTn>
+                        </p:par>
+                      </p:childTnLst>
+                    </p:cTn>
+                  </p:par>
+                  <p:par>
+                    <p:cTn id="15" fill="hold">
+                      <p:stCondLst>
+                        <p:cond delay="indefinite"/>
+                      </p:stCondLst>
+                      <p:childTnLst>
+                        <p:par>
+                          <p:cTn id="16" fill="hold">
+                            <p:stCondLst>
+                              <p:cond delay="0"/>
+                            </p:stCondLst>
+                            <p:childTnLst>
+                              <p:par>
+                                <p:cTn id="17" presetID="2" presetClass="entr" presetSubtype="8" fill="hold" grpId="0" nodeType="clickEffect">
+                                  <p:stCondLst>
+                                    <p:cond delay="0"/>
+                                  </p:stCondLst>
+                                  <p:childTnLst>
+                                    <p:set>
+                                      <p:cBhvr>
+                                        <p:cTn id="18" dur="1" fill="hold">
+                                          <p:stCondLst>
+                                            <p:cond delay="0"/>
+                                          </p:stCondLst>
+                                        </p:cTn>
+                                        <p:tgtEl>
+                                          <p:spTgt spid="13">
+                                            <p:txEl>
+                                              <p:pRg st="2" end="2"/>
+                                            </p:txEl>
+                                          </p:spTgt>
+                                        </p:tgtEl>
+                                        <p:attrNameLst>
+                                          <p:attrName>style.visibility</p:attrName>
+                                        </p:attrNameLst>
+                                      </p:cBhvr>
+                                      <p:to>
+                                        <p:strVal val="visible"/>
+                                      </p:to>
+                                    </p:set>
+                                    <p:anim calcmode="lin" valueType="num">
+                                      <p:cBhvr additive="base">
+                                        <p:cTn id="19" dur="250" fill="hold"/>
+                                        <p:tgtEl>
+                                          <p:spTgt spid="13">
+                                            <p:txEl>
+                                              <p:pRg st="2" end="2"/>
+                                            </p:txEl>
+                                          </p:spTgt>
+                                        </p:tgtEl>
+                                        <p:attrNameLst>
+                                          <p:attrName>ppt_x</p:attrName>
+                                        </p:attrNameLst>
+                                      </p:cBhvr>
+                                      <p:tavLst>
+                                        <p:tav tm="0">
+                                          <p:val>
+                                            <p:strVal val="0-#ppt_w/2"/>
+                                          </p:val>
+                                        </p:tav>
+                                        <p:tav tm="100000">
+                                          <p:val>
+                                            <p:strVal val="#ppt_x"/>
+                                          </p:val>
+                                        </p:tav>
+                                      </p:tavLst>
+                                    </p:anim>
+                                    <p:anim calcmode="lin" valueType="num">
+                                      <p:cBhvr additive="base">
+                                        <p:cTn id="20" dur="250" fill="hold"/>
+                                        <p:tgtEl>
+                                          <p:spTgt spid="13">
+                                            <p:txEl>
+                                              <p:pRg st="2" end="2"/>
+                                            </p:txEl>
+                                          </p:spTgt>
+                                        </p:tgtEl>
+                                        <p:attrNameLst>
+                                          <p:attrName>ppt_y</p:attrName>
+                                        </p:attrNameLst>
+                                      </p:cBhvr>
+                                      <p:tavLst>
+                                        <p:tav tm="0">
+                                          <p:val>
+                                            <p:strVal val="#ppt_y"/>
+                                          </p:val>
+                                        </p:tav>
+                                        <p:tav tm="100000">
+                                          <p:val>
+                                            <p:strVal val="#ppt_y"/>
+                                          </p:val>
+                                        </p:tav>
+                                      </p:tavLst>
+                                    </p:anim>
+                                  </p:childTnLst>
+                                </p:cTn>
+                              </p:par>
+                            </p:childTnLst>
+                          </p:cTn>
+                        </p:par>
+                      </p:childTnLst>
+                    </p:cTn>
+                  </p:par>
+                  <p:par>
+                    <p:cTn id="21" fill="hold">
+                      <p:stCondLst>
+                        <p:cond delay="indefinite"/>
+                      </p:stCondLst>
+                      <p:childTnLst>
+                        <p:par>
+                          <p:cTn id="22" fill="hold">
+                            <p:stCondLst>
+                              <p:cond delay="0"/>
+                            </p:stCondLst>
+                            <p:childTnLst>
+                              <p:par>
+                                <p:cTn id="23" presetID="2" presetClass="entr" presetSubtype="4" fill="hold" nodeType="clickEffect">
+                                  <p:stCondLst>
+                                    <p:cond delay="0"/>
+                                  </p:stCondLst>
+                                  <p:childTnLst>
+                                    <p:set>
+                                      <p:cBhvr>
+                                        <p:cTn id="24" dur="1" fill="hold">
+                                          <p:stCondLst>
+                                            <p:cond delay="0"/>
+                                          </p:stCondLst>
+                                        </p:cTn>
+                                        <p:tgtEl>
+                                          <p:spTgt spid="3"/>
+                                        </p:tgtEl>
+                                        <p:attrNameLst>
+                                          <p:attrName>style.visibility</p:attrName>
+                                        </p:attrNameLst>
+                                      </p:cBhvr>
+                                      <p:to>
+                                        <p:strVal val="visible"/>
+                                      </p:to>
+                                    </p:set>
+                                    <p:anim calcmode="lin" valueType="num">
+                                      <p:cBhvr additive="base">
+                                        <p:cTn id="25" dur="500" fill="hold"/>
+                                        <p:tgtEl>
+                                          <p:spTgt spid="3"/>
+                                        </p:tgtEl>
+                                        <p:attrNameLst>
+                                          <p:attrName>ppt_x</p:attrName>
+                                        </p:attrNameLst>
+                                      </p:cBhvr>
+                                      <p:tavLst>
+                                        <p:tav tm="0">
+                                          <p:val>
+                                            <p:strVal val="#ppt_x"/>
+                                          </p:val>
+                                        </p:tav>
+                                        <p:tav tm="100000">
+                                          <p:val>
+                                            <p:strVal val="#ppt_x"/>
+                                          </p:val>
+                                        </p:tav>
+                                      </p:tavLst>
+                                    </p:anim>
+                                    <p:anim calcmode="lin" valueType="num">
+                                      <p:cBhvr additive="base">
+                                        <p:cTn id="26" dur="500" fill="hold"/>
+                                        <p:tgtEl>
+                                          <p:spTgt spid="3"/>
+                                        </p:tgtEl>
+                                        <p:attrNameLst>
+                                          <p:attrName>ppt_y</p:attrName>
+                                        </p:attrNameLst>
+                                      </p:cBhvr>
+                                      <p:tavLst>
+                                        <p:tav tm="0">
+                                          <p:val>
+                                            <p:strVal val="1+#ppt_h/2"/>
+                                          </p:val>
+                                        </p:tav>
+                                        <p:tav tm="100000">
+                                          <p:val>
+                                            <p:strVal val="#ppt_y"/>
+                                          </p:val>
+                                        </p:tav>
+                                      </p:tavLst>
+                                    </p:anim>
+                                  </p:childTnLst>
+                                </p:cTn>
+                              </p:par>
+                            </p:childTnLst>
+                          </p:cTn>
+                        </p:par>
+                      </p:childTnLst>
+                    </p:cTn>
+                  </p:par>
+                </p:childTnLst>
+              </p:cTn>
+              <p:prevCondLst>
+                <p:cond evt="onPrev" delay="0">
+                  <p:tgtEl>
+                    <p:sldTgt/>
+                  </p:tgtEl>
+                </p:cond>
+              </p:prevCondLst>
+              <p:nextCondLst>
+                <p:cond evt="onNext" delay="0">
+                  <p:tgtEl>
+                    <p:sldTgt/>
+                  </p:tgtEl>
+                </p:cond>
+              </p:nextCondLst>
+            </p:seq>
+          </p:childTnLst>
+        </p:cTn>
+      </p:par>
+    </p:tnLst>
+    <p:bldLst>
+      <p:bldP spid="13" grpId="0" build="p"/>
+    </p:bldLst>
+  </p:timing>
 </p:sld>
 </file>
 
@@ -5021,7 +6048,7 @@
           <a:p>
             <a:r>
               <a:rPr lang="hr-HR" dirty="0"/>
-              <a:t>Naučene lekcije</a:t>
+              <a:t>Pregled zahtjeva</a:t>
             </a:r>
           </a:p>
         </p:txBody>
@@ -5043,30 +6070,30 @@
           <a:p>
             <a:r>
               <a:rPr lang="hr-HR" dirty="0"/>
-              <a:t>Što je bilo dobro, a što je moglo bolje</a:t>
-            </a:r>
-          </a:p>
-          <a:p>
-            <a:pPr lvl="1"/>
+              <a:t>Lista glavnih funkcionalnih zahtjeva (</a:t>
+            </a:r>
+            <a:r>
+              <a:rPr lang="hr-HR" dirty="0" err="1"/>
+              <a:t>max</a:t>
+            </a:r>
             <a:r>
               <a:rPr lang="hr-HR" dirty="0"/>
-              <a:t>A što se nikako ne bi smjelo ponoviti </a:t>
-            </a:r>
-            <a:r>
-              <a:rPr lang="hr-HR" dirty="0">
-                <a:sym typeface="Wingdings" panose="05000000000000000000" pitchFamily="2" charset="2"/>
-              </a:rPr>
-              <a:t></a:t>
-            </a:r>
-          </a:p>
-          <a:p>
-            <a:pPr lvl="1"/>
-            <a:endParaRPr lang="hr-HR" dirty="0">
-              <a:sym typeface="Wingdings" panose="05000000000000000000" pitchFamily="2" charset="2"/>
-            </a:endParaRPr>
-          </a:p>
-          <a:p>
-            <a:endParaRPr lang="hr-HR" dirty="0"/>
+              <a:t> 1 slajd)</a:t>
+            </a:r>
+          </a:p>
+          <a:p>
+            <a:r>
+              <a:rPr lang="hr-HR" dirty="0"/>
+              <a:t>Nefunkcionalni i zahtjevi domene primjene (</a:t>
+            </a:r>
+            <a:r>
+              <a:rPr lang="hr-HR" dirty="0" err="1"/>
+              <a:t>max</a:t>
+            </a:r>
+            <a:r>
+              <a:rPr lang="hr-HR" dirty="0"/>
+              <a:t> 1 slajd)</a:t>
+            </a:r>
           </a:p>
         </p:txBody>
       </p:sp>
@@ -5096,7 +6123,7 @@
     </p:spTree>
     <p:extLst>
       <p:ext uri="{BB962C8B-B14F-4D97-AF65-F5344CB8AC3E}">
-        <p14:creationId xmlns:p14="http://schemas.microsoft.com/office/powerpoint/2010/main" val="48259320"/>
+        <p14:creationId xmlns:p14="http://schemas.microsoft.com/office/powerpoint/2010/main" val="3161375826"/>
       </p:ext>
     </p:extLst>
   </p:cSld>
@@ -5139,6 +6166,496 @@
           <a:lstStyle/>
           <a:p>
             <a:r>
+              <a:rPr lang="hr-HR" dirty="0"/>
+              <a:t>Korišteni alati i tehnologije</a:t>
+            </a:r>
+          </a:p>
+        </p:txBody>
+      </p:sp>
+      <p:sp>
+        <p:nvSpPr>
+          <p:cNvPr id="3" name="Content Placeholder 2"/>
+          <p:cNvSpPr>
+            <a:spLocks noGrp="1"/>
+          </p:cNvSpPr>
+          <p:nvPr>
+            <p:ph idx="1"/>
+          </p:nvPr>
+        </p:nvSpPr>
+        <p:spPr/>
+        <p:txBody>
+          <a:bodyPr/>
+          <a:lstStyle/>
+          <a:p>
+            <a:r>
+              <a:rPr lang="hr-HR" dirty="0"/>
+              <a:t>Popis svih korištenih alata (za izradu programske podrške, dokumentacije, komunikaciju i upravljanje)</a:t>
+            </a:r>
+          </a:p>
+          <a:p>
+            <a:pPr lvl="1"/>
+            <a:r>
+              <a:rPr lang="hr-HR" dirty="0"/>
+              <a:t>Poželjno staviti linkove za web stranice pojedinih</a:t>
+            </a:r>
+          </a:p>
+          <a:p>
+            <a:pPr marL="457200" lvl="1" indent="0">
+              <a:buNone/>
+            </a:pPr>
+            <a:endParaRPr lang="hr-HR" dirty="0"/>
+          </a:p>
+          <a:p>
+            <a:r>
+              <a:rPr lang="hr-HR" dirty="0"/>
+              <a:t>Korišteni programski jezici i tehnologije</a:t>
+            </a:r>
+          </a:p>
+          <a:p>
+            <a:pPr lvl="1"/>
+            <a:r>
+              <a:rPr lang="hr-HR" dirty="0"/>
+              <a:t>Naznačiti što je korišteno za front </a:t>
+            </a:r>
+            <a:r>
+              <a:rPr lang="hr-HR" dirty="0" err="1"/>
+              <a:t>end</a:t>
+            </a:r>
+            <a:r>
+              <a:rPr lang="hr-HR" dirty="0"/>
+              <a:t> a što za </a:t>
+            </a:r>
+            <a:r>
+              <a:rPr lang="hr-HR" dirty="0" err="1"/>
+              <a:t>back</a:t>
+            </a:r>
+            <a:r>
+              <a:rPr lang="hr-HR" dirty="0"/>
+              <a:t> </a:t>
+            </a:r>
+            <a:r>
+              <a:rPr lang="hr-HR" dirty="0" err="1"/>
+              <a:t>end</a:t>
+            </a:r>
+            <a:endParaRPr lang="hr-HR" dirty="0"/>
+          </a:p>
+        </p:txBody>
+      </p:sp>
+      <p:sp>
+        <p:nvSpPr>
+          <p:cNvPr id="4" name="Slide Number Placeholder 3"/>
+          <p:cNvSpPr>
+            <a:spLocks noGrp="1"/>
+          </p:cNvSpPr>
+          <p:nvPr>
+            <p:ph type="sldNum" sz="quarter" idx="12"/>
+          </p:nvPr>
+        </p:nvSpPr>
+        <p:spPr/>
+        <p:txBody>
+          <a:bodyPr/>
+          <a:lstStyle/>
+          <a:p>
+            <a:fld id="{FAA41844-C0CA-4144-9D6C-D993F0C0FAB4}" type="slidenum">
+              <a:rPr lang="hr-HR" smtClean="0"/>
+              <a:t>13</a:t>
+            </a:fld>
+            <a:endParaRPr lang="hr-HR"/>
+          </a:p>
+        </p:txBody>
+      </p:sp>
+    </p:spTree>
+    <p:extLst>
+      <p:ext uri="{BB962C8B-B14F-4D97-AF65-F5344CB8AC3E}">
+        <p14:creationId xmlns:p14="http://schemas.microsoft.com/office/powerpoint/2010/main" val="3389772446"/>
+      </p:ext>
+    </p:extLst>
+  </p:cSld>
+  <p:clrMapOvr>
+    <a:masterClrMapping/>
+  </p:clrMapOvr>
+</p:sld>
+</file>
+
+<file path=ppt/slides/slide14.xml><?xml version="1.0" encoding="utf-8"?>
+<p:sld xmlns:a="http://schemas.openxmlformats.org/drawingml/2006/main" xmlns:r="http://schemas.openxmlformats.org/officeDocument/2006/relationships" xmlns:p="http://schemas.openxmlformats.org/presentationml/2006/main">
+  <p:cSld>
+    <p:spTree>
+      <p:nvGrpSpPr>
+        <p:cNvPr id="1" name=""/>
+        <p:cNvGrpSpPr/>
+        <p:nvPr/>
+      </p:nvGrpSpPr>
+      <p:grpSpPr>
+        <a:xfrm>
+          <a:off x="0" y="0"/>
+          <a:ext cx="0" cy="0"/>
+          <a:chOff x="0" y="0"/>
+          <a:chExt cx="0" cy="0"/>
+        </a:xfrm>
+      </p:grpSpPr>
+      <p:sp>
+        <p:nvSpPr>
+          <p:cNvPr id="2" name="Title 1"/>
+          <p:cNvSpPr>
+            <a:spLocks noGrp="1"/>
+          </p:cNvSpPr>
+          <p:nvPr>
+            <p:ph type="title"/>
+          </p:nvPr>
+        </p:nvSpPr>
+        <p:spPr/>
+        <p:txBody>
+          <a:bodyPr/>
+          <a:lstStyle/>
+          <a:p>
+            <a:r>
+              <a:rPr lang="hr-HR" dirty="0"/>
+              <a:t>Arhitektura sustava</a:t>
+            </a:r>
+          </a:p>
+        </p:txBody>
+      </p:sp>
+      <p:sp>
+        <p:nvSpPr>
+          <p:cNvPr id="3" name="Content Placeholder 2"/>
+          <p:cNvSpPr>
+            <a:spLocks noGrp="1"/>
+          </p:cNvSpPr>
+          <p:nvPr>
+            <p:ph idx="1"/>
+          </p:nvPr>
+        </p:nvSpPr>
+        <p:spPr/>
+        <p:txBody>
+          <a:bodyPr/>
+          <a:lstStyle/>
+          <a:p>
+            <a:r>
+              <a:rPr lang="hr-HR" dirty="0"/>
+              <a:t>Na visokoj razini apstrakcije</a:t>
+            </a:r>
+          </a:p>
+          <a:p>
+            <a:r>
+              <a:rPr lang="hr-HR" dirty="0"/>
+              <a:t>Obavezno staviti dijagram </a:t>
+            </a:r>
+          </a:p>
+        </p:txBody>
+      </p:sp>
+      <p:sp>
+        <p:nvSpPr>
+          <p:cNvPr id="4" name="Slide Number Placeholder 3"/>
+          <p:cNvSpPr>
+            <a:spLocks noGrp="1"/>
+          </p:cNvSpPr>
+          <p:nvPr>
+            <p:ph type="sldNum" sz="quarter" idx="12"/>
+          </p:nvPr>
+        </p:nvSpPr>
+        <p:spPr/>
+        <p:txBody>
+          <a:bodyPr/>
+          <a:lstStyle/>
+          <a:p>
+            <a:fld id="{FAA41844-C0CA-4144-9D6C-D993F0C0FAB4}" type="slidenum">
+              <a:rPr lang="hr-HR" smtClean="0"/>
+              <a:t>14</a:t>
+            </a:fld>
+            <a:endParaRPr lang="hr-HR"/>
+          </a:p>
+        </p:txBody>
+      </p:sp>
+    </p:spTree>
+    <p:extLst>
+      <p:ext uri="{BB962C8B-B14F-4D97-AF65-F5344CB8AC3E}">
+        <p14:creationId xmlns:p14="http://schemas.microsoft.com/office/powerpoint/2010/main" val="3657354464"/>
+      </p:ext>
+    </p:extLst>
+  </p:cSld>
+  <p:clrMapOvr>
+    <a:masterClrMapping/>
+  </p:clrMapOvr>
+</p:sld>
+</file>
+
+<file path=ppt/slides/slide15.xml><?xml version="1.0" encoding="utf-8"?>
+<p:sld xmlns:a="http://schemas.openxmlformats.org/drawingml/2006/main" xmlns:r="http://schemas.openxmlformats.org/officeDocument/2006/relationships" xmlns:p="http://schemas.openxmlformats.org/presentationml/2006/main">
+  <p:cSld>
+    <p:spTree>
+      <p:nvGrpSpPr>
+        <p:cNvPr id="1" name=""/>
+        <p:cNvGrpSpPr/>
+        <p:nvPr/>
+      </p:nvGrpSpPr>
+      <p:grpSpPr>
+        <a:xfrm>
+          <a:off x="0" y="0"/>
+          <a:ext cx="0" cy="0"/>
+          <a:chOff x="0" y="0"/>
+          <a:chExt cx="0" cy="0"/>
+        </a:xfrm>
+      </p:grpSpPr>
+      <p:sp>
+        <p:nvSpPr>
+          <p:cNvPr id="2" name="Title 1"/>
+          <p:cNvSpPr>
+            <a:spLocks noGrp="1"/>
+          </p:cNvSpPr>
+          <p:nvPr>
+            <p:ph type="title"/>
+          </p:nvPr>
+        </p:nvSpPr>
+        <p:spPr/>
+        <p:txBody>
+          <a:bodyPr/>
+          <a:lstStyle/>
+          <a:p>
+            <a:r>
+              <a:rPr lang="hr-HR" dirty="0"/>
+              <a:t>Organizacija rada</a:t>
+            </a:r>
+          </a:p>
+        </p:txBody>
+      </p:sp>
+      <p:sp>
+        <p:nvSpPr>
+          <p:cNvPr id="3" name="Content Placeholder 2"/>
+          <p:cNvSpPr>
+            <a:spLocks noGrp="1"/>
+          </p:cNvSpPr>
+          <p:nvPr>
+            <p:ph idx="1"/>
+          </p:nvPr>
+        </p:nvSpPr>
+        <p:spPr/>
+        <p:txBody>
+          <a:bodyPr/>
+          <a:lstStyle/>
+          <a:p>
+            <a:r>
+              <a:rPr lang="hr-HR" dirty="0"/>
+              <a:t>Vremenska linija razvoja (specifikacija, implementacija, ispitivanje, dokumentiranje)</a:t>
+            </a:r>
+          </a:p>
+          <a:p>
+            <a:pPr lvl="1"/>
+            <a:r>
+              <a:rPr lang="hr-HR" dirty="0"/>
+              <a:t>Poželjan grafički prikaz</a:t>
+            </a:r>
+          </a:p>
+          <a:p>
+            <a:pPr marL="457200" lvl="1" indent="0">
+              <a:buNone/>
+            </a:pPr>
+            <a:endParaRPr lang="hr-HR" dirty="0"/>
+          </a:p>
+          <a:p>
+            <a:r>
+              <a:rPr lang="hr-HR" dirty="0"/>
+              <a:t>Raspodjela posla po članovima tima (koliko </a:t>
+            </a:r>
+            <a:r>
+              <a:rPr lang="hr-HR" dirty="0" err="1"/>
+              <a:t>developera</a:t>
+            </a:r>
+            <a:r>
+              <a:rPr lang="hr-HR" dirty="0"/>
+              <a:t>, koliko testera…)</a:t>
+            </a:r>
+          </a:p>
+        </p:txBody>
+      </p:sp>
+      <p:sp>
+        <p:nvSpPr>
+          <p:cNvPr id="4" name="Slide Number Placeholder 3"/>
+          <p:cNvSpPr>
+            <a:spLocks noGrp="1"/>
+          </p:cNvSpPr>
+          <p:nvPr>
+            <p:ph type="sldNum" sz="quarter" idx="12"/>
+          </p:nvPr>
+        </p:nvSpPr>
+        <p:spPr/>
+        <p:txBody>
+          <a:bodyPr/>
+          <a:lstStyle/>
+          <a:p>
+            <a:fld id="{FAA41844-C0CA-4144-9D6C-D993F0C0FAB4}" type="slidenum">
+              <a:rPr lang="hr-HR" smtClean="0"/>
+              <a:t>15</a:t>
+            </a:fld>
+            <a:endParaRPr lang="hr-HR"/>
+          </a:p>
+        </p:txBody>
+      </p:sp>
+    </p:spTree>
+    <p:extLst>
+      <p:ext uri="{BB962C8B-B14F-4D97-AF65-F5344CB8AC3E}">
+        <p14:creationId xmlns:p14="http://schemas.microsoft.com/office/powerpoint/2010/main" val="4285223946"/>
+      </p:ext>
+    </p:extLst>
+  </p:cSld>
+  <p:clrMapOvr>
+    <a:masterClrMapping/>
+  </p:clrMapOvr>
+</p:sld>
+</file>
+
+<file path=ppt/slides/slide16.xml><?xml version="1.0" encoding="utf-8"?>
+<p:sld xmlns:a="http://schemas.openxmlformats.org/drawingml/2006/main" xmlns:r="http://schemas.openxmlformats.org/officeDocument/2006/relationships" xmlns:p="http://schemas.openxmlformats.org/presentationml/2006/main">
+  <p:cSld>
+    <p:spTree>
+      <p:nvGrpSpPr>
+        <p:cNvPr id="1" name=""/>
+        <p:cNvGrpSpPr/>
+        <p:nvPr/>
+      </p:nvGrpSpPr>
+      <p:grpSpPr>
+        <a:xfrm>
+          <a:off x="0" y="0"/>
+          <a:ext cx="0" cy="0"/>
+          <a:chOff x="0" y="0"/>
+          <a:chExt cx="0" cy="0"/>
+        </a:xfrm>
+      </p:grpSpPr>
+      <p:sp>
+        <p:nvSpPr>
+          <p:cNvPr id="2" name="Title 1"/>
+          <p:cNvSpPr>
+            <a:spLocks noGrp="1"/>
+          </p:cNvSpPr>
+          <p:nvPr>
+            <p:ph type="title"/>
+          </p:nvPr>
+        </p:nvSpPr>
+        <p:spPr/>
+        <p:txBody>
+          <a:bodyPr/>
+          <a:lstStyle/>
+          <a:p>
+            <a:r>
+              <a:rPr lang="hr-HR" dirty="0"/>
+              <a:t>Naučene lekcije</a:t>
+            </a:r>
+          </a:p>
+        </p:txBody>
+      </p:sp>
+      <p:sp>
+        <p:nvSpPr>
+          <p:cNvPr id="3" name="Content Placeholder 2"/>
+          <p:cNvSpPr>
+            <a:spLocks noGrp="1"/>
+          </p:cNvSpPr>
+          <p:nvPr>
+            <p:ph idx="1"/>
+          </p:nvPr>
+        </p:nvSpPr>
+        <p:spPr/>
+        <p:txBody>
+          <a:bodyPr/>
+          <a:lstStyle/>
+          <a:p>
+            <a:r>
+              <a:rPr lang="hr-HR" dirty="0"/>
+              <a:t>Što je bilo dobro, a što je moglo bolje</a:t>
+            </a:r>
+          </a:p>
+          <a:p>
+            <a:pPr lvl="1"/>
+            <a:r>
+              <a:rPr lang="hr-HR" dirty="0"/>
+              <a:t>A što se nikako ne bi smjelo ponoviti </a:t>
+            </a:r>
+            <a:r>
+              <a:rPr lang="hr-HR" dirty="0">
+                <a:sym typeface="Wingdings" panose="05000000000000000000" pitchFamily="2" charset="2"/>
+              </a:rPr>
+              <a:t></a:t>
+            </a:r>
+          </a:p>
+          <a:p>
+            <a:pPr lvl="1"/>
+            <a:endParaRPr lang="hr-HR" dirty="0">
+              <a:sym typeface="Wingdings" panose="05000000000000000000" pitchFamily="2" charset="2"/>
+            </a:endParaRPr>
+          </a:p>
+          <a:p>
+            <a:endParaRPr lang="hr-HR" dirty="0"/>
+          </a:p>
+        </p:txBody>
+      </p:sp>
+      <p:sp>
+        <p:nvSpPr>
+          <p:cNvPr id="4" name="Slide Number Placeholder 3"/>
+          <p:cNvSpPr>
+            <a:spLocks noGrp="1"/>
+          </p:cNvSpPr>
+          <p:nvPr>
+            <p:ph type="sldNum" sz="quarter" idx="12"/>
+          </p:nvPr>
+        </p:nvSpPr>
+        <p:spPr/>
+        <p:txBody>
+          <a:bodyPr/>
+          <a:lstStyle/>
+          <a:p>
+            <a:fld id="{FAA41844-C0CA-4144-9D6C-D993F0C0FAB4}" type="slidenum">
+              <a:rPr lang="hr-HR" smtClean="0"/>
+              <a:t>16</a:t>
+            </a:fld>
+            <a:endParaRPr lang="hr-HR"/>
+          </a:p>
+        </p:txBody>
+      </p:sp>
+    </p:spTree>
+    <p:extLst>
+      <p:ext uri="{BB962C8B-B14F-4D97-AF65-F5344CB8AC3E}">
+        <p14:creationId xmlns:p14="http://schemas.microsoft.com/office/powerpoint/2010/main" val="48259320"/>
+      </p:ext>
+    </p:extLst>
+  </p:cSld>
+  <p:clrMapOvr>
+    <a:masterClrMapping/>
+  </p:clrMapOvr>
+</p:sld>
+</file>
+
+<file path=ppt/slides/slide17.xml><?xml version="1.0" encoding="utf-8"?>
+<p:sld xmlns:a="http://schemas.openxmlformats.org/drawingml/2006/main" xmlns:r="http://schemas.openxmlformats.org/officeDocument/2006/relationships" xmlns:p="http://schemas.openxmlformats.org/presentationml/2006/main">
+  <p:cSld>
+    <p:spTree>
+      <p:nvGrpSpPr>
+        <p:cNvPr id="1" name=""/>
+        <p:cNvGrpSpPr/>
+        <p:nvPr/>
+      </p:nvGrpSpPr>
+      <p:grpSpPr>
+        <a:xfrm>
+          <a:off x="0" y="0"/>
+          <a:ext cx="0" cy="0"/>
+          <a:chOff x="0" y="0"/>
+          <a:chExt cx="0" cy="0"/>
+        </a:xfrm>
+      </p:grpSpPr>
+      <p:sp>
+        <p:nvSpPr>
+          <p:cNvPr id="2" name="Title 1"/>
+          <p:cNvSpPr>
+            <a:spLocks noGrp="1"/>
+          </p:cNvSpPr>
+          <p:nvPr>
+            <p:ph type="title"/>
+          </p:nvPr>
+        </p:nvSpPr>
+        <p:spPr/>
+        <p:txBody>
+          <a:bodyPr/>
+          <a:lstStyle/>
+          <a:p>
+            <a:r>
               <a:rPr lang="hr-HR" i="1" dirty="0"/>
               <a:t>Nekoliko savjeta</a:t>
             </a:r>
@@ -5256,7 +6773,7 @@
           <a:p>
             <a:fld id="{FAA41844-C0CA-4144-9D6C-D993F0C0FAB4}" type="slidenum">
               <a:rPr lang="hr-HR" smtClean="0"/>
-              <a:t>13</a:t>
+              <a:t>17</a:t>
             </a:fld>
             <a:endParaRPr lang="hr-HR"/>
           </a:p>
@@ -8782,9 +10299,51 @@
           <a:chExt cx="0" cy="0"/>
         </a:xfrm>
       </p:grpSpPr>
+      <p:pic>
+        <p:nvPicPr>
+          <p:cNvPr id="10" name="Picture 9" descr="A picture containing shape&#10;&#10;Description automatically generated">
+            <a:extLst>
+              <a:ext uri="{FF2B5EF4-FFF2-40B4-BE49-F238E27FC236}">
+                <a16:creationId xmlns:a16="http://schemas.microsoft.com/office/drawing/2014/main" id="{837EEEFC-BFA1-BDDA-9AA8-FB552547934E}"/>
+              </a:ext>
+            </a:extLst>
+          </p:cNvPr>
+          <p:cNvPicPr>
+            <a:picLocks noChangeAspect="1"/>
+          </p:cNvPicPr>
+          <p:nvPr/>
+        </p:nvPicPr>
+        <p:blipFill>
+          <a:blip r:embed="rId2">
+            <a:extLst>
+              <a:ext uri="{28A0092B-C50C-407E-A947-70E740481C1C}">
+                <a14:useLocalDpi xmlns:a14="http://schemas.microsoft.com/office/drawing/2010/main" val="0"/>
+              </a:ext>
+            </a:extLst>
+          </a:blip>
+          <a:stretch>
+            <a:fillRect/>
+          </a:stretch>
+        </p:blipFill>
+        <p:spPr>
+          <a:xfrm>
+            <a:off x="0" y="0"/>
+            <a:ext cx="9144000" cy="6858000"/>
+          </a:xfrm>
+          <a:prstGeom prst="rect">
+            <a:avLst/>
+          </a:prstGeom>
+        </p:spPr>
+      </p:pic>
       <p:sp>
         <p:nvSpPr>
-          <p:cNvPr id="2" name="Title 1"/>
+          <p:cNvPr id="11" name="Title 1">
+            <a:extLst>
+              <a:ext uri="{FF2B5EF4-FFF2-40B4-BE49-F238E27FC236}">
+                <a16:creationId xmlns:a16="http://schemas.microsoft.com/office/drawing/2014/main" id="{AA86832F-F2B3-C482-7320-2650822E5AAA}"/>
+              </a:ext>
+            </a:extLst>
+          </p:cNvPr>
           <p:cNvSpPr>
             <a:spLocks noGrp="1"/>
           </p:cNvSpPr>
@@ -8792,21 +10351,39 @@
             <p:ph type="title"/>
           </p:nvPr>
         </p:nvSpPr>
-        <p:spPr/>
+        <p:spPr>
+          <a:xfrm>
+            <a:off x="628650" y="365127"/>
+            <a:ext cx="7886700" cy="844838"/>
+          </a:xfrm>
+        </p:spPr>
         <p:txBody>
-          <a:bodyPr/>
+          <a:bodyPr>
+            <a:noAutofit/>
+          </a:bodyPr>
           <a:lstStyle/>
           <a:p>
             <a:r>
-              <a:rPr lang="hr-HR" dirty="0"/>
-              <a:t>Pregled zahtjeva</a:t>
+              <a:rPr lang="hr-HR" sz="3200" dirty="0">
+                <a:solidFill>
+                  <a:schemeClr val="bg1"/>
+                </a:solidFill>
+                <a:latin typeface="PrimaSans BT" panose="020B0803030604020204" pitchFamily="34" charset="0"/>
+              </a:rPr>
+              <a:t>Vrste korisnika</a:t>
             </a:r>
           </a:p>
         </p:txBody>
       </p:sp>
       <p:sp>
         <p:nvSpPr>
-          <p:cNvPr id="3" name="Content Placeholder 2"/>
+          <p:cNvPr id="13" name="Content Placeholder 2">
+            <a:extLst>
+              <a:ext uri="{FF2B5EF4-FFF2-40B4-BE49-F238E27FC236}">
+                <a16:creationId xmlns:a16="http://schemas.microsoft.com/office/drawing/2014/main" id="{2B10E8CC-9103-CB2F-FAB7-5BC90D4F1E25}"/>
+              </a:ext>
+            </a:extLst>
+          </p:cNvPr>
           <p:cNvSpPr>
             <a:spLocks noGrp="1"/>
           </p:cNvSpPr>
@@ -8814,73 +10391,479 @@
             <p:ph idx="1"/>
           </p:nvPr>
         </p:nvSpPr>
-        <p:spPr/>
+        <p:spPr>
+          <a:xfrm>
+            <a:off x="628650" y="1395554"/>
+            <a:ext cx="8355552" cy="4931327"/>
+          </a:xfrm>
+        </p:spPr>
         <p:txBody>
           <a:bodyPr/>
           <a:lstStyle/>
           <a:p>
-            <a:r>
-              <a:rPr lang="hr-HR" dirty="0"/>
-              <a:t>Lista glavnih funkcionalnih zahtjeva (</a:t>
-            </a:r>
-            <a:r>
-              <a:rPr lang="hr-HR" dirty="0" err="1"/>
-              <a:t>max</a:t>
-            </a:r>
-            <a:r>
-              <a:rPr lang="hr-HR" dirty="0"/>
-              <a:t> 1 slajd)</a:t>
-            </a:r>
-          </a:p>
-          <a:p>
-            <a:r>
-              <a:rPr lang="hr-HR" dirty="0"/>
-              <a:t>Nefunkcionalni i zahtjevi domene primjene (</a:t>
-            </a:r>
-            <a:r>
-              <a:rPr lang="hr-HR" dirty="0" err="1"/>
-              <a:t>max</a:t>
-            </a:r>
-            <a:r>
-              <a:rPr lang="hr-HR" dirty="0"/>
-              <a:t> 1 slajd)</a:t>
-            </a:r>
+            <a:pPr marL="0" indent="0">
+              <a:buNone/>
+            </a:pPr>
+            <a:r>
+              <a:rPr lang="hr-HR" sz="3200" dirty="0">
+                <a:solidFill>
+                  <a:schemeClr val="bg1"/>
+                </a:solidFill>
+                <a:latin typeface="Bahnschrift SemiBold SemiConden" panose="020B0502040204020203" pitchFamily="34" charset="0"/>
+              </a:rPr>
+              <a:t>Premium korisnik</a:t>
+            </a:r>
+          </a:p>
+          <a:p>
+            <a:r>
+              <a:rPr lang="hr-HR" sz="2400" dirty="0">
+                <a:solidFill>
+                  <a:schemeClr val="bg1"/>
+                </a:solidFill>
+                <a:latin typeface="Bahnschrift SemiBold SemiConden" panose="020B0502040204020203" pitchFamily="34" charset="0"/>
+              </a:rPr>
+              <a:t>Obični korisnik postaje Premium korisnik internetskim plaćanjem</a:t>
+            </a:r>
+          </a:p>
+          <a:p>
+            <a:r>
+              <a:rPr lang="hr-HR" sz="2400" dirty="0">
+                <a:solidFill>
+                  <a:schemeClr val="bg1"/>
+                </a:solidFill>
+                <a:latin typeface="Bahnschrift SemiBold SemiConden" panose="020B0502040204020203" pitchFamily="34" charset="0"/>
+              </a:rPr>
+              <a:t>Može sve što i običan korisnik te uz to:</a:t>
+            </a:r>
+          </a:p>
+          <a:p>
+            <a:pPr lvl="1"/>
+            <a:r>
+              <a:rPr lang="hr-HR" sz="2000" dirty="0">
+                <a:solidFill>
+                  <a:schemeClr val="bg1"/>
+                </a:solidFill>
+                <a:latin typeface="Bahnschrift SemiBold SemiConden" panose="020B0502040204020203" pitchFamily="34" charset="0"/>
+              </a:rPr>
+              <a:t>Promovirati vlastite događaje koji su onda preporučeni svim korisnicima</a:t>
+            </a:r>
+          </a:p>
+          <a:p>
+            <a:endParaRPr lang="hr-HR" dirty="0">
+              <a:solidFill>
+                <a:schemeClr val="bg1"/>
+              </a:solidFill>
+              <a:latin typeface="Bahnschrift SemiBold SemiConden" panose="020B0502040204020203" pitchFamily="34" charset="0"/>
+            </a:endParaRPr>
+          </a:p>
+          <a:p>
+            <a:endParaRPr lang="hr-HR" dirty="0">
+              <a:solidFill>
+                <a:schemeClr val="bg1"/>
+              </a:solidFill>
+              <a:latin typeface="Bahnschrift SemiBold SemiConden" panose="020B0502040204020203" pitchFamily="34" charset="0"/>
+            </a:endParaRPr>
+          </a:p>
+          <a:p>
+            <a:endParaRPr lang="hr-HR" dirty="0">
+              <a:solidFill>
+                <a:schemeClr val="bg1"/>
+              </a:solidFill>
+              <a:latin typeface="Bahnschrift SemiBold SemiConden" panose="020B0502040204020203" pitchFamily="34" charset="0"/>
+            </a:endParaRPr>
           </a:p>
         </p:txBody>
       </p:sp>
-      <p:sp>
-        <p:nvSpPr>
-          <p:cNvPr id="4" name="Slide Number Placeholder 3"/>
-          <p:cNvSpPr>
-            <a:spLocks noGrp="1"/>
-          </p:cNvSpPr>
-          <p:nvPr>
-            <p:ph type="sldNum" sz="quarter" idx="12"/>
-          </p:nvPr>
-        </p:nvSpPr>
-        <p:spPr/>
-        <p:txBody>
-          <a:bodyPr/>
-          <a:lstStyle/>
-          <a:p>
-            <a:fld id="{FAA41844-C0CA-4144-9D6C-D993F0C0FAB4}" type="slidenum">
-              <a:rPr lang="hr-HR" smtClean="0"/>
-              <a:t>8</a:t>
-            </a:fld>
-            <a:endParaRPr lang="hr-HR"/>
-          </a:p>
-        </p:txBody>
-      </p:sp>
+      <p:pic>
+        <p:nvPicPr>
+          <p:cNvPr id="3" name="Picture 2" descr="A picture containing graphical user interface&#10;&#10;Description automatically generated">
+            <a:extLst>
+              <a:ext uri="{FF2B5EF4-FFF2-40B4-BE49-F238E27FC236}">
+                <a16:creationId xmlns:a16="http://schemas.microsoft.com/office/drawing/2014/main" id="{C678A1FE-118B-C251-1946-2403C51E4DB7}"/>
+              </a:ext>
+            </a:extLst>
+          </p:cNvPr>
+          <p:cNvPicPr>
+            <a:picLocks noChangeAspect="1"/>
+          </p:cNvPicPr>
+          <p:nvPr/>
+        </p:nvPicPr>
+        <p:blipFill rotWithShape="1">
+          <a:blip r:embed="rId3">
+            <a:extLst>
+              <a:ext uri="{28A0092B-C50C-407E-A947-70E740481C1C}">
+                <a14:useLocalDpi xmlns:a14="http://schemas.microsoft.com/office/drawing/2010/main" val="0"/>
+              </a:ext>
+            </a:extLst>
+          </a:blip>
+          <a:srcRect t="1091" b="2975"/>
+          <a:stretch/>
+        </p:blipFill>
+        <p:spPr>
+          <a:xfrm>
+            <a:off x="1339210" y="3301126"/>
+            <a:ext cx="6465580" cy="3556874"/>
+          </a:xfrm>
+          <a:prstGeom prst="rect">
+            <a:avLst/>
+          </a:prstGeom>
+          <a:ln>
+            <a:noFill/>
+          </a:ln>
+          <a:effectLst>
+            <a:softEdge rad="112500"/>
+          </a:effectLst>
+        </p:spPr>
+      </p:pic>
     </p:spTree>
     <p:extLst>
       <p:ext uri="{BB962C8B-B14F-4D97-AF65-F5344CB8AC3E}">
-        <p14:creationId xmlns:p14="http://schemas.microsoft.com/office/powerpoint/2010/main" val="3161375826"/>
+        <p14:creationId xmlns:p14="http://schemas.microsoft.com/office/powerpoint/2010/main" val="3534107043"/>
       </p:ext>
     </p:extLst>
   </p:cSld>
   <p:clrMapOvr>
     <a:masterClrMapping/>
   </p:clrMapOvr>
+  <p:timing>
+    <p:tnLst>
+      <p:par>
+        <p:cTn id="1" dur="indefinite" restart="never" nodeType="tmRoot">
+          <p:childTnLst>
+            <p:seq concurrent="1" nextAc="seek">
+              <p:cTn id="2" dur="indefinite" nodeType="mainSeq">
+                <p:childTnLst>
+                  <p:par>
+                    <p:cTn id="3" fill="hold">
+                      <p:stCondLst>
+                        <p:cond delay="indefinite"/>
+                      </p:stCondLst>
+                      <p:childTnLst>
+                        <p:par>
+                          <p:cTn id="4" fill="hold">
+                            <p:stCondLst>
+                              <p:cond delay="0"/>
+                            </p:stCondLst>
+                            <p:childTnLst>
+                              <p:par>
+                                <p:cTn id="5" presetID="2" presetClass="entr" presetSubtype="8" fill="hold" nodeType="clickEffect">
+                                  <p:stCondLst>
+                                    <p:cond delay="0"/>
+                                  </p:stCondLst>
+                                  <p:childTnLst>
+                                    <p:set>
+                                      <p:cBhvr>
+                                        <p:cTn id="6" dur="1" fill="hold">
+                                          <p:stCondLst>
+                                            <p:cond delay="0"/>
+                                          </p:stCondLst>
+                                        </p:cTn>
+                                        <p:tgtEl>
+                                          <p:spTgt spid="13">
+                                            <p:txEl>
+                                              <p:pRg st="1" end="1"/>
+                                            </p:txEl>
+                                          </p:spTgt>
+                                        </p:tgtEl>
+                                        <p:attrNameLst>
+                                          <p:attrName>style.visibility</p:attrName>
+                                        </p:attrNameLst>
+                                      </p:cBhvr>
+                                      <p:to>
+                                        <p:strVal val="visible"/>
+                                      </p:to>
+                                    </p:set>
+                                    <p:anim calcmode="lin" valueType="num">
+                                      <p:cBhvr additive="base">
+                                        <p:cTn id="7" dur="500" fill="hold"/>
+                                        <p:tgtEl>
+                                          <p:spTgt spid="13">
+                                            <p:txEl>
+                                              <p:pRg st="1" end="1"/>
+                                            </p:txEl>
+                                          </p:spTgt>
+                                        </p:tgtEl>
+                                        <p:attrNameLst>
+                                          <p:attrName>ppt_x</p:attrName>
+                                        </p:attrNameLst>
+                                      </p:cBhvr>
+                                      <p:tavLst>
+                                        <p:tav tm="0">
+                                          <p:val>
+                                            <p:strVal val="0-#ppt_w/2"/>
+                                          </p:val>
+                                        </p:tav>
+                                        <p:tav tm="100000">
+                                          <p:val>
+                                            <p:strVal val="#ppt_x"/>
+                                          </p:val>
+                                        </p:tav>
+                                      </p:tavLst>
+                                    </p:anim>
+                                    <p:anim calcmode="lin" valueType="num">
+                                      <p:cBhvr additive="base">
+                                        <p:cTn id="8" dur="500" fill="hold"/>
+                                        <p:tgtEl>
+                                          <p:spTgt spid="13">
+                                            <p:txEl>
+                                              <p:pRg st="1" end="1"/>
+                                            </p:txEl>
+                                          </p:spTgt>
+                                        </p:tgtEl>
+                                        <p:attrNameLst>
+                                          <p:attrName>ppt_y</p:attrName>
+                                        </p:attrNameLst>
+                                      </p:cBhvr>
+                                      <p:tavLst>
+                                        <p:tav tm="0">
+                                          <p:val>
+                                            <p:strVal val="#ppt_y"/>
+                                          </p:val>
+                                        </p:tav>
+                                        <p:tav tm="100000">
+                                          <p:val>
+                                            <p:strVal val="#ppt_y"/>
+                                          </p:val>
+                                        </p:tav>
+                                      </p:tavLst>
+                                    </p:anim>
+                                  </p:childTnLst>
+                                </p:cTn>
+                              </p:par>
+                            </p:childTnLst>
+                          </p:cTn>
+                        </p:par>
+                      </p:childTnLst>
+                    </p:cTn>
+                  </p:par>
+                  <p:par>
+                    <p:cTn id="9" fill="hold">
+                      <p:stCondLst>
+                        <p:cond delay="indefinite"/>
+                      </p:stCondLst>
+                      <p:childTnLst>
+                        <p:par>
+                          <p:cTn id="10" fill="hold">
+                            <p:stCondLst>
+                              <p:cond delay="0"/>
+                            </p:stCondLst>
+                            <p:childTnLst>
+                              <p:par>
+                                <p:cTn id="11" presetID="2" presetClass="entr" presetSubtype="8" fill="hold" nodeType="clickEffect">
+                                  <p:stCondLst>
+                                    <p:cond delay="0"/>
+                                  </p:stCondLst>
+                                  <p:childTnLst>
+                                    <p:set>
+                                      <p:cBhvr>
+                                        <p:cTn id="12" dur="1" fill="hold">
+                                          <p:stCondLst>
+                                            <p:cond delay="0"/>
+                                          </p:stCondLst>
+                                        </p:cTn>
+                                        <p:tgtEl>
+                                          <p:spTgt spid="13">
+                                            <p:txEl>
+                                              <p:pRg st="2" end="2"/>
+                                            </p:txEl>
+                                          </p:spTgt>
+                                        </p:tgtEl>
+                                        <p:attrNameLst>
+                                          <p:attrName>style.visibility</p:attrName>
+                                        </p:attrNameLst>
+                                      </p:cBhvr>
+                                      <p:to>
+                                        <p:strVal val="visible"/>
+                                      </p:to>
+                                    </p:set>
+                                    <p:anim calcmode="lin" valueType="num">
+                                      <p:cBhvr additive="base">
+                                        <p:cTn id="13" dur="500" fill="hold"/>
+                                        <p:tgtEl>
+                                          <p:spTgt spid="13">
+                                            <p:txEl>
+                                              <p:pRg st="2" end="2"/>
+                                            </p:txEl>
+                                          </p:spTgt>
+                                        </p:tgtEl>
+                                        <p:attrNameLst>
+                                          <p:attrName>ppt_x</p:attrName>
+                                        </p:attrNameLst>
+                                      </p:cBhvr>
+                                      <p:tavLst>
+                                        <p:tav tm="0">
+                                          <p:val>
+                                            <p:strVal val="0-#ppt_w/2"/>
+                                          </p:val>
+                                        </p:tav>
+                                        <p:tav tm="100000">
+                                          <p:val>
+                                            <p:strVal val="#ppt_x"/>
+                                          </p:val>
+                                        </p:tav>
+                                      </p:tavLst>
+                                    </p:anim>
+                                    <p:anim calcmode="lin" valueType="num">
+                                      <p:cBhvr additive="base">
+                                        <p:cTn id="14" dur="500" fill="hold"/>
+                                        <p:tgtEl>
+                                          <p:spTgt spid="13">
+                                            <p:txEl>
+                                              <p:pRg st="2" end="2"/>
+                                            </p:txEl>
+                                          </p:spTgt>
+                                        </p:tgtEl>
+                                        <p:attrNameLst>
+                                          <p:attrName>ppt_y</p:attrName>
+                                        </p:attrNameLst>
+                                      </p:cBhvr>
+                                      <p:tavLst>
+                                        <p:tav tm="0">
+                                          <p:val>
+                                            <p:strVal val="#ppt_y"/>
+                                          </p:val>
+                                        </p:tav>
+                                        <p:tav tm="100000">
+                                          <p:val>
+                                            <p:strVal val="#ppt_y"/>
+                                          </p:val>
+                                        </p:tav>
+                                      </p:tavLst>
+                                    </p:anim>
+                                  </p:childTnLst>
+                                </p:cTn>
+                              </p:par>
+                            </p:childTnLst>
+                          </p:cTn>
+                        </p:par>
+                      </p:childTnLst>
+                    </p:cTn>
+                  </p:par>
+                  <p:par>
+                    <p:cTn id="15" fill="hold">
+                      <p:stCondLst>
+                        <p:cond delay="indefinite"/>
+                      </p:stCondLst>
+                      <p:childTnLst>
+                        <p:par>
+                          <p:cTn id="16" fill="hold">
+                            <p:stCondLst>
+                              <p:cond delay="0"/>
+                            </p:stCondLst>
+                            <p:childTnLst>
+                              <p:par>
+                                <p:cTn id="17" presetID="2" presetClass="entr" presetSubtype="8" fill="hold" nodeType="clickEffect">
+                                  <p:stCondLst>
+                                    <p:cond delay="0"/>
+                                  </p:stCondLst>
+                                  <p:childTnLst>
+                                    <p:set>
+                                      <p:cBhvr>
+                                        <p:cTn id="18" dur="1" fill="hold">
+                                          <p:stCondLst>
+                                            <p:cond delay="0"/>
+                                          </p:stCondLst>
+                                        </p:cTn>
+                                        <p:tgtEl>
+                                          <p:spTgt spid="13">
+                                            <p:txEl>
+                                              <p:pRg st="3" end="3"/>
+                                            </p:txEl>
+                                          </p:spTgt>
+                                        </p:tgtEl>
+                                        <p:attrNameLst>
+                                          <p:attrName>style.visibility</p:attrName>
+                                        </p:attrNameLst>
+                                      </p:cBhvr>
+                                      <p:to>
+                                        <p:strVal val="visible"/>
+                                      </p:to>
+                                    </p:set>
+                                    <p:anim calcmode="lin" valueType="num">
+                                      <p:cBhvr additive="base">
+                                        <p:cTn id="19" dur="500" fill="hold"/>
+                                        <p:tgtEl>
+                                          <p:spTgt spid="13">
+                                            <p:txEl>
+                                              <p:pRg st="3" end="3"/>
+                                            </p:txEl>
+                                          </p:spTgt>
+                                        </p:tgtEl>
+                                        <p:attrNameLst>
+                                          <p:attrName>ppt_x</p:attrName>
+                                        </p:attrNameLst>
+                                      </p:cBhvr>
+                                      <p:tavLst>
+                                        <p:tav tm="0">
+                                          <p:val>
+                                            <p:strVal val="0-#ppt_w/2"/>
+                                          </p:val>
+                                        </p:tav>
+                                        <p:tav tm="100000">
+                                          <p:val>
+                                            <p:strVal val="#ppt_x"/>
+                                          </p:val>
+                                        </p:tav>
+                                      </p:tavLst>
+                                    </p:anim>
+                                    <p:anim calcmode="lin" valueType="num">
+                                      <p:cBhvr additive="base">
+                                        <p:cTn id="20" dur="500" fill="hold"/>
+                                        <p:tgtEl>
+                                          <p:spTgt spid="13">
+                                            <p:txEl>
+                                              <p:pRg st="3" end="3"/>
+                                            </p:txEl>
+                                          </p:spTgt>
+                                        </p:tgtEl>
+                                        <p:attrNameLst>
+                                          <p:attrName>ppt_y</p:attrName>
+                                        </p:attrNameLst>
+                                      </p:cBhvr>
+                                      <p:tavLst>
+                                        <p:tav tm="0">
+                                          <p:val>
+                                            <p:strVal val="#ppt_y"/>
+                                          </p:val>
+                                        </p:tav>
+                                        <p:tav tm="100000">
+                                          <p:val>
+                                            <p:strVal val="#ppt_y"/>
+                                          </p:val>
+                                        </p:tav>
+                                      </p:tavLst>
+                                    </p:anim>
+                                  </p:childTnLst>
+                                </p:cTn>
+                              </p:par>
+                            </p:childTnLst>
+                          </p:cTn>
+                        </p:par>
+                      </p:childTnLst>
+                    </p:cTn>
+                  </p:par>
+                </p:childTnLst>
+              </p:cTn>
+              <p:prevCondLst>
+                <p:cond evt="onPrev" delay="0">
+                  <p:tgtEl>
+                    <p:sldTgt/>
+                  </p:tgtEl>
+                </p:cond>
+              </p:prevCondLst>
+              <p:nextCondLst>
+                <p:cond evt="onNext" delay="0">
+                  <p:tgtEl>
+                    <p:sldTgt/>
+                  </p:tgtEl>
+                </p:cond>
+              </p:nextCondLst>
+            </p:seq>
+          </p:childTnLst>
+        </p:cTn>
+      </p:par>
+    </p:tnLst>
+  </p:timing>
 </p:sld>
 </file>
 
@@ -8901,9 +10884,51 @@
           <a:chExt cx="0" cy="0"/>
         </a:xfrm>
       </p:grpSpPr>
+      <p:pic>
+        <p:nvPicPr>
+          <p:cNvPr id="10" name="Picture 9" descr="A picture containing shape&#10;&#10;Description automatically generated">
+            <a:extLst>
+              <a:ext uri="{FF2B5EF4-FFF2-40B4-BE49-F238E27FC236}">
+                <a16:creationId xmlns:a16="http://schemas.microsoft.com/office/drawing/2014/main" id="{837EEEFC-BFA1-BDDA-9AA8-FB552547934E}"/>
+              </a:ext>
+            </a:extLst>
+          </p:cNvPr>
+          <p:cNvPicPr>
+            <a:picLocks noChangeAspect="1"/>
+          </p:cNvPicPr>
+          <p:nvPr/>
+        </p:nvPicPr>
+        <p:blipFill>
+          <a:blip r:embed="rId2">
+            <a:extLst>
+              <a:ext uri="{28A0092B-C50C-407E-A947-70E740481C1C}">
+                <a14:useLocalDpi xmlns:a14="http://schemas.microsoft.com/office/drawing/2010/main" val="0"/>
+              </a:ext>
+            </a:extLst>
+          </a:blip>
+          <a:stretch>
+            <a:fillRect/>
+          </a:stretch>
+        </p:blipFill>
+        <p:spPr>
+          <a:xfrm>
+            <a:off x="0" y="0"/>
+            <a:ext cx="9144000" cy="6858000"/>
+          </a:xfrm>
+          <a:prstGeom prst="rect">
+            <a:avLst/>
+          </a:prstGeom>
+        </p:spPr>
+      </p:pic>
       <p:sp>
         <p:nvSpPr>
-          <p:cNvPr id="2" name="Title 1"/>
+          <p:cNvPr id="11" name="Title 1">
+            <a:extLst>
+              <a:ext uri="{FF2B5EF4-FFF2-40B4-BE49-F238E27FC236}">
+                <a16:creationId xmlns:a16="http://schemas.microsoft.com/office/drawing/2014/main" id="{AA86832F-F2B3-C482-7320-2650822E5AAA}"/>
+              </a:ext>
+            </a:extLst>
+          </p:cNvPr>
           <p:cNvSpPr>
             <a:spLocks noGrp="1"/>
           </p:cNvSpPr>
@@ -8911,21 +10936,39 @@
             <p:ph type="title"/>
           </p:nvPr>
         </p:nvSpPr>
-        <p:spPr/>
+        <p:spPr>
+          <a:xfrm>
+            <a:off x="628650" y="365127"/>
+            <a:ext cx="7886700" cy="844838"/>
+          </a:xfrm>
+        </p:spPr>
         <p:txBody>
-          <a:bodyPr/>
+          <a:bodyPr>
+            <a:noAutofit/>
+          </a:bodyPr>
           <a:lstStyle/>
           <a:p>
             <a:r>
-              <a:rPr lang="hr-HR" dirty="0"/>
-              <a:t>Korišteni alati i tehnologije</a:t>
+              <a:rPr lang="hr-HR" sz="3200" dirty="0">
+                <a:solidFill>
+                  <a:schemeClr val="bg1"/>
+                </a:solidFill>
+                <a:latin typeface="PrimaSans BT" panose="020B0803030604020204" pitchFamily="34" charset="0"/>
+              </a:rPr>
+              <a:t>Vrste korisnika</a:t>
             </a:r>
           </a:p>
         </p:txBody>
       </p:sp>
       <p:sp>
         <p:nvSpPr>
-          <p:cNvPr id="3" name="Content Placeholder 2"/>
+          <p:cNvPr id="13" name="Content Placeholder 2">
+            <a:extLst>
+              <a:ext uri="{FF2B5EF4-FFF2-40B4-BE49-F238E27FC236}">
+                <a16:creationId xmlns:a16="http://schemas.microsoft.com/office/drawing/2014/main" id="{2B10E8CC-9103-CB2F-FAB7-5BC90D4F1E25}"/>
+              </a:ext>
+            </a:extLst>
+          </p:cNvPr>
           <p:cNvSpPr>
             <a:spLocks noGrp="1"/>
           </p:cNvSpPr>
@@ -8933,98 +10976,609 @@
             <p:ph idx="1"/>
           </p:nvPr>
         </p:nvSpPr>
-        <p:spPr/>
+        <p:spPr>
+          <a:xfrm>
+            <a:off x="628650" y="1395554"/>
+            <a:ext cx="8213509" cy="4931327"/>
+          </a:xfrm>
+        </p:spPr>
         <p:txBody>
           <a:bodyPr/>
           <a:lstStyle/>
           <a:p>
-            <a:r>
-              <a:rPr lang="hr-HR" dirty="0"/>
-              <a:t>Popis svih korištenih alata (za izradu programske podrške, dokumentacije, komunikaciju i upravljanje)</a:t>
-            </a:r>
-          </a:p>
-          <a:p>
-            <a:pPr lvl="1"/>
-            <a:r>
-              <a:rPr lang="hr-HR" dirty="0"/>
-              <a:t>Poželjno staviti linkove za web stranice pojedinih</a:t>
-            </a:r>
-          </a:p>
-          <a:p>
-            <a:pPr marL="457200" lvl="1" indent="0">
+            <a:pPr marL="0" indent="0">
               <a:buNone/>
             </a:pPr>
-            <a:endParaRPr lang="hr-HR" dirty="0"/>
-          </a:p>
-          <a:p>
-            <a:r>
-              <a:rPr lang="hr-HR" dirty="0"/>
-              <a:t>Korišteni programski jezici i tehnologije</a:t>
+            <a:r>
+              <a:rPr lang="hr-HR" sz="3200" dirty="0">
+                <a:solidFill>
+                  <a:schemeClr val="bg1"/>
+                </a:solidFill>
+                <a:latin typeface="Bahnschrift SemiBold SemiConden" panose="020B0502040204020203" pitchFamily="34" charset="0"/>
+              </a:rPr>
+              <a:t>Moderator (</a:t>
+            </a:r>
+            <a:r>
+              <a:rPr lang="hr-HR" sz="3200" dirty="0" err="1">
+                <a:solidFill>
+                  <a:schemeClr val="bg1"/>
+                </a:solidFill>
+                <a:latin typeface="Bahnschrift SemiBold SemiConden" panose="020B0502040204020203" pitchFamily="34" charset="0"/>
+              </a:rPr>
+              <a:t>mod</a:t>
+            </a:r>
+            <a:r>
+              <a:rPr lang="hr-HR" sz="3200" dirty="0">
+                <a:solidFill>
+                  <a:schemeClr val="bg1"/>
+                </a:solidFill>
+                <a:latin typeface="Bahnschrift SemiBold SemiConden" panose="020B0502040204020203" pitchFamily="34" charset="0"/>
+              </a:rPr>
+              <a:t>)</a:t>
+            </a:r>
+          </a:p>
+          <a:p>
+            <a:r>
+              <a:rPr lang="hr-HR" sz="2400" dirty="0">
+                <a:solidFill>
+                  <a:schemeClr val="bg1"/>
+                </a:solidFill>
+                <a:latin typeface="Bahnschrift SemiBold SemiConden" panose="020B0502040204020203" pitchFamily="34" charset="0"/>
+              </a:rPr>
+              <a:t>Može sve što i običan korisnik te uz to:</a:t>
             </a:r>
           </a:p>
           <a:p>
             <a:pPr lvl="1"/>
             <a:r>
-              <a:rPr lang="hr-HR" dirty="0"/>
-              <a:t>Naznačiti što je korišteno za front </a:t>
-            </a:r>
-            <a:r>
-              <a:rPr lang="hr-HR" dirty="0" err="1"/>
-              <a:t>end</a:t>
-            </a:r>
-            <a:r>
-              <a:rPr lang="hr-HR" dirty="0"/>
-              <a:t> a što za </a:t>
-            </a:r>
-            <a:r>
-              <a:rPr lang="hr-HR" dirty="0" err="1"/>
-              <a:t>back</a:t>
-            </a:r>
-            <a:r>
-              <a:rPr lang="hr-HR" dirty="0"/>
-              <a:t> </a:t>
-            </a:r>
-            <a:r>
-              <a:rPr lang="hr-HR" dirty="0" err="1"/>
-              <a:t>end</a:t>
-            </a:r>
-            <a:endParaRPr lang="hr-HR" dirty="0"/>
+              <a:rPr lang="hr-HR" sz="2400" dirty="0">
+                <a:solidFill>
+                  <a:schemeClr val="bg1"/>
+                </a:solidFill>
+                <a:latin typeface="Bahnschrift SemiBold SemiConden" panose="020B0502040204020203" pitchFamily="34" charset="0"/>
+              </a:rPr>
+              <a:t>Suspendirati korisnika</a:t>
+            </a:r>
+          </a:p>
+          <a:p>
+            <a:pPr lvl="1"/>
+            <a:r>
+              <a:rPr lang="hr-HR" sz="2400" dirty="0">
+                <a:solidFill>
+                  <a:schemeClr val="bg1"/>
+                </a:solidFill>
+                <a:latin typeface="Bahnschrift SemiBold SemiConden" panose="020B0502040204020203" pitchFamily="34" charset="0"/>
+              </a:rPr>
+              <a:t>Uređivati oznake javnih događaja</a:t>
+            </a:r>
+          </a:p>
+          <a:p>
+            <a:pPr lvl="1"/>
+            <a:r>
+              <a:rPr lang="hr-HR" sz="2400" dirty="0">
+                <a:solidFill>
+                  <a:schemeClr val="bg1"/>
+                </a:solidFill>
+                <a:latin typeface="Bahnschrift SemiBold SemiConden" panose="020B0502040204020203" pitchFamily="34" charset="0"/>
+              </a:rPr>
+              <a:t>Brisati događaje</a:t>
+            </a:r>
+          </a:p>
+          <a:p>
+            <a:endParaRPr lang="hr-HR" dirty="0">
+              <a:solidFill>
+                <a:schemeClr val="bg1"/>
+              </a:solidFill>
+              <a:latin typeface="Bahnschrift SemiBold SemiConden" panose="020B0502040204020203" pitchFamily="34" charset="0"/>
+            </a:endParaRPr>
+          </a:p>
+          <a:p>
+            <a:endParaRPr lang="hr-HR" dirty="0">
+              <a:solidFill>
+                <a:schemeClr val="bg1"/>
+              </a:solidFill>
+              <a:latin typeface="Bahnschrift SemiBold SemiConden" panose="020B0502040204020203" pitchFamily="34" charset="0"/>
+            </a:endParaRPr>
           </a:p>
         </p:txBody>
       </p:sp>
-      <p:sp>
-        <p:nvSpPr>
-          <p:cNvPr id="4" name="Slide Number Placeholder 3"/>
-          <p:cNvSpPr>
-            <a:spLocks noGrp="1"/>
-          </p:cNvSpPr>
-          <p:nvPr>
-            <p:ph type="sldNum" sz="quarter" idx="12"/>
-          </p:nvPr>
-        </p:nvSpPr>
-        <p:spPr/>
-        <p:txBody>
-          <a:bodyPr/>
-          <a:lstStyle/>
-          <a:p>
-            <a:fld id="{FAA41844-C0CA-4144-9D6C-D993F0C0FAB4}" type="slidenum">
-              <a:rPr lang="hr-HR" smtClean="0"/>
-              <a:t>9</a:t>
-            </a:fld>
-            <a:endParaRPr lang="hr-HR"/>
-          </a:p>
-        </p:txBody>
-      </p:sp>
+      <p:pic>
+        <p:nvPicPr>
+          <p:cNvPr id="5" name="Picture 4" descr="A picture containing text&#10;&#10;Description automatically generated">
+            <a:extLst>
+              <a:ext uri="{FF2B5EF4-FFF2-40B4-BE49-F238E27FC236}">
+                <a16:creationId xmlns:a16="http://schemas.microsoft.com/office/drawing/2014/main" id="{ACBFD67E-4577-834E-27C3-E16B522D31F0}"/>
+              </a:ext>
+            </a:extLst>
+          </p:cNvPr>
+          <p:cNvPicPr>
+            <a:picLocks noChangeAspect="1"/>
+          </p:cNvPicPr>
+          <p:nvPr/>
+        </p:nvPicPr>
+        <p:blipFill>
+          <a:blip r:embed="rId3" cstate="print">
+            <a:extLst>
+              <a:ext uri="{28A0092B-C50C-407E-A947-70E740481C1C}">
+                <a14:useLocalDpi xmlns:a14="http://schemas.microsoft.com/office/drawing/2010/main" val="0"/>
+              </a:ext>
+            </a:extLst>
+          </a:blip>
+          <a:stretch>
+            <a:fillRect/>
+          </a:stretch>
+        </p:blipFill>
+        <p:spPr>
+          <a:xfrm>
+            <a:off x="1988598" y="3792646"/>
+            <a:ext cx="5166803" cy="2906327"/>
+          </a:xfrm>
+          <a:prstGeom prst="rect">
+            <a:avLst/>
+          </a:prstGeom>
+          <a:ln>
+            <a:noFill/>
+          </a:ln>
+          <a:effectLst>
+            <a:softEdge rad="112500"/>
+          </a:effectLst>
+        </p:spPr>
+      </p:pic>
     </p:spTree>
     <p:extLst>
       <p:ext uri="{BB962C8B-B14F-4D97-AF65-F5344CB8AC3E}">
-        <p14:creationId xmlns:p14="http://schemas.microsoft.com/office/powerpoint/2010/main" val="3389772446"/>
+        <p14:creationId xmlns:p14="http://schemas.microsoft.com/office/powerpoint/2010/main" val="343207323"/>
       </p:ext>
     </p:extLst>
   </p:cSld>
   <p:clrMapOvr>
     <a:masterClrMapping/>
   </p:clrMapOvr>
+  <p:timing>
+    <p:tnLst>
+      <p:par>
+        <p:cTn id="1" dur="indefinite" restart="never" nodeType="tmRoot">
+          <p:childTnLst>
+            <p:seq concurrent="1" nextAc="seek">
+              <p:cTn id="2" dur="indefinite" nodeType="mainSeq">
+                <p:childTnLst>
+                  <p:par>
+                    <p:cTn id="3" fill="hold">
+                      <p:stCondLst>
+                        <p:cond delay="indefinite"/>
+                      </p:stCondLst>
+                      <p:childTnLst>
+                        <p:par>
+                          <p:cTn id="4" fill="hold">
+                            <p:stCondLst>
+                              <p:cond delay="0"/>
+                            </p:stCondLst>
+                            <p:childTnLst>
+                              <p:par>
+                                <p:cTn id="5" presetID="2" presetClass="entr" presetSubtype="8" fill="hold" grpId="0" nodeType="clickEffect">
+                                  <p:stCondLst>
+                                    <p:cond delay="0"/>
+                                  </p:stCondLst>
+                                  <p:childTnLst>
+                                    <p:set>
+                                      <p:cBhvr>
+                                        <p:cTn id="6" dur="1" fill="hold">
+                                          <p:stCondLst>
+                                            <p:cond delay="0"/>
+                                          </p:stCondLst>
+                                        </p:cTn>
+                                        <p:tgtEl>
+                                          <p:spTgt spid="13">
+                                            <p:txEl>
+                                              <p:pRg st="1" end="1"/>
+                                            </p:txEl>
+                                          </p:spTgt>
+                                        </p:tgtEl>
+                                        <p:attrNameLst>
+                                          <p:attrName>style.visibility</p:attrName>
+                                        </p:attrNameLst>
+                                      </p:cBhvr>
+                                      <p:to>
+                                        <p:strVal val="visible"/>
+                                      </p:to>
+                                    </p:set>
+                                    <p:anim calcmode="lin" valueType="num">
+                                      <p:cBhvr additive="base">
+                                        <p:cTn id="7" dur="500" fill="hold"/>
+                                        <p:tgtEl>
+                                          <p:spTgt spid="13">
+                                            <p:txEl>
+                                              <p:pRg st="1" end="1"/>
+                                            </p:txEl>
+                                          </p:spTgt>
+                                        </p:tgtEl>
+                                        <p:attrNameLst>
+                                          <p:attrName>ppt_x</p:attrName>
+                                        </p:attrNameLst>
+                                      </p:cBhvr>
+                                      <p:tavLst>
+                                        <p:tav tm="0">
+                                          <p:val>
+                                            <p:strVal val="0-#ppt_w/2"/>
+                                          </p:val>
+                                        </p:tav>
+                                        <p:tav tm="100000">
+                                          <p:val>
+                                            <p:strVal val="#ppt_x"/>
+                                          </p:val>
+                                        </p:tav>
+                                      </p:tavLst>
+                                    </p:anim>
+                                    <p:anim calcmode="lin" valueType="num">
+                                      <p:cBhvr additive="base">
+                                        <p:cTn id="8" dur="500" fill="hold"/>
+                                        <p:tgtEl>
+                                          <p:spTgt spid="13">
+                                            <p:txEl>
+                                              <p:pRg st="1" end="1"/>
+                                            </p:txEl>
+                                          </p:spTgt>
+                                        </p:tgtEl>
+                                        <p:attrNameLst>
+                                          <p:attrName>ppt_y</p:attrName>
+                                        </p:attrNameLst>
+                                      </p:cBhvr>
+                                      <p:tavLst>
+                                        <p:tav tm="0">
+                                          <p:val>
+                                            <p:strVal val="#ppt_y"/>
+                                          </p:val>
+                                        </p:tav>
+                                        <p:tav tm="100000">
+                                          <p:val>
+                                            <p:strVal val="#ppt_y"/>
+                                          </p:val>
+                                        </p:tav>
+                                      </p:tavLst>
+                                    </p:anim>
+                                  </p:childTnLst>
+                                </p:cTn>
+                              </p:par>
+                            </p:childTnLst>
+                          </p:cTn>
+                        </p:par>
+                      </p:childTnLst>
+                    </p:cTn>
+                  </p:par>
+                  <p:par>
+                    <p:cTn id="9" fill="hold">
+                      <p:stCondLst>
+                        <p:cond delay="indefinite"/>
+                      </p:stCondLst>
+                      <p:childTnLst>
+                        <p:par>
+                          <p:cTn id="10" fill="hold">
+                            <p:stCondLst>
+                              <p:cond delay="0"/>
+                            </p:stCondLst>
+                            <p:childTnLst>
+                              <p:par>
+                                <p:cTn id="11" presetID="2" presetClass="entr" presetSubtype="8" fill="hold" nodeType="clickEffect">
+                                  <p:stCondLst>
+                                    <p:cond delay="0"/>
+                                  </p:stCondLst>
+                                  <p:childTnLst>
+                                    <p:set>
+                                      <p:cBhvr>
+                                        <p:cTn id="12" dur="1" fill="hold">
+                                          <p:stCondLst>
+                                            <p:cond delay="0"/>
+                                          </p:stCondLst>
+                                        </p:cTn>
+                                        <p:tgtEl>
+                                          <p:spTgt spid="13">
+                                            <p:txEl>
+                                              <p:pRg st="2" end="2"/>
+                                            </p:txEl>
+                                          </p:spTgt>
+                                        </p:tgtEl>
+                                        <p:attrNameLst>
+                                          <p:attrName>style.visibility</p:attrName>
+                                        </p:attrNameLst>
+                                      </p:cBhvr>
+                                      <p:to>
+                                        <p:strVal val="visible"/>
+                                      </p:to>
+                                    </p:set>
+                                    <p:anim calcmode="lin" valueType="num">
+                                      <p:cBhvr additive="base">
+                                        <p:cTn id="13" dur="500" fill="hold"/>
+                                        <p:tgtEl>
+                                          <p:spTgt spid="13">
+                                            <p:txEl>
+                                              <p:pRg st="2" end="2"/>
+                                            </p:txEl>
+                                          </p:spTgt>
+                                        </p:tgtEl>
+                                        <p:attrNameLst>
+                                          <p:attrName>ppt_x</p:attrName>
+                                        </p:attrNameLst>
+                                      </p:cBhvr>
+                                      <p:tavLst>
+                                        <p:tav tm="0">
+                                          <p:val>
+                                            <p:strVal val="0-#ppt_w/2"/>
+                                          </p:val>
+                                        </p:tav>
+                                        <p:tav tm="100000">
+                                          <p:val>
+                                            <p:strVal val="#ppt_x"/>
+                                          </p:val>
+                                        </p:tav>
+                                      </p:tavLst>
+                                    </p:anim>
+                                    <p:anim calcmode="lin" valueType="num">
+                                      <p:cBhvr additive="base">
+                                        <p:cTn id="14" dur="500" fill="hold"/>
+                                        <p:tgtEl>
+                                          <p:spTgt spid="13">
+                                            <p:txEl>
+                                              <p:pRg st="2" end="2"/>
+                                            </p:txEl>
+                                          </p:spTgt>
+                                        </p:tgtEl>
+                                        <p:attrNameLst>
+                                          <p:attrName>ppt_y</p:attrName>
+                                        </p:attrNameLst>
+                                      </p:cBhvr>
+                                      <p:tavLst>
+                                        <p:tav tm="0">
+                                          <p:val>
+                                            <p:strVal val="#ppt_y"/>
+                                          </p:val>
+                                        </p:tav>
+                                        <p:tav tm="100000">
+                                          <p:val>
+                                            <p:strVal val="#ppt_y"/>
+                                          </p:val>
+                                        </p:tav>
+                                      </p:tavLst>
+                                    </p:anim>
+                                  </p:childTnLst>
+                                </p:cTn>
+                              </p:par>
+                            </p:childTnLst>
+                          </p:cTn>
+                        </p:par>
+                      </p:childTnLst>
+                    </p:cTn>
+                  </p:par>
+                  <p:par>
+                    <p:cTn id="15" fill="hold">
+                      <p:stCondLst>
+                        <p:cond delay="indefinite"/>
+                      </p:stCondLst>
+                      <p:childTnLst>
+                        <p:par>
+                          <p:cTn id="16" fill="hold">
+                            <p:stCondLst>
+                              <p:cond delay="0"/>
+                            </p:stCondLst>
+                            <p:childTnLst>
+                              <p:par>
+                                <p:cTn id="17" presetID="2" presetClass="entr" presetSubtype="8" fill="hold" nodeType="clickEffect">
+                                  <p:stCondLst>
+                                    <p:cond delay="0"/>
+                                  </p:stCondLst>
+                                  <p:childTnLst>
+                                    <p:set>
+                                      <p:cBhvr>
+                                        <p:cTn id="18" dur="1" fill="hold">
+                                          <p:stCondLst>
+                                            <p:cond delay="0"/>
+                                          </p:stCondLst>
+                                        </p:cTn>
+                                        <p:tgtEl>
+                                          <p:spTgt spid="13">
+                                            <p:txEl>
+                                              <p:pRg st="3" end="3"/>
+                                            </p:txEl>
+                                          </p:spTgt>
+                                        </p:tgtEl>
+                                        <p:attrNameLst>
+                                          <p:attrName>style.visibility</p:attrName>
+                                        </p:attrNameLst>
+                                      </p:cBhvr>
+                                      <p:to>
+                                        <p:strVal val="visible"/>
+                                      </p:to>
+                                    </p:set>
+                                    <p:anim calcmode="lin" valueType="num">
+                                      <p:cBhvr additive="base">
+                                        <p:cTn id="19" dur="500" fill="hold"/>
+                                        <p:tgtEl>
+                                          <p:spTgt spid="13">
+                                            <p:txEl>
+                                              <p:pRg st="3" end="3"/>
+                                            </p:txEl>
+                                          </p:spTgt>
+                                        </p:tgtEl>
+                                        <p:attrNameLst>
+                                          <p:attrName>ppt_x</p:attrName>
+                                        </p:attrNameLst>
+                                      </p:cBhvr>
+                                      <p:tavLst>
+                                        <p:tav tm="0">
+                                          <p:val>
+                                            <p:strVal val="0-#ppt_w/2"/>
+                                          </p:val>
+                                        </p:tav>
+                                        <p:tav tm="100000">
+                                          <p:val>
+                                            <p:strVal val="#ppt_x"/>
+                                          </p:val>
+                                        </p:tav>
+                                      </p:tavLst>
+                                    </p:anim>
+                                    <p:anim calcmode="lin" valueType="num">
+                                      <p:cBhvr additive="base">
+                                        <p:cTn id="20" dur="500" fill="hold"/>
+                                        <p:tgtEl>
+                                          <p:spTgt spid="13">
+                                            <p:txEl>
+                                              <p:pRg st="3" end="3"/>
+                                            </p:txEl>
+                                          </p:spTgt>
+                                        </p:tgtEl>
+                                        <p:attrNameLst>
+                                          <p:attrName>ppt_y</p:attrName>
+                                        </p:attrNameLst>
+                                      </p:cBhvr>
+                                      <p:tavLst>
+                                        <p:tav tm="0">
+                                          <p:val>
+                                            <p:strVal val="#ppt_y"/>
+                                          </p:val>
+                                        </p:tav>
+                                        <p:tav tm="100000">
+                                          <p:val>
+                                            <p:strVal val="#ppt_y"/>
+                                          </p:val>
+                                        </p:tav>
+                                      </p:tavLst>
+                                    </p:anim>
+                                  </p:childTnLst>
+                                </p:cTn>
+                              </p:par>
+                            </p:childTnLst>
+                          </p:cTn>
+                        </p:par>
+                      </p:childTnLst>
+                    </p:cTn>
+                  </p:par>
+                  <p:par>
+                    <p:cTn id="21" fill="hold">
+                      <p:stCondLst>
+                        <p:cond delay="indefinite"/>
+                      </p:stCondLst>
+                      <p:childTnLst>
+                        <p:par>
+                          <p:cTn id="22" fill="hold">
+                            <p:stCondLst>
+                              <p:cond delay="0"/>
+                            </p:stCondLst>
+                            <p:childTnLst>
+                              <p:par>
+                                <p:cTn id="23" presetID="2" presetClass="entr" presetSubtype="8" fill="hold" nodeType="clickEffect">
+                                  <p:stCondLst>
+                                    <p:cond delay="0"/>
+                                  </p:stCondLst>
+                                  <p:childTnLst>
+                                    <p:set>
+                                      <p:cBhvr>
+                                        <p:cTn id="24" dur="1" fill="hold">
+                                          <p:stCondLst>
+                                            <p:cond delay="0"/>
+                                          </p:stCondLst>
+                                        </p:cTn>
+                                        <p:tgtEl>
+                                          <p:spTgt spid="13">
+                                            <p:txEl>
+                                              <p:pRg st="4" end="4"/>
+                                            </p:txEl>
+                                          </p:spTgt>
+                                        </p:tgtEl>
+                                        <p:attrNameLst>
+                                          <p:attrName>style.visibility</p:attrName>
+                                        </p:attrNameLst>
+                                      </p:cBhvr>
+                                      <p:to>
+                                        <p:strVal val="visible"/>
+                                      </p:to>
+                                    </p:set>
+                                    <p:anim calcmode="lin" valueType="num">
+                                      <p:cBhvr additive="base">
+                                        <p:cTn id="25" dur="500" fill="hold"/>
+                                        <p:tgtEl>
+                                          <p:spTgt spid="13">
+                                            <p:txEl>
+                                              <p:pRg st="4" end="4"/>
+                                            </p:txEl>
+                                          </p:spTgt>
+                                        </p:tgtEl>
+                                        <p:attrNameLst>
+                                          <p:attrName>ppt_x</p:attrName>
+                                        </p:attrNameLst>
+                                      </p:cBhvr>
+                                      <p:tavLst>
+                                        <p:tav tm="0">
+                                          <p:val>
+                                            <p:strVal val="0-#ppt_w/2"/>
+                                          </p:val>
+                                        </p:tav>
+                                        <p:tav tm="100000">
+                                          <p:val>
+                                            <p:strVal val="#ppt_x"/>
+                                          </p:val>
+                                        </p:tav>
+                                      </p:tavLst>
+                                    </p:anim>
+                                    <p:anim calcmode="lin" valueType="num">
+                                      <p:cBhvr additive="base">
+                                        <p:cTn id="26" dur="500" fill="hold"/>
+                                        <p:tgtEl>
+                                          <p:spTgt spid="13">
+                                            <p:txEl>
+                                              <p:pRg st="4" end="4"/>
+                                            </p:txEl>
+                                          </p:spTgt>
+                                        </p:tgtEl>
+                                        <p:attrNameLst>
+                                          <p:attrName>ppt_y</p:attrName>
+                                        </p:attrNameLst>
+                                      </p:cBhvr>
+                                      <p:tavLst>
+                                        <p:tav tm="0">
+                                          <p:val>
+                                            <p:strVal val="#ppt_y"/>
+                                          </p:val>
+                                        </p:tav>
+                                        <p:tav tm="100000">
+                                          <p:val>
+                                            <p:strVal val="#ppt_y"/>
+                                          </p:val>
+                                        </p:tav>
+                                      </p:tavLst>
+                                    </p:anim>
+                                  </p:childTnLst>
+                                </p:cTn>
+                              </p:par>
+                            </p:childTnLst>
+                          </p:cTn>
+                        </p:par>
+                      </p:childTnLst>
+                    </p:cTn>
+                  </p:par>
+                </p:childTnLst>
+              </p:cTn>
+              <p:prevCondLst>
+                <p:cond evt="onPrev" delay="0">
+                  <p:tgtEl>
+                    <p:sldTgt/>
+                  </p:tgtEl>
+                </p:cond>
+              </p:prevCondLst>
+              <p:nextCondLst>
+                <p:cond evt="onNext" delay="0">
+                  <p:tgtEl>
+                    <p:sldTgt/>
+                  </p:tgtEl>
+                </p:cond>
+              </p:nextCondLst>
+            </p:seq>
+          </p:childTnLst>
+        </p:cTn>
+      </p:par>
+    </p:tnLst>
+    <p:bldLst>
+      <p:bldP spid="13" grpId="0" build="p"/>
+    </p:bldLst>
+  </p:timing>
 </p:sld>
 </file>
 

</xml_diff>